<commit_message>
Added SCTLR register implementation
</commit_message>
<xml_diff>
--- a/demo_artifacts/DOG-DebugOnGo.pptx
+++ b/demo_artifacts/DOG-DebugOnGo.pptx
@@ -274,7 +274,7 @@
                 </a:solidFill>
               </a:rPr>
               <a:pPr algn="l"/>
-              <a:t>5/24/2018 11:07:45 AM</a:t>
+              <a:t>5/26/2018 7:53:21 AM</a:t>
             </a:fld>
             <a:endParaRPr lang="en-US" sz="900">
               <a:solidFill>
@@ -1535,7 +1535,7 @@
                 </a:solidFill>
               </a:rPr>
               <a:pPr algn="l"/>
-              <a:t>5/24/2018 11:07:34 AM</a:t>
+              <a:t>5/26/2018 7:53:10 AM</a:t>
             </a:fld>
             <a:endParaRPr lang="en-US" sz="900">
               <a:solidFill>
@@ -30414,7 +30414,7 @@
             <a:fld id="{3BDFDD5F-E85B-4DA3-A4F9-9CF3C7409943}" type="datetime4">
               <a:rPr lang="en-US" smtClean="0"/>
               <a:pPr/>
-              <a:t>May 24, 2018</a:t>
+              <a:t>May 26, 2018</a:t>
             </a:fld>
             <a:endParaRPr lang="en-US"/>
           </a:p>
@@ -47165,7 +47165,7 @@
         <p:spPr>
           <a:xfrm>
             <a:off x="941506" y="1537454"/>
-            <a:ext cx="9854012" cy="2092881"/>
+            <a:ext cx="9854012" cy="2554545"/>
           </a:xfrm>
           <a:prstGeom prst="rect">
             <a:avLst/>
@@ -47239,6 +47239,21 @@
               <a:rPr lang="en-US" sz="1600" b="1" dirty="0"/>
               <a:t>Easy Expansion to new NPIs. (Single line code addition and Code compilation needed)</a:t>
             </a:r>
+          </a:p>
+          <a:p>
+            <a:pPr marL="285750" indent="-285750">
+              <a:buFont typeface="Arial" panose="020B0604020202020204" pitchFamily="34" charset="0"/>
+              <a:buChar char="•"/>
+            </a:pPr>
+            <a:r>
+              <a:rPr lang="en-US" sz="1600" b="1" dirty="0"/>
+              <a:t>App Crashes (if any) will be automatically reported to developer console. (Days of “provide me reproduction steps” are </a:t>
+            </a:r>
+            <a:r>
+              <a:rPr lang="en-US" sz="1600" b="1"/>
+              <a:t>gone).</a:t>
+            </a:r>
+            <a:endParaRPr lang="en-US" sz="1600" b="1" dirty="0"/>
           </a:p>
           <a:p>
             <a:pPr marL="285750" indent="-285750">
@@ -50680,138 +50695,53 @@
 </file>
 
 <file path=customXml/item1.xml><?xml version="1.0" encoding="utf-8"?>
-<p:properties xmlns:p="http://schemas.microsoft.com/office/2006/metadata/properties" xmlns:xsi="http://www.w3.org/2001/XMLSchema-instance" xmlns:pc="http://schemas.microsoft.com/office/infopath/2007/PartnerControls">
-  <documentManagement>
-    <_dlc_DocId xmlns="e5a3a747-d21f-491f-b559-719a372e993f">52MFTYTJJKHE-686160917-653</_dlc_DocId>
-    <_dlc_DocIdUrl xmlns="e5a3a747-d21f-491f-b559-719a372e993f">
-      <Url>https://nxp1.sharepoint.com/sites/dngpm/PMO/Active_NPIs/LS1012A/_layouts/15/DocIdRedir.aspx?ID=52MFTYTJJKHE-686160917-653</Url>
-      <Description>52MFTYTJJKHE-686160917-653</Description>
-    </_dlc_DocIdUrl>
-    <SharedWithUsers xmlns="e5a3a747-d21f-491f-b559-719a372e993f">
-      <UserInfo>
-        <DisplayName>Cynthia Fu</DisplayName>
-        <AccountId>184</AccountId>
-        <AccountType/>
-      </UserInfo>
-      <UserInfo>
-        <DisplayName>Mircea Ionita</DisplayName>
-        <AccountId>248</AccountId>
-        <AccountType/>
-      </UserInfo>
-      <UserInfo>
-        <DisplayName>Bogdan Vlad</DisplayName>
-        <AccountId>196</AccountId>
-        <AccountType/>
-      </UserInfo>
-      <UserInfo>
-        <DisplayName>George Stefan</DisplayName>
-        <AccountId>157</AccountId>
-        <AccountType/>
-      </UserInfo>
-      <UserInfo>
-        <DisplayName>Sebastian Grigore</DisplayName>
-        <AccountId>186</AccountId>
-        <AccountType/>
-      </UserInfo>
-      <UserInfo>
-        <DisplayName>Ravi Kanth Reddy P</DisplayName>
-        <AccountId>85</AccountId>
-        <AccountType/>
-      </UserInfo>
-      <UserInfo>
-        <DisplayName>Sarat Vetcha</DisplayName>
-        <AccountId>86</AccountId>
-        <AccountType/>
-      </UserInfo>
-      <UserInfo>
-        <DisplayName>Mircea Pop</DisplayName>
-        <AccountId>94</AccountId>
-        <AccountType/>
-      </UserInfo>
-      <UserInfo>
-        <DisplayName>Adrienne Suner</DisplayName>
-        <AccountId>1368</AccountId>
-        <AccountType/>
-      </UserInfo>
-      <UserInfo>
-        <DisplayName>Rajan Gupta</DisplayName>
-        <AccountId>21</AccountId>
-        <AccountType/>
-      </UserInfo>
-      <UserInfo>
-        <DisplayName>Ruchika Gupta</DisplayName>
-        <AccountId>148</AccountId>
-        <AccountType/>
-      </UserInfo>
-      <UserInfo>
-        <DisplayName>Jaiprakash Singh</DisplayName>
-        <AccountId>225</AccountId>
-        <AccountType/>
-      </UserInfo>
-      <UserInfo>
-        <DisplayName>Jaswinder Singh</DisplayName>
-        <AccountId>245</AccountId>
-        <AccountType/>
-      </UserInfo>
-      <UserInfo>
-        <DisplayName>Varun Sethi</DisplayName>
-        <AccountId>192</AccountId>
-        <AccountType/>
-      </UserInfo>
-      <UserInfo>
-        <DisplayName>SunilKumar Gupta</DisplayName>
-        <AccountId>198</AccountId>
-        <AccountType/>
-      </UserInfo>
-      <UserInfo>
-        <DisplayName>Iuliana Bratu</DisplayName>
-        <AccountId>256</AccountId>
-        <AccountType/>
-      </UserInfo>
-      <UserInfo>
-        <DisplayName>Bogdan Costinescu</DisplayName>
-        <AccountId>51</AccountId>
-        <AccountType/>
-      </UserInfo>
-      <UserInfo>
-        <DisplayName>Rajan Srivastava</DisplayName>
-        <AccountId>254</AccountId>
-        <AccountType/>
-      </UserInfo>
-      <UserInfo>
-        <DisplayName>Priyanka Jain</DisplayName>
-        <AccountId>595</AccountId>
-        <AccountType/>
-      </UserInfo>
-      <UserInfo>
-        <DisplayName>Harninder Rai</DisplayName>
-        <AccountId>199</AccountId>
-        <AccountType/>
-      </UserInfo>
-      <UserInfo>
-        <DisplayName>Bhaskar U</DisplayName>
-        <AccountId>1347</AccountId>
-        <AccountType/>
-      </UserInfo>
-      <UserInfo>
-        <DisplayName>Prabhakar Kushwaha</DisplayName>
-        <AccountId>601</AccountId>
-        <AccountType/>
-      </UserInfo>
-      <UserInfo>
-        <DisplayName>Ashish Kumar</DisplayName>
-        <AccountId>328</AccountId>
-        <AccountType/>
-      </UserInfo>
-      <UserInfo>
-        <DisplayName>Rajesh Bhagat</DisplayName>
-        <AccountId>600</AccountId>
-        <AccountType/>
-      </UserInfo>
-    </SharedWithUsers>
-    <Meeting_x0020_Date xmlns="a2f770b2-dfa2-4887-b142-27fb0960f078">2017-05-08T13:03:54+00:00</Meeting_x0020_Date>
-  </documentManagement>
-</p:properties>
+<?mso-contentType ?>
+<spe:Receivers xmlns:spe="http://schemas.microsoft.com/sharepoint/events">
+  <Receiver>
+    <Name>Document ID Generator</Name>
+    <Synchronization>Synchronous</Synchronization>
+    <Type>10001</Type>
+    <SequenceNumber>1000</SequenceNumber>
+    <Url/>
+    <Assembly>Microsoft.Office.DocumentManagement, Version=16.0.0.0, Culture=neutral, PublicKeyToken=71e9bce111e9429c</Assembly>
+    <Class>Microsoft.Office.DocumentManagement.Internal.DocIdHandler</Class>
+    <Data/>
+    <Filter/>
+  </Receiver>
+  <Receiver>
+    <Name>Document ID Generator</Name>
+    <Synchronization>Synchronous</Synchronization>
+    <Type>10002</Type>
+    <SequenceNumber>1001</SequenceNumber>
+    <Url/>
+    <Assembly>Microsoft.Office.DocumentManagement, Version=16.0.0.0, Culture=neutral, PublicKeyToken=71e9bce111e9429c</Assembly>
+    <Class>Microsoft.Office.DocumentManagement.Internal.DocIdHandler</Class>
+    <Data/>
+    <Filter/>
+  </Receiver>
+  <Receiver>
+    <Name>Document ID Generator</Name>
+    <Synchronization>Synchronous</Synchronization>
+    <Type>10004</Type>
+    <SequenceNumber>1002</SequenceNumber>
+    <Url/>
+    <Assembly>Microsoft.Office.DocumentManagement, Version=16.0.0.0, Culture=neutral, PublicKeyToken=71e9bce111e9429c</Assembly>
+    <Class>Microsoft.Office.DocumentManagement.Internal.DocIdHandler</Class>
+    <Data/>
+    <Filter/>
+  </Receiver>
+  <Receiver>
+    <Name>Document ID Generator</Name>
+    <Synchronization>Synchronous</Synchronization>
+    <Type>10006</Type>
+    <SequenceNumber>1003</SequenceNumber>
+    <Url/>
+    <Assembly>Microsoft.Office.DocumentManagement, Version=16.0.0.0, Culture=neutral, PublicKeyToken=71e9bce111e9429c</Assembly>
+    <Class>Microsoft.Office.DocumentManagement.Internal.DocIdHandler</Class>
+    <Data/>
+    <Filter/>
+  </Receiver>
+</spe:Receivers>
 </file>
 
 <file path=customXml/item2.xml><?xml version="1.0" encoding="utf-8"?>
@@ -51013,53 +50943,138 @@
 </file>
 
 <file path=customXml/item3.xml><?xml version="1.0" encoding="utf-8"?>
-<?mso-contentType ?>
-<spe:Receivers xmlns:spe="http://schemas.microsoft.com/sharepoint/events">
-  <Receiver>
-    <Name>Document ID Generator</Name>
-    <Synchronization>Synchronous</Synchronization>
-    <Type>10001</Type>
-    <SequenceNumber>1000</SequenceNumber>
-    <Url/>
-    <Assembly>Microsoft.Office.DocumentManagement, Version=16.0.0.0, Culture=neutral, PublicKeyToken=71e9bce111e9429c</Assembly>
-    <Class>Microsoft.Office.DocumentManagement.Internal.DocIdHandler</Class>
-    <Data/>
-    <Filter/>
-  </Receiver>
-  <Receiver>
-    <Name>Document ID Generator</Name>
-    <Synchronization>Synchronous</Synchronization>
-    <Type>10002</Type>
-    <SequenceNumber>1001</SequenceNumber>
-    <Url/>
-    <Assembly>Microsoft.Office.DocumentManagement, Version=16.0.0.0, Culture=neutral, PublicKeyToken=71e9bce111e9429c</Assembly>
-    <Class>Microsoft.Office.DocumentManagement.Internal.DocIdHandler</Class>
-    <Data/>
-    <Filter/>
-  </Receiver>
-  <Receiver>
-    <Name>Document ID Generator</Name>
-    <Synchronization>Synchronous</Synchronization>
-    <Type>10004</Type>
-    <SequenceNumber>1002</SequenceNumber>
-    <Url/>
-    <Assembly>Microsoft.Office.DocumentManagement, Version=16.0.0.0, Culture=neutral, PublicKeyToken=71e9bce111e9429c</Assembly>
-    <Class>Microsoft.Office.DocumentManagement.Internal.DocIdHandler</Class>
-    <Data/>
-    <Filter/>
-  </Receiver>
-  <Receiver>
-    <Name>Document ID Generator</Name>
-    <Synchronization>Synchronous</Synchronization>
-    <Type>10006</Type>
-    <SequenceNumber>1003</SequenceNumber>
-    <Url/>
-    <Assembly>Microsoft.Office.DocumentManagement, Version=16.0.0.0, Culture=neutral, PublicKeyToken=71e9bce111e9429c</Assembly>
-    <Class>Microsoft.Office.DocumentManagement.Internal.DocIdHandler</Class>
-    <Data/>
-    <Filter/>
-  </Receiver>
-</spe:Receivers>
+<p:properties xmlns:p="http://schemas.microsoft.com/office/2006/metadata/properties" xmlns:xsi="http://www.w3.org/2001/XMLSchema-instance" xmlns:pc="http://schemas.microsoft.com/office/infopath/2007/PartnerControls">
+  <documentManagement>
+    <_dlc_DocId xmlns="e5a3a747-d21f-491f-b559-719a372e993f">52MFTYTJJKHE-686160917-653</_dlc_DocId>
+    <_dlc_DocIdUrl xmlns="e5a3a747-d21f-491f-b559-719a372e993f">
+      <Url>https://nxp1.sharepoint.com/sites/dngpm/PMO/Active_NPIs/LS1012A/_layouts/15/DocIdRedir.aspx?ID=52MFTYTJJKHE-686160917-653</Url>
+      <Description>52MFTYTJJKHE-686160917-653</Description>
+    </_dlc_DocIdUrl>
+    <SharedWithUsers xmlns="e5a3a747-d21f-491f-b559-719a372e993f">
+      <UserInfo>
+        <DisplayName>Cynthia Fu</DisplayName>
+        <AccountId>184</AccountId>
+        <AccountType/>
+      </UserInfo>
+      <UserInfo>
+        <DisplayName>Mircea Ionita</DisplayName>
+        <AccountId>248</AccountId>
+        <AccountType/>
+      </UserInfo>
+      <UserInfo>
+        <DisplayName>Bogdan Vlad</DisplayName>
+        <AccountId>196</AccountId>
+        <AccountType/>
+      </UserInfo>
+      <UserInfo>
+        <DisplayName>George Stefan</DisplayName>
+        <AccountId>157</AccountId>
+        <AccountType/>
+      </UserInfo>
+      <UserInfo>
+        <DisplayName>Sebastian Grigore</DisplayName>
+        <AccountId>186</AccountId>
+        <AccountType/>
+      </UserInfo>
+      <UserInfo>
+        <DisplayName>Ravi Kanth Reddy P</DisplayName>
+        <AccountId>85</AccountId>
+        <AccountType/>
+      </UserInfo>
+      <UserInfo>
+        <DisplayName>Sarat Vetcha</DisplayName>
+        <AccountId>86</AccountId>
+        <AccountType/>
+      </UserInfo>
+      <UserInfo>
+        <DisplayName>Mircea Pop</DisplayName>
+        <AccountId>94</AccountId>
+        <AccountType/>
+      </UserInfo>
+      <UserInfo>
+        <DisplayName>Adrienne Suner</DisplayName>
+        <AccountId>1368</AccountId>
+        <AccountType/>
+      </UserInfo>
+      <UserInfo>
+        <DisplayName>Rajan Gupta</DisplayName>
+        <AccountId>21</AccountId>
+        <AccountType/>
+      </UserInfo>
+      <UserInfo>
+        <DisplayName>Ruchika Gupta</DisplayName>
+        <AccountId>148</AccountId>
+        <AccountType/>
+      </UserInfo>
+      <UserInfo>
+        <DisplayName>Jaiprakash Singh</DisplayName>
+        <AccountId>225</AccountId>
+        <AccountType/>
+      </UserInfo>
+      <UserInfo>
+        <DisplayName>Jaswinder Singh</DisplayName>
+        <AccountId>245</AccountId>
+        <AccountType/>
+      </UserInfo>
+      <UserInfo>
+        <DisplayName>Varun Sethi</DisplayName>
+        <AccountId>192</AccountId>
+        <AccountType/>
+      </UserInfo>
+      <UserInfo>
+        <DisplayName>SunilKumar Gupta</DisplayName>
+        <AccountId>198</AccountId>
+        <AccountType/>
+      </UserInfo>
+      <UserInfo>
+        <DisplayName>Iuliana Bratu</DisplayName>
+        <AccountId>256</AccountId>
+        <AccountType/>
+      </UserInfo>
+      <UserInfo>
+        <DisplayName>Bogdan Costinescu</DisplayName>
+        <AccountId>51</AccountId>
+        <AccountType/>
+      </UserInfo>
+      <UserInfo>
+        <DisplayName>Rajan Srivastava</DisplayName>
+        <AccountId>254</AccountId>
+        <AccountType/>
+      </UserInfo>
+      <UserInfo>
+        <DisplayName>Priyanka Jain</DisplayName>
+        <AccountId>595</AccountId>
+        <AccountType/>
+      </UserInfo>
+      <UserInfo>
+        <DisplayName>Harninder Rai</DisplayName>
+        <AccountId>199</AccountId>
+        <AccountType/>
+      </UserInfo>
+      <UserInfo>
+        <DisplayName>Bhaskar U</DisplayName>
+        <AccountId>1347</AccountId>
+        <AccountType/>
+      </UserInfo>
+      <UserInfo>
+        <DisplayName>Prabhakar Kushwaha</DisplayName>
+        <AccountId>601</AccountId>
+        <AccountType/>
+      </UserInfo>
+      <UserInfo>
+        <DisplayName>Ashish Kumar</DisplayName>
+        <AccountId>328</AccountId>
+        <AccountType/>
+      </UserInfo>
+      <UserInfo>
+        <DisplayName>Rajesh Bhagat</DisplayName>
+        <AccountId>600</AccountId>
+        <AccountType/>
+      </UserInfo>
+    </SharedWithUsers>
+    <Meeting_x0020_Date xmlns="a2f770b2-dfa2-4887-b142-27fb0960f078">2017-05-08T13:03:54+00:00</Meeting_x0020_Date>
+  </documentManagement>
+</p:properties>
 </file>
 
 <file path=customXml/item4.xml><?xml version="1.0" encoding="utf-8"?>
@@ -51072,18 +51087,9 @@
 </file>
 
 <file path=customXml/itemProps1.xml><?xml version="1.0" encoding="utf-8"?>
-<ds:datastoreItem xmlns:ds="http://schemas.openxmlformats.org/officeDocument/2006/customXml" ds:itemID="{21D23866-845B-4BD2-A441-572A2E164D66}">
+<ds:datastoreItem xmlns:ds="http://schemas.openxmlformats.org/officeDocument/2006/customXml" ds:itemID="{69A0E0BA-4C2A-440E-B218-2F3845E4EC86}">
   <ds:schemaRefs>
-    <ds:schemaRef ds:uri="http://purl.org/dc/terms/"/>
-    <ds:schemaRef ds:uri="http://schemas.microsoft.com/office/2006/metadata/properties"/>
-    <ds:schemaRef ds:uri="http://schemas.microsoft.com/office/2006/documentManagement/types"/>
-    <ds:schemaRef ds:uri="a2f770b2-dfa2-4887-b142-27fb0960f078"/>
-    <ds:schemaRef ds:uri="http://schemas.microsoft.com/office/infopath/2007/PartnerControls"/>
-    <ds:schemaRef ds:uri="http://purl.org/dc/elements/1.1/"/>
-    <ds:schemaRef ds:uri="http://schemas.openxmlformats.org/package/2006/metadata/core-properties"/>
-    <ds:schemaRef ds:uri="e5a3a747-d21f-491f-b559-719a372e993f"/>
-    <ds:schemaRef ds:uri="http://www.w3.org/XML/1998/namespace"/>
-    <ds:schemaRef ds:uri="http://purl.org/dc/dcmitype/"/>
+    <ds:schemaRef ds:uri="http://schemas.microsoft.com/sharepoint/events"/>
   </ds:schemaRefs>
 </ds:datastoreItem>
 </file>
@@ -51108,9 +51114,18 @@
 </file>
 
 <file path=customXml/itemProps3.xml><?xml version="1.0" encoding="utf-8"?>
-<ds:datastoreItem xmlns:ds="http://schemas.openxmlformats.org/officeDocument/2006/customXml" ds:itemID="{69A0E0BA-4C2A-440E-B218-2F3845E4EC86}">
+<ds:datastoreItem xmlns:ds="http://schemas.openxmlformats.org/officeDocument/2006/customXml" ds:itemID="{21D23866-845B-4BD2-A441-572A2E164D66}">
   <ds:schemaRefs>
-    <ds:schemaRef ds:uri="http://schemas.microsoft.com/sharepoint/events"/>
+    <ds:schemaRef ds:uri="http://purl.org/dc/terms/"/>
+    <ds:schemaRef ds:uri="http://schemas.microsoft.com/office/2006/metadata/properties"/>
+    <ds:schemaRef ds:uri="http://schemas.microsoft.com/office/2006/documentManagement/types"/>
+    <ds:schemaRef ds:uri="a2f770b2-dfa2-4887-b142-27fb0960f078"/>
+    <ds:schemaRef ds:uri="http://schemas.microsoft.com/office/infopath/2007/PartnerControls"/>
+    <ds:schemaRef ds:uri="http://purl.org/dc/elements/1.1/"/>
+    <ds:schemaRef ds:uri="http://schemas.openxmlformats.org/package/2006/metadata/core-properties"/>
+    <ds:schemaRef ds:uri="e5a3a747-d21f-491f-b559-719a372e993f"/>
+    <ds:schemaRef ds:uri="http://www.w3.org/XML/1998/namespace"/>
+    <ds:schemaRef ds:uri="http://purl.org/dc/dcmitype/"/>
   </ds:schemaRefs>
 </ds:datastoreItem>
 </file>

</xml_diff>

<commit_message>
Demo PPT updaed with another know issue of Multiple Entries in  CW DB for same Register Address
</commit_message>
<xml_diff>
--- a/demo_artifacts/DOG-DebugOnGo.pptx
+++ b/demo_artifacts/DOG-DebugOnGo.pptx
@@ -6,10 +6,10 @@
     <p:sldMasterId id="2147483657" r:id="rId6"/>
   </p:sldMasterIdLst>
   <p:notesMasterIdLst>
-    <p:notesMasterId r:id="rId20"/>
+    <p:notesMasterId r:id="rId23"/>
   </p:notesMasterIdLst>
   <p:handoutMasterIdLst>
-    <p:handoutMasterId r:id="rId21"/>
+    <p:handoutMasterId r:id="rId24"/>
   </p:handoutMasterIdLst>
   <p:sldIdLst>
     <p:sldId id="430" r:id="rId7"/>
@@ -22,14 +22,17 @@
     <p:sldId id="446" r:id="rId14"/>
     <p:sldId id="447" r:id="rId15"/>
     <p:sldId id="448" r:id="rId16"/>
-    <p:sldId id="449" r:id="rId17"/>
-    <p:sldId id="445" r:id="rId18"/>
-    <p:sldId id="450" r:id="rId19"/>
+    <p:sldId id="452" r:id="rId17"/>
+    <p:sldId id="451" r:id="rId18"/>
+    <p:sldId id="449" r:id="rId19"/>
+    <p:sldId id="453" r:id="rId20"/>
+    <p:sldId id="445" r:id="rId21"/>
+    <p:sldId id="450" r:id="rId22"/>
   </p:sldIdLst>
   <p:sldSz cx="12192000" cy="6858000"/>
   <p:notesSz cx="7315200" cy="9601200"/>
   <p:custDataLst>
-    <p:tags r:id="rId22"/>
+    <p:tags r:id="rId25"/>
   </p:custDataLst>
   <p:defaultTextStyle>
     <a:defPPr>
@@ -274,7 +277,7 @@
                 </a:solidFill>
               </a:rPr>
               <a:pPr algn="l"/>
-              <a:t>5/26/2018 7:53:21 AM</a:t>
+              <a:t>5/28/2018 11:50:00 AM</a:t>
             </a:fld>
             <a:endParaRPr lang="en-US" sz="900">
               <a:solidFill>
@@ -1535,7 +1538,7 @@
                 </a:solidFill>
               </a:rPr>
               <a:pPr algn="l"/>
-              <a:t>5/26/2018 7:53:10 AM</a:t>
+              <a:t>5/28/2018 11:49:03 AM</a:t>
             </a:fld>
             <a:endParaRPr lang="en-US" sz="900">
               <a:solidFill>
@@ -30414,7 +30417,7 @@
             <a:fld id="{3BDFDD5F-E85B-4DA3-A4F9-9CF3C7409943}" type="datetime4">
               <a:rPr lang="en-US" smtClean="0"/>
               <a:pPr/>
-              <a:t>May 26, 2018</a:t>
+              <a:t>May 28, 2018</a:t>
             </a:fld>
             <a:endParaRPr lang="en-US"/>
           </a:p>
@@ -42556,7 +42559,7 @@
             </a:pPr>
             <a:r>
               <a:rPr lang="en-US" sz="3200" b="1" dirty="0"/>
-              <a:t>D.O.G  - Dump File Format</a:t>
+              <a:t>D.O.G  - Dump File Format – Plain text file</a:t>
             </a:r>
           </a:p>
         </p:txBody>
@@ -43053,6 +43056,952 @@
         </p:spPr>
         <p:txBody>
           <a:bodyPr>
+            <a:normAutofit fontScale="70000" lnSpcReduction="20000"/>
+          </a:bodyPr>
+          <a:lstStyle/>
+          <a:p>
+            <a:pPr marL="0" indent="0">
+              <a:buNone/>
+            </a:pPr>
+            <a:r>
+              <a:rPr lang="en-US" sz="3200" b="1" dirty="0"/>
+              <a:t>D.O.G  - Dump File Format – XML Format (Code Warrior Format)</a:t>
+            </a:r>
+          </a:p>
+        </p:txBody>
+      </p:sp>
+      <p:sp>
+        <p:nvSpPr>
+          <p:cNvPr id="14" name="Text Placeholder 3">
+            <a:extLst>
+              <a:ext uri="{FF2B5EF4-FFF2-40B4-BE49-F238E27FC236}">
+                <a16:creationId xmlns:a16="http://schemas.microsoft.com/office/drawing/2014/main" id="{9DA39B4E-D140-4422-9288-FA1802AAB484}"/>
+              </a:ext>
+            </a:extLst>
+          </p:cNvPr>
+          <p:cNvSpPr txBox="1">
+            <a:spLocks/>
+          </p:cNvSpPr>
+          <p:nvPr/>
+        </p:nvSpPr>
+        <p:spPr>
+          <a:xfrm>
+            <a:off x="336892" y="5344531"/>
+            <a:ext cx="10663851" cy="1650158"/>
+          </a:xfrm>
+          <a:prstGeom prst="rect">
+            <a:avLst/>
+          </a:prstGeom>
+        </p:spPr>
+        <p:txBody>
+          <a:bodyPr vert="horz" lIns="91440" tIns="45720" rIns="91440" bIns="45720" rtlCol="0">
+            <a:normAutofit/>
+          </a:bodyPr>
+          <a:lstStyle>
+            <a:lvl1pPr marL="233363" indent="-233363" algn="l" rtl="0" fontAlgn="base">
+              <a:lnSpc>
+                <a:spcPct val="100000"/>
+              </a:lnSpc>
+              <a:spcBef>
+                <a:spcPts val="575"/>
+              </a:spcBef>
+              <a:spcAft>
+                <a:spcPts val="75"/>
+              </a:spcAft>
+              <a:buClr>
+                <a:schemeClr val="tx1">
+                  <a:lumMod val="85000"/>
+                  <a:lumOff val="15000"/>
+                </a:schemeClr>
+              </a:buClr>
+              <a:buSzPct val="80000"/>
+              <a:buFont typeface="Arial" pitchFamily="34" charset="0"/>
+              <a:buChar char="•"/>
+              <a:defRPr sz="2400" b="0">
+                <a:solidFill>
+                  <a:srgbClr val="000000"/>
+                </a:solidFill>
+                <a:latin typeface="+mn-lt"/>
+                <a:ea typeface="+mn-ea"/>
+                <a:cs typeface="+mn-cs"/>
+              </a:defRPr>
+            </a:lvl1pPr>
+            <a:lvl2pPr marL="401638" indent="-168275" algn="l" rtl="0" fontAlgn="base">
+              <a:lnSpc>
+                <a:spcPct val="100000"/>
+              </a:lnSpc>
+              <a:spcBef>
+                <a:spcPts val="575"/>
+              </a:spcBef>
+              <a:spcAft>
+                <a:spcPts val="75"/>
+              </a:spcAft>
+              <a:buClr>
+                <a:schemeClr val="tx1"/>
+              </a:buClr>
+              <a:buSzPct val="80000"/>
+              <a:buFont typeface="Arial" pitchFamily="34" charset="0"/>
+              <a:buChar char="−"/>
+              <a:defRPr sz="2200">
+                <a:solidFill>
+                  <a:srgbClr val="000000"/>
+                </a:solidFill>
+                <a:latin typeface="+mn-lt"/>
+              </a:defRPr>
+            </a:lvl2pPr>
+            <a:lvl3pPr marL="569913" indent="-168275" algn="l" rtl="0" fontAlgn="base">
+              <a:lnSpc>
+                <a:spcPct val="100000"/>
+              </a:lnSpc>
+              <a:spcBef>
+                <a:spcPts val="575"/>
+              </a:spcBef>
+              <a:spcAft>
+                <a:spcPts val="75"/>
+              </a:spcAft>
+              <a:buClr>
+                <a:schemeClr val="tx1"/>
+              </a:buClr>
+              <a:buSzPct val="80000"/>
+              <a:buFont typeface="Wingdings" pitchFamily="2" charset="2"/>
+              <a:buChar char="§"/>
+              <a:defRPr sz="2000">
+                <a:solidFill>
+                  <a:srgbClr val="000000"/>
+                </a:solidFill>
+                <a:latin typeface="+mn-lt"/>
+              </a:defRPr>
+            </a:lvl3pPr>
+            <a:lvl4pPr marL="746125" indent="-176213" algn="l" rtl="0" fontAlgn="base">
+              <a:lnSpc>
+                <a:spcPct val="100000"/>
+              </a:lnSpc>
+              <a:spcBef>
+                <a:spcPts val="575"/>
+              </a:spcBef>
+              <a:spcAft>
+                <a:spcPts val="75"/>
+              </a:spcAft>
+              <a:buClr>
+                <a:schemeClr val="tx1"/>
+              </a:buClr>
+              <a:buSzPct val="80000"/>
+              <a:buFont typeface="Arial" pitchFamily="34" charset="0"/>
+              <a:buChar char="•"/>
+              <a:defRPr sz="1800">
+                <a:solidFill>
+                  <a:srgbClr val="000000"/>
+                </a:solidFill>
+                <a:latin typeface="+mn-lt"/>
+              </a:defRPr>
+            </a:lvl4pPr>
+            <a:lvl5pPr marL="969963" indent="-223838" algn="l" rtl="0" fontAlgn="base">
+              <a:lnSpc>
+                <a:spcPct val="100000"/>
+              </a:lnSpc>
+              <a:spcBef>
+                <a:spcPts val="575"/>
+              </a:spcBef>
+              <a:spcAft>
+                <a:spcPts val="75"/>
+              </a:spcAft>
+              <a:buClr>
+                <a:schemeClr val="tx1"/>
+              </a:buClr>
+              <a:buSzPct val="70000"/>
+              <a:buFont typeface="Arial" pitchFamily="34" charset="0"/>
+              <a:buChar char="−"/>
+              <a:defRPr sz="1600">
+                <a:solidFill>
+                  <a:srgbClr val="000000"/>
+                </a:solidFill>
+                <a:latin typeface="+mn-lt"/>
+              </a:defRPr>
+            </a:lvl5pPr>
+            <a:lvl6pPr marL="2230438" indent="-157163" algn="l" rtl="0" fontAlgn="base">
+              <a:spcBef>
+                <a:spcPct val="20000"/>
+              </a:spcBef>
+              <a:spcAft>
+                <a:spcPct val="3000"/>
+              </a:spcAft>
+              <a:buClr>
+                <a:schemeClr val="tx1"/>
+              </a:buClr>
+              <a:buSzPct val="70000"/>
+              <a:buFont typeface="Arial" charset="0"/>
+              <a:buChar char="►"/>
+              <a:defRPr sz="1400">
+                <a:solidFill>
+                  <a:srgbClr val="000000"/>
+                </a:solidFill>
+                <a:latin typeface="+mn-lt"/>
+              </a:defRPr>
+            </a:lvl6pPr>
+            <a:lvl7pPr marL="2687638" indent="-157163" algn="l" rtl="0" fontAlgn="base">
+              <a:spcBef>
+                <a:spcPct val="20000"/>
+              </a:spcBef>
+              <a:spcAft>
+                <a:spcPct val="3000"/>
+              </a:spcAft>
+              <a:buClr>
+                <a:schemeClr val="tx1"/>
+              </a:buClr>
+              <a:buSzPct val="70000"/>
+              <a:buFont typeface="Arial" charset="0"/>
+              <a:buChar char="►"/>
+              <a:defRPr sz="1400">
+                <a:solidFill>
+                  <a:srgbClr val="000000"/>
+                </a:solidFill>
+                <a:latin typeface="+mn-lt"/>
+              </a:defRPr>
+            </a:lvl7pPr>
+            <a:lvl8pPr marL="3144838" indent="-157163" algn="l" rtl="0" fontAlgn="base">
+              <a:spcBef>
+                <a:spcPct val="20000"/>
+              </a:spcBef>
+              <a:spcAft>
+                <a:spcPct val="3000"/>
+              </a:spcAft>
+              <a:buClr>
+                <a:schemeClr val="tx1"/>
+              </a:buClr>
+              <a:buSzPct val="70000"/>
+              <a:buFont typeface="Arial" charset="0"/>
+              <a:buChar char="►"/>
+              <a:defRPr sz="1400">
+                <a:solidFill>
+                  <a:srgbClr val="000000"/>
+                </a:solidFill>
+                <a:latin typeface="+mn-lt"/>
+              </a:defRPr>
+            </a:lvl8pPr>
+            <a:lvl9pPr marL="3602038" indent="-157163" algn="l" rtl="0" fontAlgn="base">
+              <a:spcBef>
+                <a:spcPct val="20000"/>
+              </a:spcBef>
+              <a:spcAft>
+                <a:spcPct val="3000"/>
+              </a:spcAft>
+              <a:buClr>
+                <a:schemeClr val="tx1"/>
+              </a:buClr>
+              <a:buSzPct val="70000"/>
+              <a:buFont typeface="Arial" charset="0"/>
+              <a:buChar char="►"/>
+              <a:defRPr sz="1400">
+                <a:solidFill>
+                  <a:srgbClr val="000000"/>
+                </a:solidFill>
+                <a:latin typeface="+mn-lt"/>
+              </a:defRPr>
+            </a:lvl9pPr>
+          </a:lstStyle>
+          <a:p>
+            <a:pPr marL="0" indent="0">
+              <a:buNone/>
+            </a:pPr>
+            <a:endParaRPr lang="en-US" sz="1600" kern="0" dirty="0"/>
+          </a:p>
+        </p:txBody>
+      </p:sp>
+      <p:sp>
+        <p:nvSpPr>
+          <p:cNvPr id="5" name="TextBox 4">
+            <a:extLst>
+              <a:ext uri="{FF2B5EF4-FFF2-40B4-BE49-F238E27FC236}">
+                <a16:creationId xmlns:a16="http://schemas.microsoft.com/office/drawing/2014/main" id="{E7D8B4F0-7B2B-4E2B-87AF-053D2A579703}"/>
+              </a:ext>
+            </a:extLst>
+          </p:cNvPr>
+          <p:cNvSpPr txBox="1"/>
+          <p:nvPr/>
+        </p:nvSpPr>
+        <p:spPr>
+          <a:xfrm>
+            <a:off x="7922909" y="1771114"/>
+            <a:ext cx="2255520" cy="314589"/>
+          </a:xfrm>
+          <a:prstGeom prst="rect">
+            <a:avLst/>
+          </a:prstGeom>
+          <a:noFill/>
+        </p:spPr>
+        <p:txBody>
+          <a:bodyPr wrap="none" lIns="91440" tIns="45720" rIns="91440" rtlCol="0" anchor="t">
+            <a:noAutofit/>
+          </a:bodyPr>
+          <a:lstStyle/>
+          <a:p>
+            <a:r>
+              <a:rPr lang="en-US" sz="1600" dirty="0">
+                <a:solidFill>
+                  <a:schemeClr val="tx1"/>
+                </a:solidFill>
+              </a:rPr>
+              <a:t>Sample Dump File</a:t>
+            </a:r>
+            <a:endParaRPr lang="en-US" sz="2000" dirty="0">
+              <a:solidFill>
+                <a:schemeClr val="tx1"/>
+              </a:solidFill>
+            </a:endParaRPr>
+          </a:p>
+        </p:txBody>
+      </p:sp>
+      <p:sp>
+        <p:nvSpPr>
+          <p:cNvPr id="6" name="Rectangle 5">
+            <a:extLst>
+              <a:ext uri="{FF2B5EF4-FFF2-40B4-BE49-F238E27FC236}">
+                <a16:creationId xmlns:a16="http://schemas.microsoft.com/office/drawing/2014/main" id="{C4DB896E-D8FD-462F-B618-D3B17EE9FDCB}"/>
+              </a:ext>
+            </a:extLst>
+          </p:cNvPr>
+          <p:cNvSpPr/>
+          <p:nvPr/>
+        </p:nvSpPr>
+        <p:spPr>
+          <a:xfrm>
+            <a:off x="780661" y="1437784"/>
+            <a:ext cx="6096000" cy="1446550"/>
+          </a:xfrm>
+          <a:prstGeom prst="rect">
+            <a:avLst/>
+          </a:prstGeom>
+        </p:spPr>
+        <p:txBody>
+          <a:bodyPr>
+            <a:spAutoFit/>
+          </a:bodyPr>
+          <a:lstStyle/>
+          <a:p>
+            <a:r>
+              <a:rPr lang="en-US" sz="2200" dirty="0"/>
+              <a:t>&lt;register name=“ABCDEF"&gt;</a:t>
+            </a:r>
+          </a:p>
+          <a:p>
+            <a:r>
+              <a:rPr lang="en-US" sz="2200" dirty="0"/>
+              <a:t>	&lt;value&gt;0xyyyyyyyyyyyy&lt;/value&gt;</a:t>
+            </a:r>
+          </a:p>
+          <a:p>
+            <a:r>
+              <a:rPr lang="en-US" sz="2200" dirty="0"/>
+              <a:t>	&lt;custom-groups&gt;&lt;/custom-groups&gt;</a:t>
+            </a:r>
+          </a:p>
+          <a:p>
+            <a:r>
+              <a:rPr lang="en-US" sz="2200" dirty="0"/>
+              <a:t>&lt;/register&gt;</a:t>
+            </a:r>
+          </a:p>
+        </p:txBody>
+      </p:sp>
+      <p:pic>
+        <p:nvPicPr>
+          <p:cNvPr id="7" name="Picture 6">
+            <a:extLst>
+              <a:ext uri="{FF2B5EF4-FFF2-40B4-BE49-F238E27FC236}">
+                <a16:creationId xmlns:a16="http://schemas.microsoft.com/office/drawing/2014/main" id="{04E9E11F-A830-4275-8154-DAC0CF312E64}"/>
+              </a:ext>
+            </a:extLst>
+          </p:cNvPr>
+          <p:cNvPicPr>
+            <a:picLocks noChangeAspect="1"/>
+          </p:cNvPicPr>
+          <p:nvPr/>
+        </p:nvPicPr>
+        <p:blipFill>
+          <a:blip r:embed="rId2"/>
+          <a:stretch>
+            <a:fillRect/>
+          </a:stretch>
+        </p:blipFill>
+        <p:spPr>
+          <a:xfrm>
+            <a:off x="7698119" y="2238861"/>
+            <a:ext cx="2705100" cy="3705225"/>
+          </a:xfrm>
+          <a:prstGeom prst="rect">
+            <a:avLst/>
+          </a:prstGeom>
+          <a:effectLst>
+            <a:glow rad="139700">
+              <a:schemeClr val="accent4">
+                <a:satMod val="175000"/>
+                <a:alpha val="40000"/>
+              </a:schemeClr>
+            </a:glow>
+          </a:effectLst>
+        </p:spPr>
+      </p:pic>
+    </p:spTree>
+    <p:extLst>
+      <p:ext uri="{BB962C8B-B14F-4D97-AF65-F5344CB8AC3E}">
+        <p14:creationId xmlns:p14="http://schemas.microsoft.com/office/powerpoint/2010/main" val="3728108306"/>
+      </p:ext>
+    </p:extLst>
+  </p:cSld>
+  <p:clrMapOvr>
+    <a:masterClrMapping/>
+  </p:clrMapOvr>
+  <p:transition>
+    <p:fade/>
+  </p:transition>
+</p:sld>
+</file>
+
+<file path=ppt/slides/slide12.xml><?xml version="1.0" encoding="utf-8"?>
+<p:sld xmlns:a="http://schemas.openxmlformats.org/drawingml/2006/main" xmlns:r="http://schemas.openxmlformats.org/officeDocument/2006/relationships" xmlns:p="http://schemas.openxmlformats.org/presentationml/2006/main">
+  <p:cSld>
+    <p:spTree>
+      <p:nvGrpSpPr>
+        <p:cNvPr id="1" name=""/>
+        <p:cNvGrpSpPr/>
+        <p:nvPr/>
+      </p:nvGrpSpPr>
+      <p:grpSpPr>
+        <a:xfrm>
+          <a:off x="0" y="0"/>
+          <a:ext cx="0" cy="0"/>
+          <a:chOff x="0" y="0"/>
+          <a:chExt cx="0" cy="0"/>
+        </a:xfrm>
+      </p:grpSpPr>
+      <p:sp>
+        <p:nvSpPr>
+          <p:cNvPr id="4" name="Text Placeholder 3">
+            <a:extLst>
+              <a:ext uri="{FF2B5EF4-FFF2-40B4-BE49-F238E27FC236}">
+                <a16:creationId xmlns:a16="http://schemas.microsoft.com/office/drawing/2014/main" id="{6F256A01-4AA8-439A-837A-571E043AA08F}"/>
+              </a:ext>
+            </a:extLst>
+          </p:cNvPr>
+          <p:cNvSpPr>
+            <a:spLocks noGrp="1"/>
+          </p:cNvSpPr>
+          <p:nvPr>
+            <p:ph type="body" sz="quarter" idx="10"/>
+          </p:nvPr>
+        </p:nvSpPr>
+        <p:spPr>
+          <a:xfrm>
+            <a:off x="701040" y="532891"/>
+            <a:ext cx="9086772" cy="520310"/>
+          </a:xfrm>
+        </p:spPr>
+        <p:txBody>
+          <a:bodyPr>
+            <a:normAutofit fontScale="92500" lnSpcReduction="10000"/>
+          </a:bodyPr>
+          <a:lstStyle/>
+          <a:p>
+            <a:pPr marL="0" indent="0">
+              <a:buNone/>
+            </a:pPr>
+            <a:r>
+              <a:rPr lang="en-US" sz="3200" b="1" dirty="0"/>
+              <a:t>D.O.G  - Adding Custom Registers Is Easy</a:t>
+            </a:r>
+          </a:p>
+        </p:txBody>
+      </p:sp>
+      <p:sp>
+        <p:nvSpPr>
+          <p:cNvPr id="14" name="Text Placeholder 3">
+            <a:extLst>
+              <a:ext uri="{FF2B5EF4-FFF2-40B4-BE49-F238E27FC236}">
+                <a16:creationId xmlns:a16="http://schemas.microsoft.com/office/drawing/2014/main" id="{9DA39B4E-D140-4422-9288-FA1802AAB484}"/>
+              </a:ext>
+            </a:extLst>
+          </p:cNvPr>
+          <p:cNvSpPr txBox="1">
+            <a:spLocks/>
+          </p:cNvSpPr>
+          <p:nvPr/>
+        </p:nvSpPr>
+        <p:spPr>
+          <a:xfrm>
+            <a:off x="336892" y="5344531"/>
+            <a:ext cx="10663851" cy="1650158"/>
+          </a:xfrm>
+          <a:prstGeom prst="rect">
+            <a:avLst/>
+          </a:prstGeom>
+        </p:spPr>
+        <p:txBody>
+          <a:bodyPr vert="horz" lIns="91440" tIns="45720" rIns="91440" bIns="45720" rtlCol="0">
+            <a:normAutofit/>
+          </a:bodyPr>
+          <a:lstStyle>
+            <a:lvl1pPr marL="233363" indent="-233363" algn="l" rtl="0" fontAlgn="base">
+              <a:lnSpc>
+                <a:spcPct val="100000"/>
+              </a:lnSpc>
+              <a:spcBef>
+                <a:spcPts val="575"/>
+              </a:spcBef>
+              <a:spcAft>
+                <a:spcPts val="75"/>
+              </a:spcAft>
+              <a:buClr>
+                <a:schemeClr val="tx1">
+                  <a:lumMod val="85000"/>
+                  <a:lumOff val="15000"/>
+                </a:schemeClr>
+              </a:buClr>
+              <a:buSzPct val="80000"/>
+              <a:buFont typeface="Arial" pitchFamily="34" charset="0"/>
+              <a:buChar char="•"/>
+              <a:defRPr sz="2400" b="0">
+                <a:solidFill>
+                  <a:srgbClr val="000000"/>
+                </a:solidFill>
+                <a:latin typeface="+mn-lt"/>
+                <a:ea typeface="+mn-ea"/>
+                <a:cs typeface="+mn-cs"/>
+              </a:defRPr>
+            </a:lvl1pPr>
+            <a:lvl2pPr marL="401638" indent="-168275" algn="l" rtl="0" fontAlgn="base">
+              <a:lnSpc>
+                <a:spcPct val="100000"/>
+              </a:lnSpc>
+              <a:spcBef>
+                <a:spcPts val="575"/>
+              </a:spcBef>
+              <a:spcAft>
+                <a:spcPts val="75"/>
+              </a:spcAft>
+              <a:buClr>
+                <a:schemeClr val="tx1"/>
+              </a:buClr>
+              <a:buSzPct val="80000"/>
+              <a:buFont typeface="Arial" pitchFamily="34" charset="0"/>
+              <a:buChar char="−"/>
+              <a:defRPr sz="2200">
+                <a:solidFill>
+                  <a:srgbClr val="000000"/>
+                </a:solidFill>
+                <a:latin typeface="+mn-lt"/>
+              </a:defRPr>
+            </a:lvl2pPr>
+            <a:lvl3pPr marL="569913" indent="-168275" algn="l" rtl="0" fontAlgn="base">
+              <a:lnSpc>
+                <a:spcPct val="100000"/>
+              </a:lnSpc>
+              <a:spcBef>
+                <a:spcPts val="575"/>
+              </a:spcBef>
+              <a:spcAft>
+                <a:spcPts val="75"/>
+              </a:spcAft>
+              <a:buClr>
+                <a:schemeClr val="tx1"/>
+              </a:buClr>
+              <a:buSzPct val="80000"/>
+              <a:buFont typeface="Wingdings" pitchFamily="2" charset="2"/>
+              <a:buChar char="§"/>
+              <a:defRPr sz="2000">
+                <a:solidFill>
+                  <a:srgbClr val="000000"/>
+                </a:solidFill>
+                <a:latin typeface="+mn-lt"/>
+              </a:defRPr>
+            </a:lvl3pPr>
+            <a:lvl4pPr marL="746125" indent="-176213" algn="l" rtl="0" fontAlgn="base">
+              <a:lnSpc>
+                <a:spcPct val="100000"/>
+              </a:lnSpc>
+              <a:spcBef>
+                <a:spcPts val="575"/>
+              </a:spcBef>
+              <a:spcAft>
+                <a:spcPts val="75"/>
+              </a:spcAft>
+              <a:buClr>
+                <a:schemeClr val="tx1"/>
+              </a:buClr>
+              <a:buSzPct val="80000"/>
+              <a:buFont typeface="Arial" pitchFamily="34" charset="0"/>
+              <a:buChar char="•"/>
+              <a:defRPr sz="1800">
+                <a:solidFill>
+                  <a:srgbClr val="000000"/>
+                </a:solidFill>
+                <a:latin typeface="+mn-lt"/>
+              </a:defRPr>
+            </a:lvl4pPr>
+            <a:lvl5pPr marL="969963" indent="-223838" algn="l" rtl="0" fontAlgn="base">
+              <a:lnSpc>
+                <a:spcPct val="100000"/>
+              </a:lnSpc>
+              <a:spcBef>
+                <a:spcPts val="575"/>
+              </a:spcBef>
+              <a:spcAft>
+                <a:spcPts val="75"/>
+              </a:spcAft>
+              <a:buClr>
+                <a:schemeClr val="tx1"/>
+              </a:buClr>
+              <a:buSzPct val="70000"/>
+              <a:buFont typeface="Arial" pitchFamily="34" charset="0"/>
+              <a:buChar char="−"/>
+              <a:defRPr sz="1600">
+                <a:solidFill>
+                  <a:srgbClr val="000000"/>
+                </a:solidFill>
+                <a:latin typeface="+mn-lt"/>
+              </a:defRPr>
+            </a:lvl5pPr>
+            <a:lvl6pPr marL="2230438" indent="-157163" algn="l" rtl="0" fontAlgn="base">
+              <a:spcBef>
+                <a:spcPct val="20000"/>
+              </a:spcBef>
+              <a:spcAft>
+                <a:spcPct val="3000"/>
+              </a:spcAft>
+              <a:buClr>
+                <a:schemeClr val="tx1"/>
+              </a:buClr>
+              <a:buSzPct val="70000"/>
+              <a:buFont typeface="Arial" charset="0"/>
+              <a:buChar char="►"/>
+              <a:defRPr sz="1400">
+                <a:solidFill>
+                  <a:srgbClr val="000000"/>
+                </a:solidFill>
+                <a:latin typeface="+mn-lt"/>
+              </a:defRPr>
+            </a:lvl6pPr>
+            <a:lvl7pPr marL="2687638" indent="-157163" algn="l" rtl="0" fontAlgn="base">
+              <a:spcBef>
+                <a:spcPct val="20000"/>
+              </a:spcBef>
+              <a:spcAft>
+                <a:spcPct val="3000"/>
+              </a:spcAft>
+              <a:buClr>
+                <a:schemeClr val="tx1"/>
+              </a:buClr>
+              <a:buSzPct val="70000"/>
+              <a:buFont typeface="Arial" charset="0"/>
+              <a:buChar char="►"/>
+              <a:defRPr sz="1400">
+                <a:solidFill>
+                  <a:srgbClr val="000000"/>
+                </a:solidFill>
+                <a:latin typeface="+mn-lt"/>
+              </a:defRPr>
+            </a:lvl7pPr>
+            <a:lvl8pPr marL="3144838" indent="-157163" algn="l" rtl="0" fontAlgn="base">
+              <a:spcBef>
+                <a:spcPct val="20000"/>
+              </a:spcBef>
+              <a:spcAft>
+                <a:spcPct val="3000"/>
+              </a:spcAft>
+              <a:buClr>
+                <a:schemeClr val="tx1"/>
+              </a:buClr>
+              <a:buSzPct val="70000"/>
+              <a:buFont typeface="Arial" charset="0"/>
+              <a:buChar char="►"/>
+              <a:defRPr sz="1400">
+                <a:solidFill>
+                  <a:srgbClr val="000000"/>
+                </a:solidFill>
+                <a:latin typeface="+mn-lt"/>
+              </a:defRPr>
+            </a:lvl8pPr>
+            <a:lvl9pPr marL="3602038" indent="-157163" algn="l" rtl="0" fontAlgn="base">
+              <a:spcBef>
+                <a:spcPct val="20000"/>
+              </a:spcBef>
+              <a:spcAft>
+                <a:spcPct val="3000"/>
+              </a:spcAft>
+              <a:buClr>
+                <a:schemeClr val="tx1"/>
+              </a:buClr>
+              <a:buSzPct val="70000"/>
+              <a:buFont typeface="Arial" charset="0"/>
+              <a:buChar char="►"/>
+              <a:defRPr sz="1400">
+                <a:solidFill>
+                  <a:srgbClr val="000000"/>
+                </a:solidFill>
+                <a:latin typeface="+mn-lt"/>
+              </a:defRPr>
+            </a:lvl9pPr>
+          </a:lstStyle>
+          <a:p>
+            <a:pPr marL="0" indent="0">
+              <a:buNone/>
+            </a:pPr>
+            <a:endParaRPr lang="en-US" sz="1600" kern="0" dirty="0"/>
+          </a:p>
+        </p:txBody>
+      </p:sp>
+      <p:sp>
+        <p:nvSpPr>
+          <p:cNvPr id="6" name="TextBox 5">
+            <a:extLst>
+              <a:ext uri="{FF2B5EF4-FFF2-40B4-BE49-F238E27FC236}">
+                <a16:creationId xmlns:a16="http://schemas.microsoft.com/office/drawing/2014/main" id="{1667EC57-0741-413F-82EF-8D4B9F57F101}"/>
+              </a:ext>
+            </a:extLst>
+          </p:cNvPr>
+          <p:cNvSpPr txBox="1"/>
+          <p:nvPr/>
+        </p:nvSpPr>
+        <p:spPr>
+          <a:xfrm>
+            <a:off x="604432" y="1338646"/>
+            <a:ext cx="9279988" cy="914400"/>
+          </a:xfrm>
+          <a:prstGeom prst="rect">
+            <a:avLst/>
+          </a:prstGeom>
+          <a:noFill/>
+        </p:spPr>
+        <p:txBody>
+          <a:bodyPr wrap="none" lIns="91440" tIns="45720" rIns="91440" rtlCol="0" anchor="t">
+            <a:noAutofit/>
+          </a:bodyPr>
+          <a:lstStyle/>
+          <a:p>
+            <a:pPr marL="342900" indent="-342900">
+              <a:buFont typeface="Arial" panose="020B0604020202020204" pitchFamily="34" charset="0"/>
+              <a:buChar char="•"/>
+            </a:pPr>
+            <a:r>
+              <a:rPr lang="en-US" dirty="0">
+                <a:solidFill>
+                  <a:schemeClr val="tx1"/>
+                </a:solidFill>
+              </a:rPr>
+              <a:t>Each custom </a:t>
+            </a:r>
+            <a:r>
+              <a:rPr lang="en-US" dirty="0"/>
+              <a:t>register extends a base class </a:t>
+            </a:r>
+            <a:r>
+              <a:rPr lang="en-US" dirty="0">
+                <a:sym typeface="Wingdings" panose="05000000000000000000" pitchFamily="2" charset="2"/>
+              </a:rPr>
+              <a:t> </a:t>
+            </a:r>
+            <a:r>
+              <a:rPr lang="en-US" dirty="0" err="1"/>
+              <a:t>DebugRegisters</a:t>
+            </a:r>
+            <a:endParaRPr lang="en-US" dirty="0"/>
+          </a:p>
+          <a:p>
+            <a:pPr marL="342900" indent="-342900">
+              <a:buFont typeface="Arial" panose="020B0604020202020204" pitchFamily="34" charset="0"/>
+              <a:buChar char="•"/>
+            </a:pPr>
+            <a:r>
+              <a:rPr lang="en-US" dirty="0"/>
+              <a:t>Populate the “</a:t>
+            </a:r>
+            <a:r>
+              <a:rPr lang="en-US" dirty="0" err="1"/>
+              <a:t>regDesc</a:t>
+            </a:r>
+            <a:r>
+              <a:rPr lang="en-US" dirty="0"/>
+              <a:t>” with an XML format string which contains bit field information.</a:t>
+            </a:r>
+          </a:p>
+          <a:p>
+            <a:pPr marL="342900" indent="-342900">
+              <a:buFont typeface="Arial" panose="020B0604020202020204" pitchFamily="34" charset="0"/>
+              <a:buChar char="•"/>
+            </a:pPr>
+            <a:r>
+              <a:rPr lang="en-US" dirty="0"/>
+              <a:t>Populate “</a:t>
+            </a:r>
+            <a:r>
+              <a:rPr lang="en-US" dirty="0" err="1"/>
+              <a:t>regName</a:t>
+            </a:r>
+            <a:r>
+              <a:rPr lang="en-US" dirty="0"/>
+              <a:t>” field for Register Name.</a:t>
+            </a:r>
+          </a:p>
+          <a:p>
+            <a:pPr marL="342900" indent="-342900">
+              <a:buFont typeface="Arial" panose="020B0604020202020204" pitchFamily="34" charset="0"/>
+              <a:buChar char="•"/>
+            </a:pPr>
+            <a:endParaRPr lang="en-US" dirty="0"/>
+          </a:p>
+          <a:p>
+            <a:pPr marL="342900" indent="-342900">
+              <a:buFont typeface="Arial" panose="020B0604020202020204" pitchFamily="34" charset="0"/>
+              <a:buChar char="•"/>
+            </a:pPr>
+            <a:endParaRPr lang="en-US" dirty="0">
+              <a:solidFill>
+                <a:schemeClr val="tx1"/>
+              </a:solidFill>
+            </a:endParaRPr>
+          </a:p>
+        </p:txBody>
+      </p:sp>
+      <p:pic>
+        <p:nvPicPr>
+          <p:cNvPr id="7" name="Picture 6">
+            <a:extLst>
+              <a:ext uri="{FF2B5EF4-FFF2-40B4-BE49-F238E27FC236}">
+                <a16:creationId xmlns:a16="http://schemas.microsoft.com/office/drawing/2014/main" id="{C8030772-A1AA-4DFD-BEC6-CFEF6942F06B}"/>
+              </a:ext>
+            </a:extLst>
+          </p:cNvPr>
+          <p:cNvPicPr>
+            <a:picLocks noChangeAspect="1"/>
+          </p:cNvPicPr>
+          <p:nvPr/>
+        </p:nvPicPr>
+        <p:blipFill>
+          <a:blip r:embed="rId2"/>
+          <a:stretch>
+            <a:fillRect/>
+          </a:stretch>
+        </p:blipFill>
+        <p:spPr>
+          <a:xfrm>
+            <a:off x="910245" y="2448931"/>
+            <a:ext cx="2200275" cy="2895600"/>
+          </a:xfrm>
+          <a:prstGeom prst="rect">
+            <a:avLst/>
+          </a:prstGeom>
+          <a:effectLst>
+            <a:glow rad="139700">
+              <a:schemeClr val="accent4">
+                <a:satMod val="175000"/>
+                <a:alpha val="40000"/>
+              </a:schemeClr>
+            </a:glow>
+          </a:effectLst>
+        </p:spPr>
+      </p:pic>
+      <p:pic>
+        <p:nvPicPr>
+          <p:cNvPr id="8" name="Picture 7">
+            <a:extLst>
+              <a:ext uri="{FF2B5EF4-FFF2-40B4-BE49-F238E27FC236}">
+                <a16:creationId xmlns:a16="http://schemas.microsoft.com/office/drawing/2014/main" id="{0E7A0151-DB56-43E4-A63F-0BE5DCE7A4E9}"/>
+              </a:ext>
+            </a:extLst>
+          </p:cNvPr>
+          <p:cNvPicPr>
+            <a:picLocks noChangeAspect="1"/>
+          </p:cNvPicPr>
+          <p:nvPr/>
+        </p:nvPicPr>
+        <p:blipFill>
+          <a:blip r:embed="rId3"/>
+          <a:stretch>
+            <a:fillRect/>
+          </a:stretch>
+        </p:blipFill>
+        <p:spPr>
+          <a:xfrm>
+            <a:off x="4214305" y="2448931"/>
+            <a:ext cx="6915150" cy="3248025"/>
+          </a:xfrm>
+          <a:prstGeom prst="rect">
+            <a:avLst/>
+          </a:prstGeom>
+          <a:effectLst>
+            <a:glow rad="139700">
+              <a:schemeClr val="accent4">
+                <a:satMod val="175000"/>
+                <a:alpha val="40000"/>
+              </a:schemeClr>
+            </a:glow>
+          </a:effectLst>
+        </p:spPr>
+      </p:pic>
+    </p:spTree>
+    <p:extLst>
+      <p:ext uri="{BB962C8B-B14F-4D97-AF65-F5344CB8AC3E}">
+        <p14:creationId xmlns:p14="http://schemas.microsoft.com/office/powerpoint/2010/main" val="4123247889"/>
+      </p:ext>
+    </p:extLst>
+  </p:cSld>
+  <p:clrMapOvr>
+    <a:masterClrMapping/>
+  </p:clrMapOvr>
+  <p:transition>
+    <p:fade/>
+  </p:transition>
+</p:sld>
+</file>
+
+<file path=ppt/slides/slide13.xml><?xml version="1.0" encoding="utf-8"?>
+<p:sld xmlns:a="http://schemas.openxmlformats.org/drawingml/2006/main" xmlns:r="http://schemas.openxmlformats.org/officeDocument/2006/relationships" xmlns:p="http://schemas.openxmlformats.org/presentationml/2006/main">
+  <p:cSld>
+    <p:bg>
+      <p:bgPr>
+        <a:solidFill>
+          <a:schemeClr val="bg1"/>
+        </a:solidFill>
+        <a:effectLst/>
+      </p:bgPr>
+    </p:bg>
+    <p:spTree>
+      <p:nvGrpSpPr>
+        <p:cNvPr id="1" name=""/>
+        <p:cNvGrpSpPr/>
+        <p:nvPr/>
+      </p:nvGrpSpPr>
+      <p:grpSpPr>
+        <a:xfrm>
+          <a:off x="0" y="0"/>
+          <a:ext cx="0" cy="0"/>
+          <a:chOff x="0" y="0"/>
+          <a:chExt cx="0" cy="0"/>
+        </a:xfrm>
+      </p:grpSpPr>
+      <p:sp>
+        <p:nvSpPr>
+          <p:cNvPr id="4" name="Text Placeholder 3">
+            <a:extLst>
+              <a:ext uri="{FF2B5EF4-FFF2-40B4-BE49-F238E27FC236}">
+                <a16:creationId xmlns:a16="http://schemas.microsoft.com/office/drawing/2014/main" id="{6F256A01-4AA8-439A-837A-571E043AA08F}"/>
+              </a:ext>
+            </a:extLst>
+          </p:cNvPr>
+          <p:cNvSpPr>
+            <a:spLocks noGrp="1"/>
+          </p:cNvSpPr>
+          <p:nvPr>
+            <p:ph type="body" sz="quarter" idx="10"/>
+          </p:nvPr>
+        </p:nvSpPr>
+        <p:spPr>
+          <a:xfrm>
+            <a:off x="701040" y="532891"/>
+            <a:ext cx="9086772" cy="520310"/>
+          </a:xfrm>
+        </p:spPr>
+        <p:txBody>
+          <a:bodyPr>
             <a:normAutofit fontScale="92500" lnSpcReduction="10000"/>
           </a:bodyPr>
           <a:lstStyle/>
@@ -43319,7 +44268,7 @@
           <p:nvPr/>
         </p:nvPicPr>
         <p:blipFill>
-          <a:blip r:embed="rId2"/>
+          <a:blip r:embed="rId3"/>
           <a:stretch>
             <a:fillRect/>
           </a:stretch>
@@ -43332,6 +44281,14 @@
           <a:prstGeom prst="rect">
             <a:avLst/>
           </a:prstGeom>
+          <a:effectLst>
+            <a:glow rad="139700">
+              <a:schemeClr val="accent4">
+                <a:satMod val="175000"/>
+                <a:alpha val="40000"/>
+              </a:schemeClr>
+            </a:glow>
+          </a:effectLst>
         </p:spPr>
       </p:pic>
       <p:pic>
@@ -43349,7 +44306,7 @@
           <p:nvPr/>
         </p:nvPicPr>
         <p:blipFill>
-          <a:blip r:embed="rId3"/>
+          <a:blip r:embed="rId4"/>
           <a:stretch>
             <a:fillRect/>
           </a:stretch>
@@ -43362,6 +44319,14 @@
           <a:prstGeom prst="rect">
             <a:avLst/>
           </a:prstGeom>
+          <a:effectLst>
+            <a:glow rad="139700">
+              <a:schemeClr val="accent4">
+                <a:satMod val="175000"/>
+                <a:alpha val="40000"/>
+              </a:schemeClr>
+            </a:glow>
+          </a:effectLst>
         </p:spPr>
       </p:pic>
       <p:pic>
@@ -43379,7 +44344,7 @@
           <p:nvPr/>
         </p:nvPicPr>
         <p:blipFill>
-          <a:blip r:embed="rId4"/>
+          <a:blip r:embed="rId5"/>
           <a:stretch>
             <a:fillRect/>
           </a:stretch>
@@ -43392,6 +44357,14 @@
           <a:prstGeom prst="rect">
             <a:avLst/>
           </a:prstGeom>
+          <a:effectLst>
+            <a:glow rad="139700">
+              <a:schemeClr val="accent4">
+                <a:satMod val="175000"/>
+                <a:alpha val="40000"/>
+              </a:schemeClr>
+            </a:glow>
+          </a:effectLst>
         </p:spPr>
       </p:pic>
       <p:pic>
@@ -43409,25 +44382,137 @@
           <p:nvPr/>
         </p:nvPicPr>
         <p:blipFill>
-          <a:blip r:embed="rId5"/>
+          <a:blip r:embed="rId6"/>
           <a:stretch>
             <a:fillRect/>
           </a:stretch>
         </p:blipFill>
         <p:spPr>
           <a:xfrm>
-            <a:off x="8780608" y="2646095"/>
+            <a:off x="8673142" y="2646095"/>
             <a:ext cx="3306810" cy="3973730"/>
           </a:xfrm>
           <a:prstGeom prst="rect">
             <a:avLst/>
           </a:prstGeom>
+          <a:effectLst>
+            <a:glow rad="139700">
+              <a:schemeClr val="accent4">
+                <a:satMod val="175000"/>
+                <a:alpha val="40000"/>
+              </a:schemeClr>
+            </a:glow>
+          </a:effectLst>
         </p:spPr>
       </p:pic>
     </p:spTree>
     <p:extLst>
       <p:ext uri="{BB962C8B-B14F-4D97-AF65-F5344CB8AC3E}">
         <p14:creationId xmlns:p14="http://schemas.microsoft.com/office/powerpoint/2010/main" val="666092373"/>
+      </p:ext>
+    </p:extLst>
+  </p:cSld>
+  <p:clrMapOvr>
+    <a:overrideClrMapping bg1="lt1" tx1="dk1" bg2="lt2" tx2="dk2" accent1="accent1" accent2="accent2" accent3="accent3" accent4="accent4" accent5="accent5" accent6="accent6" hlink="hlink" folHlink="folHlink"/>
+  </p:clrMapOvr>
+  <p:transition>
+    <p:fade/>
+  </p:transition>
+</p:sld>
+</file>
+
+<file path=ppt/slides/slide14.xml><?xml version="1.0" encoding="utf-8"?>
+<p:sld xmlns:a="http://schemas.openxmlformats.org/drawingml/2006/main" xmlns:r="http://schemas.openxmlformats.org/officeDocument/2006/relationships" xmlns:p="http://schemas.openxmlformats.org/presentationml/2006/main">
+  <p:cSld>
+    <p:spTree>
+      <p:nvGrpSpPr>
+        <p:cNvPr id="1" name=""/>
+        <p:cNvGrpSpPr/>
+        <p:nvPr/>
+      </p:nvGrpSpPr>
+      <p:grpSpPr>
+        <a:xfrm>
+          <a:off x="0" y="0"/>
+          <a:ext cx="0" cy="0"/>
+          <a:chOff x="0" y="0"/>
+          <a:chExt cx="0" cy="0"/>
+        </a:xfrm>
+      </p:grpSpPr>
+      <p:sp>
+        <p:nvSpPr>
+          <p:cNvPr id="2" name="Title 1">
+            <a:extLst>
+              <a:ext uri="{FF2B5EF4-FFF2-40B4-BE49-F238E27FC236}">
+                <a16:creationId xmlns:a16="http://schemas.microsoft.com/office/drawing/2014/main" id="{E77BF3AA-E3F1-4021-899D-7275E78EF2B4}"/>
+              </a:ext>
+            </a:extLst>
+          </p:cNvPr>
+          <p:cNvSpPr>
+            <a:spLocks noGrp="1"/>
+          </p:cNvSpPr>
+          <p:nvPr>
+            <p:ph type="title"/>
+          </p:nvPr>
+        </p:nvSpPr>
+        <p:spPr/>
+        <p:txBody>
+          <a:bodyPr/>
+          <a:lstStyle/>
+          <a:p>
+            <a:r>
+              <a:rPr lang="en-US" dirty="0"/>
+              <a:t>Known Issues</a:t>
+            </a:r>
+          </a:p>
+        </p:txBody>
+      </p:sp>
+      <p:sp>
+        <p:nvSpPr>
+          <p:cNvPr id="3" name="Text Placeholder 2">
+            <a:extLst>
+              <a:ext uri="{FF2B5EF4-FFF2-40B4-BE49-F238E27FC236}">
+                <a16:creationId xmlns:a16="http://schemas.microsoft.com/office/drawing/2014/main" id="{338F14F7-0A44-469F-8EB6-2ED9B36B7DE2}"/>
+              </a:ext>
+            </a:extLst>
+          </p:cNvPr>
+          <p:cNvSpPr>
+            <a:spLocks noGrp="1"/>
+          </p:cNvSpPr>
+          <p:nvPr>
+            <p:ph type="body" sz="quarter" idx="10"/>
+          </p:nvPr>
+        </p:nvSpPr>
+        <p:spPr>
+          <a:xfrm>
+            <a:off x="299522" y="1074188"/>
+            <a:ext cx="11663023" cy="4667249"/>
+          </a:xfrm>
+        </p:spPr>
+        <p:txBody>
+          <a:bodyPr>
+            <a:normAutofit/>
+          </a:bodyPr>
+          <a:lstStyle/>
+          <a:p>
+            <a:r>
+              <a:rPr lang="en-US" sz="1800" dirty="0"/>
+              <a:t>Register </a:t>
+            </a:r>
+            <a:r>
+              <a:rPr lang="en-US" sz="1800" dirty="0" err="1"/>
+              <a:t>Endianess</a:t>
+            </a:r>
+            <a:r>
+              <a:rPr lang="en-US" sz="1800" dirty="0"/>
+              <a:t> check not yet implemented. (Assumption : ARM &amp; IP Registers are programmed - Little Endian)</a:t>
+            </a:r>
+          </a:p>
+        </p:txBody>
+      </p:sp>
+    </p:spTree>
+    <p:extLst>
+      <p:ext uri="{BB962C8B-B14F-4D97-AF65-F5344CB8AC3E}">
+        <p14:creationId xmlns:p14="http://schemas.microsoft.com/office/powerpoint/2010/main" val="428277801"/>
       </p:ext>
     </p:extLst>
   </p:cSld>
@@ -43440,7 +44525,7 @@
 </p:sld>
 </file>
 
-<file path=ppt/slides/slide12.xml><?xml version="1.0" encoding="utf-8"?>
+<file path=ppt/slides/slide15.xml><?xml version="1.0" encoding="utf-8"?>
 <p:sld xmlns:a="http://schemas.openxmlformats.org/drawingml/2006/main" xmlns:r="http://schemas.openxmlformats.org/officeDocument/2006/relationships" xmlns:p="http://schemas.openxmlformats.org/presentationml/2006/main">
   <p:cSld>
     <p:spTree>
@@ -43923,7 +45008,7 @@
 </p:sld>
 </file>
 
-<file path=ppt/slides/slide13.xml><?xml version="1.0" encoding="utf-8"?>
+<file path=ppt/slides/slide16.xml><?xml version="1.0" encoding="utf-8"?>
 <p:sld xmlns:a="http://schemas.openxmlformats.org/drawingml/2006/main" xmlns:r="http://schemas.openxmlformats.org/officeDocument/2006/relationships" xmlns:p="http://schemas.openxmlformats.org/presentationml/2006/main">
   <p:cSld>
     <p:spTree>
@@ -48634,6 +49719,8 @@
               <a:rPr lang="en-US" sz="1200" b="1" dirty="0"/>
               <a:t>Choose Dump File</a:t>
             </a:r>
+          </a:p>
+          <a:p>
             <a:r>
               <a:rPr lang="en-US" sz="1200" b="1" dirty="0">
                 <a:solidFill>
@@ -48642,6 +49729,37 @@
               </a:rPr>
               <a:t> </a:t>
             </a:r>
+          </a:p>
+          <a:p>
+            <a:r>
+              <a:rPr lang="en-US" sz="1200" b="1" dirty="0" err="1"/>
+              <a:t>RegAdd,Value</a:t>
+            </a:r>
+            <a:r>
+              <a:rPr lang="en-US" sz="1200" b="1" dirty="0"/>
+              <a:t> pair</a:t>
+            </a:r>
+          </a:p>
+          <a:p>
+            <a:r>
+              <a:rPr lang="en-US" sz="1200" b="1" dirty="0">
+                <a:solidFill>
+                  <a:schemeClr val="tx1"/>
+                </a:solidFill>
+              </a:rPr>
+              <a:t>Or</a:t>
+            </a:r>
+          </a:p>
+          <a:p>
+            <a:r>
+              <a:rPr lang="en-US" sz="1200" b="1" dirty="0"/>
+              <a:t>CW generated XML file</a:t>
+            </a:r>
+            <a:endParaRPr lang="en-US" sz="1200" b="1" dirty="0">
+              <a:solidFill>
+                <a:schemeClr val="tx1"/>
+              </a:solidFill>
+            </a:endParaRPr>
           </a:p>
         </p:txBody>
       </p:sp>
@@ -50694,6 +51812,49 @@
 </a:theme>
 </file>
 
+<file path=ppt/theme/themeOverride1.xml><?xml version="1.0" encoding="utf-8"?>
+<a:themeOverride xmlns:a="http://schemas.openxmlformats.org/drawingml/2006/main">
+  <a:clrScheme name="Custom 42">
+    <a:dk1>
+      <a:srgbClr val="000000"/>
+    </a:dk1>
+    <a:lt1>
+      <a:sysClr val="window" lastClr="FFFFFF"/>
+    </a:lt1>
+    <a:dk2>
+      <a:srgbClr val="969696"/>
+    </a:dk2>
+    <a:lt2>
+      <a:srgbClr val="FFFFFF"/>
+    </a:lt2>
+    <a:accent1>
+      <a:srgbClr val="7BB1DB"/>
+    </a:accent1>
+    <a:accent2>
+      <a:srgbClr val="F9B500"/>
+    </a:accent2>
+    <a:accent3>
+      <a:srgbClr val="C9D200"/>
+    </a:accent3>
+    <a:accent4>
+      <a:srgbClr val="D54E12"/>
+    </a:accent4>
+    <a:accent5>
+      <a:srgbClr val="A40044"/>
+    </a:accent5>
+    <a:accent6>
+      <a:srgbClr val="979200"/>
+    </a:accent6>
+    <a:hlink>
+      <a:srgbClr val="3789C8"/>
+    </a:hlink>
+    <a:folHlink>
+      <a:srgbClr val="9ED3CA"/>
+    </a:folHlink>
+  </a:clrScheme>
+</a:themeOverride>
+</file>
+
 <file path=customXml/item1.xml><?xml version="1.0" encoding="utf-8"?>
 <?mso-contentType ?>
 <spe:Receivers xmlns:spe="http://schemas.microsoft.com/sharepoint/events">

</xml_diff>

<commit_message>
SP_ELx implementation done. Automatic detection of NPI from Log files generated from CW dump
</commit_message>
<xml_diff>
--- a/demo_artifacts/DOG-DebugOnGo.pptx
+++ b/demo_artifacts/DOG-DebugOnGo.pptx
@@ -277,7 +277,7 @@
                 </a:solidFill>
               </a:rPr>
               <a:pPr algn="l"/>
-              <a:t>5/28/2018 11:50:00 AM</a:t>
+              <a:t>5/29/2018 11:19:24 AM</a:t>
             </a:fld>
             <a:endParaRPr lang="en-US" sz="900">
               <a:solidFill>
@@ -1538,7 +1538,7 @@
                 </a:solidFill>
               </a:rPr>
               <a:pPr algn="l"/>
-              <a:t>5/28/2018 11:49:03 AM</a:t>
+              <a:t>5/29/2018 11:19:11 AM</a:t>
             </a:fld>
             <a:endParaRPr lang="en-US" sz="900">
               <a:solidFill>
@@ -30417,7 +30417,7 @@
             <a:fld id="{3BDFDD5F-E85B-4DA3-A4F9-9CF3C7409943}" type="datetime4">
               <a:rPr lang="en-US" smtClean="0"/>
               <a:pPr/>
-              <a:t>May 28, 2018</a:t>
+              <a:t>May 29, 2018</a:t>
             </a:fld>
             <a:endParaRPr lang="en-US"/>
           </a:p>
@@ -44507,8 +44507,52 @@
               <a:t> check not yet implemented. (Assumption : ARM &amp; IP Registers are programmed - Little Endian)</a:t>
             </a:r>
           </a:p>
+          <a:p>
+            <a:r>
+              <a:rPr lang="en-US" sz="1800" dirty="0"/>
+              <a:t>Few Register addresses are duplicate in CodeWarrior DB. Due to which multiple entries are listed for same register addresses. (Possible Bug in CW DB …Need to check with CW team??) </a:t>
+            </a:r>
+          </a:p>
         </p:txBody>
       </p:sp>
+      <p:pic>
+        <p:nvPicPr>
+          <p:cNvPr id="4" name="Picture 3">
+            <a:extLst>
+              <a:ext uri="{FF2B5EF4-FFF2-40B4-BE49-F238E27FC236}">
+                <a16:creationId xmlns:a16="http://schemas.microsoft.com/office/drawing/2014/main" id="{BC484943-82B4-4BE4-A4A9-34EF253DD854}"/>
+              </a:ext>
+            </a:extLst>
+          </p:cNvPr>
+          <p:cNvPicPr>
+            <a:picLocks noChangeAspect="1"/>
+          </p:cNvPicPr>
+          <p:nvPr/>
+        </p:nvPicPr>
+        <p:blipFill>
+          <a:blip r:embed="rId2"/>
+          <a:stretch>
+            <a:fillRect/>
+          </a:stretch>
+        </p:blipFill>
+        <p:spPr>
+          <a:xfrm>
+            <a:off x="886408" y="2482108"/>
+            <a:ext cx="10291665" cy="2848247"/>
+          </a:xfrm>
+          <a:prstGeom prst="rect">
+            <a:avLst/>
+          </a:prstGeom>
+          <a:effectLst>
+            <a:glow rad="139700">
+              <a:schemeClr val="accent4">
+                <a:satMod val="175000"/>
+                <a:alpha val="40000"/>
+              </a:schemeClr>
+            </a:glow>
+          </a:effectLst>
+        </p:spPr>
+      </p:pic>
     </p:spTree>
     <p:extLst>
       <p:ext uri="{BB962C8B-B14F-4D97-AF65-F5344CB8AC3E}">
@@ -51856,53 +51900,138 @@
 </file>
 
 <file path=customXml/item1.xml><?xml version="1.0" encoding="utf-8"?>
-<?mso-contentType ?>
-<spe:Receivers xmlns:spe="http://schemas.microsoft.com/sharepoint/events">
-  <Receiver>
-    <Name>Document ID Generator</Name>
-    <Synchronization>Synchronous</Synchronization>
-    <Type>10001</Type>
-    <SequenceNumber>1000</SequenceNumber>
-    <Url/>
-    <Assembly>Microsoft.Office.DocumentManagement, Version=16.0.0.0, Culture=neutral, PublicKeyToken=71e9bce111e9429c</Assembly>
-    <Class>Microsoft.Office.DocumentManagement.Internal.DocIdHandler</Class>
-    <Data/>
-    <Filter/>
-  </Receiver>
-  <Receiver>
-    <Name>Document ID Generator</Name>
-    <Synchronization>Synchronous</Synchronization>
-    <Type>10002</Type>
-    <SequenceNumber>1001</SequenceNumber>
-    <Url/>
-    <Assembly>Microsoft.Office.DocumentManagement, Version=16.0.0.0, Culture=neutral, PublicKeyToken=71e9bce111e9429c</Assembly>
-    <Class>Microsoft.Office.DocumentManagement.Internal.DocIdHandler</Class>
-    <Data/>
-    <Filter/>
-  </Receiver>
-  <Receiver>
-    <Name>Document ID Generator</Name>
-    <Synchronization>Synchronous</Synchronization>
-    <Type>10004</Type>
-    <SequenceNumber>1002</SequenceNumber>
-    <Url/>
-    <Assembly>Microsoft.Office.DocumentManagement, Version=16.0.0.0, Culture=neutral, PublicKeyToken=71e9bce111e9429c</Assembly>
-    <Class>Microsoft.Office.DocumentManagement.Internal.DocIdHandler</Class>
-    <Data/>
-    <Filter/>
-  </Receiver>
-  <Receiver>
-    <Name>Document ID Generator</Name>
-    <Synchronization>Synchronous</Synchronization>
-    <Type>10006</Type>
-    <SequenceNumber>1003</SequenceNumber>
-    <Url/>
-    <Assembly>Microsoft.Office.DocumentManagement, Version=16.0.0.0, Culture=neutral, PublicKeyToken=71e9bce111e9429c</Assembly>
-    <Class>Microsoft.Office.DocumentManagement.Internal.DocIdHandler</Class>
-    <Data/>
-    <Filter/>
-  </Receiver>
-</spe:Receivers>
+<p:properties xmlns:p="http://schemas.microsoft.com/office/2006/metadata/properties" xmlns:xsi="http://www.w3.org/2001/XMLSchema-instance" xmlns:pc="http://schemas.microsoft.com/office/infopath/2007/PartnerControls">
+  <documentManagement>
+    <_dlc_DocId xmlns="e5a3a747-d21f-491f-b559-719a372e993f">52MFTYTJJKHE-686160917-653</_dlc_DocId>
+    <_dlc_DocIdUrl xmlns="e5a3a747-d21f-491f-b559-719a372e993f">
+      <Url>https://nxp1.sharepoint.com/sites/dngpm/PMO/Active_NPIs/LS1012A/_layouts/15/DocIdRedir.aspx?ID=52MFTYTJJKHE-686160917-653</Url>
+      <Description>52MFTYTJJKHE-686160917-653</Description>
+    </_dlc_DocIdUrl>
+    <SharedWithUsers xmlns="e5a3a747-d21f-491f-b559-719a372e993f">
+      <UserInfo>
+        <DisplayName>Cynthia Fu</DisplayName>
+        <AccountId>184</AccountId>
+        <AccountType/>
+      </UserInfo>
+      <UserInfo>
+        <DisplayName>Mircea Ionita</DisplayName>
+        <AccountId>248</AccountId>
+        <AccountType/>
+      </UserInfo>
+      <UserInfo>
+        <DisplayName>Bogdan Vlad</DisplayName>
+        <AccountId>196</AccountId>
+        <AccountType/>
+      </UserInfo>
+      <UserInfo>
+        <DisplayName>George Stefan</DisplayName>
+        <AccountId>157</AccountId>
+        <AccountType/>
+      </UserInfo>
+      <UserInfo>
+        <DisplayName>Sebastian Grigore</DisplayName>
+        <AccountId>186</AccountId>
+        <AccountType/>
+      </UserInfo>
+      <UserInfo>
+        <DisplayName>Ravi Kanth Reddy P</DisplayName>
+        <AccountId>85</AccountId>
+        <AccountType/>
+      </UserInfo>
+      <UserInfo>
+        <DisplayName>Sarat Vetcha</DisplayName>
+        <AccountId>86</AccountId>
+        <AccountType/>
+      </UserInfo>
+      <UserInfo>
+        <DisplayName>Mircea Pop</DisplayName>
+        <AccountId>94</AccountId>
+        <AccountType/>
+      </UserInfo>
+      <UserInfo>
+        <DisplayName>Adrienne Suner</DisplayName>
+        <AccountId>1368</AccountId>
+        <AccountType/>
+      </UserInfo>
+      <UserInfo>
+        <DisplayName>Rajan Gupta</DisplayName>
+        <AccountId>21</AccountId>
+        <AccountType/>
+      </UserInfo>
+      <UserInfo>
+        <DisplayName>Ruchika Gupta</DisplayName>
+        <AccountId>148</AccountId>
+        <AccountType/>
+      </UserInfo>
+      <UserInfo>
+        <DisplayName>Jaiprakash Singh</DisplayName>
+        <AccountId>225</AccountId>
+        <AccountType/>
+      </UserInfo>
+      <UserInfo>
+        <DisplayName>Jaswinder Singh</DisplayName>
+        <AccountId>245</AccountId>
+        <AccountType/>
+      </UserInfo>
+      <UserInfo>
+        <DisplayName>Varun Sethi</DisplayName>
+        <AccountId>192</AccountId>
+        <AccountType/>
+      </UserInfo>
+      <UserInfo>
+        <DisplayName>SunilKumar Gupta</DisplayName>
+        <AccountId>198</AccountId>
+        <AccountType/>
+      </UserInfo>
+      <UserInfo>
+        <DisplayName>Iuliana Bratu</DisplayName>
+        <AccountId>256</AccountId>
+        <AccountType/>
+      </UserInfo>
+      <UserInfo>
+        <DisplayName>Bogdan Costinescu</DisplayName>
+        <AccountId>51</AccountId>
+        <AccountType/>
+      </UserInfo>
+      <UserInfo>
+        <DisplayName>Rajan Srivastava</DisplayName>
+        <AccountId>254</AccountId>
+        <AccountType/>
+      </UserInfo>
+      <UserInfo>
+        <DisplayName>Priyanka Jain</DisplayName>
+        <AccountId>595</AccountId>
+        <AccountType/>
+      </UserInfo>
+      <UserInfo>
+        <DisplayName>Harninder Rai</DisplayName>
+        <AccountId>199</AccountId>
+        <AccountType/>
+      </UserInfo>
+      <UserInfo>
+        <DisplayName>Bhaskar U</DisplayName>
+        <AccountId>1347</AccountId>
+        <AccountType/>
+      </UserInfo>
+      <UserInfo>
+        <DisplayName>Prabhakar Kushwaha</DisplayName>
+        <AccountId>601</AccountId>
+        <AccountType/>
+      </UserInfo>
+      <UserInfo>
+        <DisplayName>Ashish Kumar</DisplayName>
+        <AccountId>328</AccountId>
+        <AccountType/>
+      </UserInfo>
+      <UserInfo>
+        <DisplayName>Rajesh Bhagat</DisplayName>
+        <AccountId>600</AccountId>
+        <AccountType/>
+      </UserInfo>
+    </SharedWithUsers>
+    <Meeting_x0020_Date xmlns="a2f770b2-dfa2-4887-b142-27fb0960f078">2017-05-08T13:03:54+00:00</Meeting_x0020_Date>
+  </documentManagement>
+</p:properties>
 </file>
 
 <file path=customXml/item2.xml><?xml version="1.0" encoding="utf-8"?>
@@ -52104,138 +52233,53 @@
 </file>
 
 <file path=customXml/item3.xml><?xml version="1.0" encoding="utf-8"?>
-<p:properties xmlns:p="http://schemas.microsoft.com/office/2006/metadata/properties" xmlns:xsi="http://www.w3.org/2001/XMLSchema-instance" xmlns:pc="http://schemas.microsoft.com/office/infopath/2007/PartnerControls">
-  <documentManagement>
-    <_dlc_DocId xmlns="e5a3a747-d21f-491f-b559-719a372e993f">52MFTYTJJKHE-686160917-653</_dlc_DocId>
-    <_dlc_DocIdUrl xmlns="e5a3a747-d21f-491f-b559-719a372e993f">
-      <Url>https://nxp1.sharepoint.com/sites/dngpm/PMO/Active_NPIs/LS1012A/_layouts/15/DocIdRedir.aspx?ID=52MFTYTJJKHE-686160917-653</Url>
-      <Description>52MFTYTJJKHE-686160917-653</Description>
-    </_dlc_DocIdUrl>
-    <SharedWithUsers xmlns="e5a3a747-d21f-491f-b559-719a372e993f">
-      <UserInfo>
-        <DisplayName>Cynthia Fu</DisplayName>
-        <AccountId>184</AccountId>
-        <AccountType/>
-      </UserInfo>
-      <UserInfo>
-        <DisplayName>Mircea Ionita</DisplayName>
-        <AccountId>248</AccountId>
-        <AccountType/>
-      </UserInfo>
-      <UserInfo>
-        <DisplayName>Bogdan Vlad</DisplayName>
-        <AccountId>196</AccountId>
-        <AccountType/>
-      </UserInfo>
-      <UserInfo>
-        <DisplayName>George Stefan</DisplayName>
-        <AccountId>157</AccountId>
-        <AccountType/>
-      </UserInfo>
-      <UserInfo>
-        <DisplayName>Sebastian Grigore</DisplayName>
-        <AccountId>186</AccountId>
-        <AccountType/>
-      </UserInfo>
-      <UserInfo>
-        <DisplayName>Ravi Kanth Reddy P</DisplayName>
-        <AccountId>85</AccountId>
-        <AccountType/>
-      </UserInfo>
-      <UserInfo>
-        <DisplayName>Sarat Vetcha</DisplayName>
-        <AccountId>86</AccountId>
-        <AccountType/>
-      </UserInfo>
-      <UserInfo>
-        <DisplayName>Mircea Pop</DisplayName>
-        <AccountId>94</AccountId>
-        <AccountType/>
-      </UserInfo>
-      <UserInfo>
-        <DisplayName>Adrienne Suner</DisplayName>
-        <AccountId>1368</AccountId>
-        <AccountType/>
-      </UserInfo>
-      <UserInfo>
-        <DisplayName>Rajan Gupta</DisplayName>
-        <AccountId>21</AccountId>
-        <AccountType/>
-      </UserInfo>
-      <UserInfo>
-        <DisplayName>Ruchika Gupta</DisplayName>
-        <AccountId>148</AccountId>
-        <AccountType/>
-      </UserInfo>
-      <UserInfo>
-        <DisplayName>Jaiprakash Singh</DisplayName>
-        <AccountId>225</AccountId>
-        <AccountType/>
-      </UserInfo>
-      <UserInfo>
-        <DisplayName>Jaswinder Singh</DisplayName>
-        <AccountId>245</AccountId>
-        <AccountType/>
-      </UserInfo>
-      <UserInfo>
-        <DisplayName>Varun Sethi</DisplayName>
-        <AccountId>192</AccountId>
-        <AccountType/>
-      </UserInfo>
-      <UserInfo>
-        <DisplayName>SunilKumar Gupta</DisplayName>
-        <AccountId>198</AccountId>
-        <AccountType/>
-      </UserInfo>
-      <UserInfo>
-        <DisplayName>Iuliana Bratu</DisplayName>
-        <AccountId>256</AccountId>
-        <AccountType/>
-      </UserInfo>
-      <UserInfo>
-        <DisplayName>Bogdan Costinescu</DisplayName>
-        <AccountId>51</AccountId>
-        <AccountType/>
-      </UserInfo>
-      <UserInfo>
-        <DisplayName>Rajan Srivastava</DisplayName>
-        <AccountId>254</AccountId>
-        <AccountType/>
-      </UserInfo>
-      <UserInfo>
-        <DisplayName>Priyanka Jain</DisplayName>
-        <AccountId>595</AccountId>
-        <AccountType/>
-      </UserInfo>
-      <UserInfo>
-        <DisplayName>Harninder Rai</DisplayName>
-        <AccountId>199</AccountId>
-        <AccountType/>
-      </UserInfo>
-      <UserInfo>
-        <DisplayName>Bhaskar U</DisplayName>
-        <AccountId>1347</AccountId>
-        <AccountType/>
-      </UserInfo>
-      <UserInfo>
-        <DisplayName>Prabhakar Kushwaha</DisplayName>
-        <AccountId>601</AccountId>
-        <AccountType/>
-      </UserInfo>
-      <UserInfo>
-        <DisplayName>Ashish Kumar</DisplayName>
-        <AccountId>328</AccountId>
-        <AccountType/>
-      </UserInfo>
-      <UserInfo>
-        <DisplayName>Rajesh Bhagat</DisplayName>
-        <AccountId>600</AccountId>
-        <AccountType/>
-      </UserInfo>
-    </SharedWithUsers>
-    <Meeting_x0020_Date xmlns="a2f770b2-dfa2-4887-b142-27fb0960f078">2017-05-08T13:03:54+00:00</Meeting_x0020_Date>
-  </documentManagement>
-</p:properties>
+<?mso-contentType ?>
+<spe:Receivers xmlns:spe="http://schemas.microsoft.com/sharepoint/events">
+  <Receiver>
+    <Name>Document ID Generator</Name>
+    <Synchronization>Synchronous</Synchronization>
+    <Type>10001</Type>
+    <SequenceNumber>1000</SequenceNumber>
+    <Url/>
+    <Assembly>Microsoft.Office.DocumentManagement, Version=16.0.0.0, Culture=neutral, PublicKeyToken=71e9bce111e9429c</Assembly>
+    <Class>Microsoft.Office.DocumentManagement.Internal.DocIdHandler</Class>
+    <Data/>
+    <Filter/>
+  </Receiver>
+  <Receiver>
+    <Name>Document ID Generator</Name>
+    <Synchronization>Synchronous</Synchronization>
+    <Type>10002</Type>
+    <SequenceNumber>1001</SequenceNumber>
+    <Url/>
+    <Assembly>Microsoft.Office.DocumentManagement, Version=16.0.0.0, Culture=neutral, PublicKeyToken=71e9bce111e9429c</Assembly>
+    <Class>Microsoft.Office.DocumentManagement.Internal.DocIdHandler</Class>
+    <Data/>
+    <Filter/>
+  </Receiver>
+  <Receiver>
+    <Name>Document ID Generator</Name>
+    <Synchronization>Synchronous</Synchronization>
+    <Type>10004</Type>
+    <SequenceNumber>1002</SequenceNumber>
+    <Url/>
+    <Assembly>Microsoft.Office.DocumentManagement, Version=16.0.0.0, Culture=neutral, PublicKeyToken=71e9bce111e9429c</Assembly>
+    <Class>Microsoft.Office.DocumentManagement.Internal.DocIdHandler</Class>
+    <Data/>
+    <Filter/>
+  </Receiver>
+  <Receiver>
+    <Name>Document ID Generator</Name>
+    <Synchronization>Synchronous</Synchronization>
+    <Type>10006</Type>
+    <SequenceNumber>1003</SequenceNumber>
+    <Url/>
+    <Assembly>Microsoft.Office.DocumentManagement, Version=16.0.0.0, Culture=neutral, PublicKeyToken=71e9bce111e9429c</Assembly>
+    <Class>Microsoft.Office.DocumentManagement.Internal.DocIdHandler</Class>
+    <Data/>
+    <Filter/>
+  </Receiver>
+</spe:Receivers>
 </file>
 
 <file path=customXml/item4.xml><?xml version="1.0" encoding="utf-8"?>
@@ -52248,9 +52292,18 @@
 </file>
 
 <file path=customXml/itemProps1.xml><?xml version="1.0" encoding="utf-8"?>
-<ds:datastoreItem xmlns:ds="http://schemas.openxmlformats.org/officeDocument/2006/customXml" ds:itemID="{69A0E0BA-4C2A-440E-B218-2F3845E4EC86}">
+<ds:datastoreItem xmlns:ds="http://schemas.openxmlformats.org/officeDocument/2006/customXml" ds:itemID="{21D23866-845B-4BD2-A441-572A2E164D66}">
   <ds:schemaRefs>
-    <ds:schemaRef ds:uri="http://schemas.microsoft.com/sharepoint/events"/>
+    <ds:schemaRef ds:uri="http://purl.org/dc/terms/"/>
+    <ds:schemaRef ds:uri="http://schemas.microsoft.com/office/2006/metadata/properties"/>
+    <ds:schemaRef ds:uri="http://schemas.microsoft.com/office/2006/documentManagement/types"/>
+    <ds:schemaRef ds:uri="a2f770b2-dfa2-4887-b142-27fb0960f078"/>
+    <ds:schemaRef ds:uri="http://schemas.microsoft.com/office/infopath/2007/PartnerControls"/>
+    <ds:schemaRef ds:uri="http://purl.org/dc/elements/1.1/"/>
+    <ds:schemaRef ds:uri="http://schemas.openxmlformats.org/package/2006/metadata/core-properties"/>
+    <ds:schemaRef ds:uri="e5a3a747-d21f-491f-b559-719a372e993f"/>
+    <ds:schemaRef ds:uri="http://www.w3.org/XML/1998/namespace"/>
+    <ds:schemaRef ds:uri="http://purl.org/dc/dcmitype/"/>
   </ds:schemaRefs>
 </ds:datastoreItem>
 </file>
@@ -52275,18 +52328,9 @@
 </file>
 
 <file path=customXml/itemProps3.xml><?xml version="1.0" encoding="utf-8"?>
-<ds:datastoreItem xmlns:ds="http://schemas.openxmlformats.org/officeDocument/2006/customXml" ds:itemID="{21D23866-845B-4BD2-A441-572A2E164D66}">
+<ds:datastoreItem xmlns:ds="http://schemas.openxmlformats.org/officeDocument/2006/customXml" ds:itemID="{69A0E0BA-4C2A-440E-B218-2F3845E4EC86}">
   <ds:schemaRefs>
-    <ds:schemaRef ds:uri="http://purl.org/dc/terms/"/>
-    <ds:schemaRef ds:uri="http://schemas.microsoft.com/office/2006/metadata/properties"/>
-    <ds:schemaRef ds:uri="http://schemas.microsoft.com/office/2006/documentManagement/types"/>
-    <ds:schemaRef ds:uri="a2f770b2-dfa2-4887-b142-27fb0960f078"/>
-    <ds:schemaRef ds:uri="http://schemas.microsoft.com/office/infopath/2007/PartnerControls"/>
-    <ds:schemaRef ds:uri="http://purl.org/dc/elements/1.1/"/>
-    <ds:schemaRef ds:uri="http://schemas.openxmlformats.org/package/2006/metadata/core-properties"/>
-    <ds:schemaRef ds:uri="e5a3a747-d21f-491f-b559-719a372e993f"/>
-    <ds:schemaRef ds:uri="http://www.w3.org/XML/1998/namespace"/>
-    <ds:schemaRef ds:uri="http://purl.org/dc/dcmitype/"/>
+    <ds:schemaRef ds:uri="http://schemas.microsoft.com/sharepoint/events"/>
   </ds:schemaRefs>
 </ds:datastoreItem>
 </file>

</xml_diff>

<commit_message>
PC and SP description updated in XML. Added another advantage in PPT (Automatic Detection of NPI database from XML Dump file)
</commit_message>
<xml_diff>
--- a/demo_artifacts/DOG-DebugOnGo.pptx
+++ b/demo_artifacts/DOG-DebugOnGo.pptx
@@ -277,7 +277,7 @@
                 </a:solidFill>
               </a:rPr>
               <a:pPr algn="l"/>
-              <a:t>5/29/2018 11:19:24 AM</a:t>
+              <a:t>5/30/2018 9:46:18 AM</a:t>
             </a:fld>
             <a:endParaRPr lang="en-US" sz="900">
               <a:solidFill>
@@ -1538,7 +1538,7 @@
                 </a:solidFill>
               </a:rPr>
               <a:pPr algn="l"/>
-              <a:t>5/29/2018 11:19:11 AM</a:t>
+              <a:t>5/30/2018 9:45:57 AM</a:t>
             </a:fld>
             <a:endParaRPr lang="en-US" sz="900">
               <a:solidFill>
@@ -30417,7 +30417,7 @@
             <a:fld id="{3BDFDD5F-E85B-4DA3-A4F9-9CF3C7409943}" type="datetime4">
               <a:rPr lang="en-US" smtClean="0"/>
               <a:pPr/>
-              <a:t>May 29, 2018</a:t>
+              <a:t>May 30, 2018</a:t>
             </a:fld>
             <a:endParaRPr lang="en-US"/>
           </a:p>
@@ -48294,7 +48294,7 @@
         <p:spPr>
           <a:xfrm>
             <a:off x="941506" y="1537454"/>
-            <a:ext cx="9854012" cy="2554545"/>
+            <a:ext cx="9854012" cy="2800767"/>
           </a:xfrm>
           <a:prstGeom prst="rect">
             <a:avLst/>
@@ -48376,11 +48376,21 @@
             </a:pPr>
             <a:r>
               <a:rPr lang="en-US" sz="1600" b="1" dirty="0"/>
-              <a:t>App Crashes (if any) will be automatically reported to developer console. (Days of “provide me reproduction steps” are </a:t>
+              <a:t>App Crashes (if any) will be automatically reported to developer console. (Days of “provide me reproduction steps” are gone).</a:t>
+            </a:r>
+          </a:p>
+          <a:p>
+            <a:pPr marL="285750" indent="-285750">
+              <a:buFont typeface="Arial" panose="020B0604020202020204" pitchFamily="34" charset="0"/>
+              <a:buChar char="•"/>
+            </a:pPr>
+            <a:r>
+              <a:rPr lang="en-US" sz="1600" b="1" dirty="0"/>
+              <a:t>Automatic Detection of NPI DB to be used from XML dump file </a:t>
             </a:r>
             <a:r>
               <a:rPr lang="en-US" sz="1600" b="1"/>
-              <a:t>gone).</a:t>
+              <a:t>generated from CW tool.</a:t>
             </a:r>
             <a:endParaRPr lang="en-US" sz="1600" b="1" dirty="0"/>
           </a:p>
@@ -48395,7 +48405,7 @@
                   <a:srgbClr val="FF0000"/>
                 </a:solidFill>
               </a:rPr>
-              <a:t>Handles the corner case Registers, that are _NOT_ handled in CodeWarrior’s register Databases</a:t>
+              <a:t>Handles the corner case Registers, that are _NOT_ handled in CodeWarrior’s register Databases.</a:t>
             </a:r>
           </a:p>
           <a:p>
@@ -48421,7 +48431,7 @@
         </p:nvSpPr>
         <p:spPr>
           <a:xfrm>
-            <a:off x="941506" y="3945374"/>
+            <a:off x="941506" y="5027725"/>
             <a:ext cx="5833648" cy="830997"/>
           </a:xfrm>
           <a:prstGeom prst="rect">
@@ -51900,138 +51910,53 @@
 </file>
 
 <file path=customXml/item1.xml><?xml version="1.0" encoding="utf-8"?>
-<p:properties xmlns:p="http://schemas.microsoft.com/office/2006/metadata/properties" xmlns:xsi="http://www.w3.org/2001/XMLSchema-instance" xmlns:pc="http://schemas.microsoft.com/office/infopath/2007/PartnerControls">
-  <documentManagement>
-    <_dlc_DocId xmlns="e5a3a747-d21f-491f-b559-719a372e993f">52MFTYTJJKHE-686160917-653</_dlc_DocId>
-    <_dlc_DocIdUrl xmlns="e5a3a747-d21f-491f-b559-719a372e993f">
-      <Url>https://nxp1.sharepoint.com/sites/dngpm/PMO/Active_NPIs/LS1012A/_layouts/15/DocIdRedir.aspx?ID=52MFTYTJJKHE-686160917-653</Url>
-      <Description>52MFTYTJJKHE-686160917-653</Description>
-    </_dlc_DocIdUrl>
-    <SharedWithUsers xmlns="e5a3a747-d21f-491f-b559-719a372e993f">
-      <UserInfo>
-        <DisplayName>Cynthia Fu</DisplayName>
-        <AccountId>184</AccountId>
-        <AccountType/>
-      </UserInfo>
-      <UserInfo>
-        <DisplayName>Mircea Ionita</DisplayName>
-        <AccountId>248</AccountId>
-        <AccountType/>
-      </UserInfo>
-      <UserInfo>
-        <DisplayName>Bogdan Vlad</DisplayName>
-        <AccountId>196</AccountId>
-        <AccountType/>
-      </UserInfo>
-      <UserInfo>
-        <DisplayName>George Stefan</DisplayName>
-        <AccountId>157</AccountId>
-        <AccountType/>
-      </UserInfo>
-      <UserInfo>
-        <DisplayName>Sebastian Grigore</DisplayName>
-        <AccountId>186</AccountId>
-        <AccountType/>
-      </UserInfo>
-      <UserInfo>
-        <DisplayName>Ravi Kanth Reddy P</DisplayName>
-        <AccountId>85</AccountId>
-        <AccountType/>
-      </UserInfo>
-      <UserInfo>
-        <DisplayName>Sarat Vetcha</DisplayName>
-        <AccountId>86</AccountId>
-        <AccountType/>
-      </UserInfo>
-      <UserInfo>
-        <DisplayName>Mircea Pop</DisplayName>
-        <AccountId>94</AccountId>
-        <AccountType/>
-      </UserInfo>
-      <UserInfo>
-        <DisplayName>Adrienne Suner</DisplayName>
-        <AccountId>1368</AccountId>
-        <AccountType/>
-      </UserInfo>
-      <UserInfo>
-        <DisplayName>Rajan Gupta</DisplayName>
-        <AccountId>21</AccountId>
-        <AccountType/>
-      </UserInfo>
-      <UserInfo>
-        <DisplayName>Ruchika Gupta</DisplayName>
-        <AccountId>148</AccountId>
-        <AccountType/>
-      </UserInfo>
-      <UserInfo>
-        <DisplayName>Jaiprakash Singh</DisplayName>
-        <AccountId>225</AccountId>
-        <AccountType/>
-      </UserInfo>
-      <UserInfo>
-        <DisplayName>Jaswinder Singh</DisplayName>
-        <AccountId>245</AccountId>
-        <AccountType/>
-      </UserInfo>
-      <UserInfo>
-        <DisplayName>Varun Sethi</DisplayName>
-        <AccountId>192</AccountId>
-        <AccountType/>
-      </UserInfo>
-      <UserInfo>
-        <DisplayName>SunilKumar Gupta</DisplayName>
-        <AccountId>198</AccountId>
-        <AccountType/>
-      </UserInfo>
-      <UserInfo>
-        <DisplayName>Iuliana Bratu</DisplayName>
-        <AccountId>256</AccountId>
-        <AccountType/>
-      </UserInfo>
-      <UserInfo>
-        <DisplayName>Bogdan Costinescu</DisplayName>
-        <AccountId>51</AccountId>
-        <AccountType/>
-      </UserInfo>
-      <UserInfo>
-        <DisplayName>Rajan Srivastava</DisplayName>
-        <AccountId>254</AccountId>
-        <AccountType/>
-      </UserInfo>
-      <UserInfo>
-        <DisplayName>Priyanka Jain</DisplayName>
-        <AccountId>595</AccountId>
-        <AccountType/>
-      </UserInfo>
-      <UserInfo>
-        <DisplayName>Harninder Rai</DisplayName>
-        <AccountId>199</AccountId>
-        <AccountType/>
-      </UserInfo>
-      <UserInfo>
-        <DisplayName>Bhaskar U</DisplayName>
-        <AccountId>1347</AccountId>
-        <AccountType/>
-      </UserInfo>
-      <UserInfo>
-        <DisplayName>Prabhakar Kushwaha</DisplayName>
-        <AccountId>601</AccountId>
-        <AccountType/>
-      </UserInfo>
-      <UserInfo>
-        <DisplayName>Ashish Kumar</DisplayName>
-        <AccountId>328</AccountId>
-        <AccountType/>
-      </UserInfo>
-      <UserInfo>
-        <DisplayName>Rajesh Bhagat</DisplayName>
-        <AccountId>600</AccountId>
-        <AccountType/>
-      </UserInfo>
-    </SharedWithUsers>
-    <Meeting_x0020_Date xmlns="a2f770b2-dfa2-4887-b142-27fb0960f078">2017-05-08T13:03:54+00:00</Meeting_x0020_Date>
-  </documentManagement>
-</p:properties>
+<?mso-contentType ?>
+<spe:Receivers xmlns:spe="http://schemas.microsoft.com/sharepoint/events">
+  <Receiver>
+    <Name>Document ID Generator</Name>
+    <Synchronization>Synchronous</Synchronization>
+    <Type>10001</Type>
+    <SequenceNumber>1000</SequenceNumber>
+    <Url/>
+    <Assembly>Microsoft.Office.DocumentManagement, Version=16.0.0.0, Culture=neutral, PublicKeyToken=71e9bce111e9429c</Assembly>
+    <Class>Microsoft.Office.DocumentManagement.Internal.DocIdHandler</Class>
+    <Data/>
+    <Filter/>
+  </Receiver>
+  <Receiver>
+    <Name>Document ID Generator</Name>
+    <Synchronization>Synchronous</Synchronization>
+    <Type>10002</Type>
+    <SequenceNumber>1001</SequenceNumber>
+    <Url/>
+    <Assembly>Microsoft.Office.DocumentManagement, Version=16.0.0.0, Culture=neutral, PublicKeyToken=71e9bce111e9429c</Assembly>
+    <Class>Microsoft.Office.DocumentManagement.Internal.DocIdHandler</Class>
+    <Data/>
+    <Filter/>
+  </Receiver>
+  <Receiver>
+    <Name>Document ID Generator</Name>
+    <Synchronization>Synchronous</Synchronization>
+    <Type>10004</Type>
+    <SequenceNumber>1002</SequenceNumber>
+    <Url/>
+    <Assembly>Microsoft.Office.DocumentManagement, Version=16.0.0.0, Culture=neutral, PublicKeyToken=71e9bce111e9429c</Assembly>
+    <Class>Microsoft.Office.DocumentManagement.Internal.DocIdHandler</Class>
+    <Data/>
+    <Filter/>
+  </Receiver>
+  <Receiver>
+    <Name>Document ID Generator</Name>
+    <Synchronization>Synchronous</Synchronization>
+    <Type>10006</Type>
+    <SequenceNumber>1003</SequenceNumber>
+    <Url/>
+    <Assembly>Microsoft.Office.DocumentManagement, Version=16.0.0.0, Culture=neutral, PublicKeyToken=71e9bce111e9429c</Assembly>
+    <Class>Microsoft.Office.DocumentManagement.Internal.DocIdHandler</Class>
+    <Data/>
+    <Filter/>
+  </Receiver>
+</spe:Receivers>
 </file>
 
 <file path=customXml/item2.xml><?xml version="1.0" encoding="utf-8"?>
@@ -52233,53 +52158,138 @@
 </file>
 
 <file path=customXml/item3.xml><?xml version="1.0" encoding="utf-8"?>
-<?mso-contentType ?>
-<spe:Receivers xmlns:spe="http://schemas.microsoft.com/sharepoint/events">
-  <Receiver>
-    <Name>Document ID Generator</Name>
-    <Synchronization>Synchronous</Synchronization>
-    <Type>10001</Type>
-    <SequenceNumber>1000</SequenceNumber>
-    <Url/>
-    <Assembly>Microsoft.Office.DocumentManagement, Version=16.0.0.0, Culture=neutral, PublicKeyToken=71e9bce111e9429c</Assembly>
-    <Class>Microsoft.Office.DocumentManagement.Internal.DocIdHandler</Class>
-    <Data/>
-    <Filter/>
-  </Receiver>
-  <Receiver>
-    <Name>Document ID Generator</Name>
-    <Synchronization>Synchronous</Synchronization>
-    <Type>10002</Type>
-    <SequenceNumber>1001</SequenceNumber>
-    <Url/>
-    <Assembly>Microsoft.Office.DocumentManagement, Version=16.0.0.0, Culture=neutral, PublicKeyToken=71e9bce111e9429c</Assembly>
-    <Class>Microsoft.Office.DocumentManagement.Internal.DocIdHandler</Class>
-    <Data/>
-    <Filter/>
-  </Receiver>
-  <Receiver>
-    <Name>Document ID Generator</Name>
-    <Synchronization>Synchronous</Synchronization>
-    <Type>10004</Type>
-    <SequenceNumber>1002</SequenceNumber>
-    <Url/>
-    <Assembly>Microsoft.Office.DocumentManagement, Version=16.0.0.0, Culture=neutral, PublicKeyToken=71e9bce111e9429c</Assembly>
-    <Class>Microsoft.Office.DocumentManagement.Internal.DocIdHandler</Class>
-    <Data/>
-    <Filter/>
-  </Receiver>
-  <Receiver>
-    <Name>Document ID Generator</Name>
-    <Synchronization>Synchronous</Synchronization>
-    <Type>10006</Type>
-    <SequenceNumber>1003</SequenceNumber>
-    <Url/>
-    <Assembly>Microsoft.Office.DocumentManagement, Version=16.0.0.0, Culture=neutral, PublicKeyToken=71e9bce111e9429c</Assembly>
-    <Class>Microsoft.Office.DocumentManagement.Internal.DocIdHandler</Class>
-    <Data/>
-    <Filter/>
-  </Receiver>
-</spe:Receivers>
+<p:properties xmlns:p="http://schemas.microsoft.com/office/2006/metadata/properties" xmlns:xsi="http://www.w3.org/2001/XMLSchema-instance" xmlns:pc="http://schemas.microsoft.com/office/infopath/2007/PartnerControls">
+  <documentManagement>
+    <_dlc_DocId xmlns="e5a3a747-d21f-491f-b559-719a372e993f">52MFTYTJJKHE-686160917-653</_dlc_DocId>
+    <_dlc_DocIdUrl xmlns="e5a3a747-d21f-491f-b559-719a372e993f">
+      <Url>https://nxp1.sharepoint.com/sites/dngpm/PMO/Active_NPIs/LS1012A/_layouts/15/DocIdRedir.aspx?ID=52MFTYTJJKHE-686160917-653</Url>
+      <Description>52MFTYTJJKHE-686160917-653</Description>
+    </_dlc_DocIdUrl>
+    <SharedWithUsers xmlns="e5a3a747-d21f-491f-b559-719a372e993f">
+      <UserInfo>
+        <DisplayName>Cynthia Fu</DisplayName>
+        <AccountId>184</AccountId>
+        <AccountType/>
+      </UserInfo>
+      <UserInfo>
+        <DisplayName>Mircea Ionita</DisplayName>
+        <AccountId>248</AccountId>
+        <AccountType/>
+      </UserInfo>
+      <UserInfo>
+        <DisplayName>Bogdan Vlad</DisplayName>
+        <AccountId>196</AccountId>
+        <AccountType/>
+      </UserInfo>
+      <UserInfo>
+        <DisplayName>George Stefan</DisplayName>
+        <AccountId>157</AccountId>
+        <AccountType/>
+      </UserInfo>
+      <UserInfo>
+        <DisplayName>Sebastian Grigore</DisplayName>
+        <AccountId>186</AccountId>
+        <AccountType/>
+      </UserInfo>
+      <UserInfo>
+        <DisplayName>Ravi Kanth Reddy P</DisplayName>
+        <AccountId>85</AccountId>
+        <AccountType/>
+      </UserInfo>
+      <UserInfo>
+        <DisplayName>Sarat Vetcha</DisplayName>
+        <AccountId>86</AccountId>
+        <AccountType/>
+      </UserInfo>
+      <UserInfo>
+        <DisplayName>Mircea Pop</DisplayName>
+        <AccountId>94</AccountId>
+        <AccountType/>
+      </UserInfo>
+      <UserInfo>
+        <DisplayName>Adrienne Suner</DisplayName>
+        <AccountId>1368</AccountId>
+        <AccountType/>
+      </UserInfo>
+      <UserInfo>
+        <DisplayName>Rajan Gupta</DisplayName>
+        <AccountId>21</AccountId>
+        <AccountType/>
+      </UserInfo>
+      <UserInfo>
+        <DisplayName>Ruchika Gupta</DisplayName>
+        <AccountId>148</AccountId>
+        <AccountType/>
+      </UserInfo>
+      <UserInfo>
+        <DisplayName>Jaiprakash Singh</DisplayName>
+        <AccountId>225</AccountId>
+        <AccountType/>
+      </UserInfo>
+      <UserInfo>
+        <DisplayName>Jaswinder Singh</DisplayName>
+        <AccountId>245</AccountId>
+        <AccountType/>
+      </UserInfo>
+      <UserInfo>
+        <DisplayName>Varun Sethi</DisplayName>
+        <AccountId>192</AccountId>
+        <AccountType/>
+      </UserInfo>
+      <UserInfo>
+        <DisplayName>SunilKumar Gupta</DisplayName>
+        <AccountId>198</AccountId>
+        <AccountType/>
+      </UserInfo>
+      <UserInfo>
+        <DisplayName>Iuliana Bratu</DisplayName>
+        <AccountId>256</AccountId>
+        <AccountType/>
+      </UserInfo>
+      <UserInfo>
+        <DisplayName>Bogdan Costinescu</DisplayName>
+        <AccountId>51</AccountId>
+        <AccountType/>
+      </UserInfo>
+      <UserInfo>
+        <DisplayName>Rajan Srivastava</DisplayName>
+        <AccountId>254</AccountId>
+        <AccountType/>
+      </UserInfo>
+      <UserInfo>
+        <DisplayName>Priyanka Jain</DisplayName>
+        <AccountId>595</AccountId>
+        <AccountType/>
+      </UserInfo>
+      <UserInfo>
+        <DisplayName>Harninder Rai</DisplayName>
+        <AccountId>199</AccountId>
+        <AccountType/>
+      </UserInfo>
+      <UserInfo>
+        <DisplayName>Bhaskar U</DisplayName>
+        <AccountId>1347</AccountId>
+        <AccountType/>
+      </UserInfo>
+      <UserInfo>
+        <DisplayName>Prabhakar Kushwaha</DisplayName>
+        <AccountId>601</AccountId>
+        <AccountType/>
+      </UserInfo>
+      <UserInfo>
+        <DisplayName>Ashish Kumar</DisplayName>
+        <AccountId>328</AccountId>
+        <AccountType/>
+      </UserInfo>
+      <UserInfo>
+        <DisplayName>Rajesh Bhagat</DisplayName>
+        <AccountId>600</AccountId>
+        <AccountType/>
+      </UserInfo>
+    </SharedWithUsers>
+    <Meeting_x0020_Date xmlns="a2f770b2-dfa2-4887-b142-27fb0960f078">2017-05-08T13:03:54+00:00</Meeting_x0020_Date>
+  </documentManagement>
+</p:properties>
 </file>
 
 <file path=customXml/item4.xml><?xml version="1.0" encoding="utf-8"?>
@@ -52292,18 +52302,9 @@
 </file>
 
 <file path=customXml/itemProps1.xml><?xml version="1.0" encoding="utf-8"?>
-<ds:datastoreItem xmlns:ds="http://schemas.openxmlformats.org/officeDocument/2006/customXml" ds:itemID="{21D23866-845B-4BD2-A441-572A2E164D66}">
+<ds:datastoreItem xmlns:ds="http://schemas.openxmlformats.org/officeDocument/2006/customXml" ds:itemID="{69A0E0BA-4C2A-440E-B218-2F3845E4EC86}">
   <ds:schemaRefs>
-    <ds:schemaRef ds:uri="http://purl.org/dc/terms/"/>
-    <ds:schemaRef ds:uri="http://schemas.microsoft.com/office/2006/metadata/properties"/>
-    <ds:schemaRef ds:uri="http://schemas.microsoft.com/office/2006/documentManagement/types"/>
-    <ds:schemaRef ds:uri="a2f770b2-dfa2-4887-b142-27fb0960f078"/>
-    <ds:schemaRef ds:uri="http://schemas.microsoft.com/office/infopath/2007/PartnerControls"/>
-    <ds:schemaRef ds:uri="http://purl.org/dc/elements/1.1/"/>
-    <ds:schemaRef ds:uri="http://schemas.openxmlformats.org/package/2006/metadata/core-properties"/>
-    <ds:schemaRef ds:uri="e5a3a747-d21f-491f-b559-719a372e993f"/>
-    <ds:schemaRef ds:uri="http://www.w3.org/XML/1998/namespace"/>
-    <ds:schemaRef ds:uri="http://purl.org/dc/dcmitype/"/>
+    <ds:schemaRef ds:uri="http://schemas.microsoft.com/sharepoint/events"/>
   </ds:schemaRefs>
 </ds:datastoreItem>
 </file>
@@ -52328,9 +52329,18 @@
 </file>
 
 <file path=customXml/itemProps3.xml><?xml version="1.0" encoding="utf-8"?>
-<ds:datastoreItem xmlns:ds="http://schemas.openxmlformats.org/officeDocument/2006/customXml" ds:itemID="{69A0E0BA-4C2A-440E-B218-2F3845E4EC86}">
+<ds:datastoreItem xmlns:ds="http://schemas.openxmlformats.org/officeDocument/2006/customXml" ds:itemID="{21D23866-845B-4BD2-A441-572A2E164D66}">
   <ds:schemaRefs>
-    <ds:schemaRef ds:uri="http://schemas.microsoft.com/sharepoint/events"/>
+    <ds:schemaRef ds:uri="http://purl.org/dc/terms/"/>
+    <ds:schemaRef ds:uri="http://schemas.microsoft.com/office/2006/metadata/properties"/>
+    <ds:schemaRef ds:uri="http://schemas.microsoft.com/office/2006/documentManagement/types"/>
+    <ds:schemaRef ds:uri="a2f770b2-dfa2-4887-b142-27fb0960f078"/>
+    <ds:schemaRef ds:uri="http://schemas.microsoft.com/office/infopath/2007/PartnerControls"/>
+    <ds:schemaRef ds:uri="http://purl.org/dc/elements/1.1/"/>
+    <ds:schemaRef ds:uri="http://schemas.openxmlformats.org/package/2006/metadata/core-properties"/>
+    <ds:schemaRef ds:uri="e5a3a747-d21f-491f-b559-719a372e993f"/>
+    <ds:schemaRef ds:uri="http://www.w3.org/XML/1998/namespace"/>
+    <ds:schemaRef ds:uri="http://purl.org/dc/dcmitype/"/>
   </ds:schemaRefs>
 </ds:datastoreItem>
 </file>

</xml_diff>

<commit_message>
* Updated Demo Slide with more Pros. * Updated Progress Dialog Message.
</commit_message>
<xml_diff>
--- a/demo_artifacts/DOG-DebugOnGo.pptx
+++ b/demo_artifacts/DOG-DebugOnGo.pptx
@@ -277,7 +277,7 @@
                 </a:solidFill>
               </a:rPr>
               <a:pPr algn="l"/>
-              <a:t>5/30/2018 9:46:18 AM</a:t>
+              <a:t>5/31/2018 8:40:44 AM</a:t>
             </a:fld>
             <a:endParaRPr lang="en-US" sz="900">
               <a:solidFill>
@@ -1538,7 +1538,7 @@
                 </a:solidFill>
               </a:rPr>
               <a:pPr algn="l"/>
-              <a:t>5/30/2018 9:45:57 AM</a:t>
+              <a:t>5/31/2018 8:40:24 AM</a:t>
             </a:fld>
             <a:endParaRPr lang="en-US" sz="900">
               <a:solidFill>
@@ -30417,7 +30417,7 @@
             <a:fld id="{3BDFDD5F-E85B-4DA3-A4F9-9CF3C7409943}" type="datetime4">
               <a:rPr lang="en-US" smtClean="0"/>
               <a:pPr/>
-              <a:t>May 30, 2018</a:t>
+              <a:t>May 31, 2018</a:t>
             </a:fld>
             <a:endParaRPr lang="en-US"/>
           </a:p>
@@ -48294,7 +48294,7 @@
         <p:spPr>
           <a:xfrm>
             <a:off x="941506" y="1537454"/>
-            <a:ext cx="9854012" cy="2800767"/>
+            <a:ext cx="9854012" cy="3785652"/>
           </a:xfrm>
           <a:prstGeom prst="rect">
             <a:avLst/>
@@ -48386,11 +48386,43 @@
             </a:pPr>
             <a:r>
               <a:rPr lang="en-US" sz="1600" b="1" dirty="0"/>
-              <a:t>Automatic Detection of NPI DB to be used from XML dump file </a:t>
+              <a:t>Automatic Detection of NPI DB to be used from XML dump file generated from CW tool.</a:t>
+            </a:r>
+          </a:p>
+          <a:p>
+            <a:pPr marL="285750" indent="-285750">
+              <a:buFont typeface="Arial" panose="020B0604020202020204" pitchFamily="34" charset="0"/>
+              <a:buChar char="•"/>
+            </a:pPr>
+            <a:r>
+              <a:rPr lang="en-US" sz="1600" b="1" dirty="0"/>
+              <a:t>Plenty of “Free” Google Services that can monitor its health (Crashes/Hangs) and real time usage of the app worldwide.</a:t>
+            </a:r>
+          </a:p>
+          <a:p>
+            <a:pPr marL="285750" indent="-285750">
+              <a:buFont typeface="Arial" panose="020B0604020202020204" pitchFamily="34" charset="0"/>
+              <a:buChar char="•"/>
+            </a:pPr>
+            <a:r>
+              <a:rPr lang="en-US" sz="1600" b="1" dirty="0"/>
+              <a:t>Supports two types of dump file format (&lt;</a:t>
+            </a:r>
+            <a:r>
+              <a:rPr lang="en-US" sz="1600" b="1" dirty="0" err="1"/>
+              <a:t>regAddr</a:t>
+            </a:r>
+            <a:r>
+              <a:rPr lang="en-US" sz="1600" b="1" dirty="0"/>
+              <a:t>, value&gt; &amp; &lt;</a:t>
+            </a:r>
+            <a:r>
+              <a:rPr lang="en-US" sz="1600" b="1" dirty="0" err="1"/>
+              <a:t>regName</a:t>
             </a:r>
             <a:r>
               <a:rPr lang="en-US" sz="1600" b="1"/>
-              <a:t>generated from CW tool.</a:t>
+              <a:t>, value&gt;)</a:t>
             </a:r>
             <a:endParaRPr lang="en-US" sz="1600" b="1" dirty="0"/>
           </a:p>
@@ -48406,6 +48438,20 @@
                 </a:solidFill>
               </a:rPr>
               <a:t>Handles the corner case Registers, that are _NOT_ handled in CodeWarrior’s register Databases.</a:t>
+            </a:r>
+          </a:p>
+          <a:p>
+            <a:pPr marL="285750" indent="-285750">
+              <a:buFont typeface="Arial" panose="020B0604020202020204" pitchFamily="34" charset="0"/>
+              <a:buChar char="•"/>
+            </a:pPr>
+            <a:r>
+              <a:rPr lang="en-US" sz="1600" b="1" dirty="0">
+                <a:solidFill>
+                  <a:srgbClr val="FF0000"/>
+                </a:solidFill>
+              </a:rPr>
+              <a:t>This APP can work even when Physical board has hanged or crashed.</a:t>
             </a:r>
           </a:p>
           <a:p>

</xml_diff>

<commit_message>
* Updated Demo Slide with more Pros.
</commit_message>
<xml_diff>
--- a/demo_artifacts/DOG-DebugOnGo.pptx
+++ b/demo_artifacts/DOG-DebugOnGo.pptx
@@ -6,10 +6,10 @@
     <p:sldMasterId id="2147483657" r:id="rId6"/>
   </p:sldMasterIdLst>
   <p:notesMasterIdLst>
-    <p:notesMasterId r:id="rId23"/>
+    <p:notesMasterId r:id="rId24"/>
   </p:notesMasterIdLst>
   <p:handoutMasterIdLst>
-    <p:handoutMasterId r:id="rId24"/>
+    <p:handoutMasterId r:id="rId25"/>
   </p:handoutMasterIdLst>
   <p:sldIdLst>
     <p:sldId id="430" r:id="rId7"/>
@@ -27,12 +27,13 @@
     <p:sldId id="449" r:id="rId19"/>
     <p:sldId id="453" r:id="rId20"/>
     <p:sldId id="445" r:id="rId21"/>
-    <p:sldId id="450" r:id="rId22"/>
+    <p:sldId id="454" r:id="rId22"/>
+    <p:sldId id="450" r:id="rId23"/>
   </p:sldIdLst>
   <p:sldSz cx="12192000" cy="6858000"/>
   <p:notesSz cx="7315200" cy="9601200"/>
   <p:custDataLst>
-    <p:tags r:id="rId25"/>
+    <p:tags r:id="rId26"/>
   </p:custDataLst>
   <p:defaultTextStyle>
     <a:defPPr>
@@ -277,7 +278,7 @@
                 </a:solidFill>
               </a:rPr>
               <a:pPr algn="l"/>
-              <a:t>5/31/2018 8:40:44 AM</a:t>
+              <a:t>5/31/2018 9:05:37 AM</a:t>
             </a:fld>
             <a:endParaRPr lang="en-US" sz="900">
               <a:solidFill>
@@ -1538,7 +1539,7 @@
                 </a:solidFill>
               </a:rPr>
               <a:pPr algn="l"/>
-              <a:t>5/31/2018 8:40:24 AM</a:t>
+              <a:t>5/31/2018 9:05:18 AM</a:t>
             </a:fld>
             <a:endParaRPr lang="en-US" sz="900">
               <a:solidFill>
@@ -45053,6 +45054,105 @@
 </file>
 
 <file path=ppt/slides/slide16.xml><?xml version="1.0" encoding="utf-8"?>
+<p:sld xmlns:a="http://schemas.openxmlformats.org/drawingml/2006/main" xmlns:r="http://schemas.openxmlformats.org/officeDocument/2006/relationships" xmlns:p="http://schemas.openxmlformats.org/presentationml/2006/main">
+  <p:cSld>
+    <p:spTree>
+      <p:nvGrpSpPr>
+        <p:cNvPr id="1" name=""/>
+        <p:cNvGrpSpPr/>
+        <p:nvPr/>
+      </p:nvGrpSpPr>
+      <p:grpSpPr>
+        <a:xfrm>
+          <a:off x="0" y="0"/>
+          <a:ext cx="0" cy="0"/>
+          <a:chOff x="0" y="0"/>
+          <a:chExt cx="0" cy="0"/>
+        </a:xfrm>
+      </p:grpSpPr>
+      <p:sp>
+        <p:nvSpPr>
+          <p:cNvPr id="2" name="Title 1">
+            <a:extLst>
+              <a:ext uri="{FF2B5EF4-FFF2-40B4-BE49-F238E27FC236}">
+                <a16:creationId xmlns:a16="http://schemas.microsoft.com/office/drawing/2014/main" id="{2A7A8D4B-2734-45AB-A856-7A9C19AD321F}"/>
+              </a:ext>
+            </a:extLst>
+          </p:cNvPr>
+          <p:cNvSpPr>
+            <a:spLocks noGrp="1"/>
+          </p:cNvSpPr>
+          <p:nvPr>
+            <p:ph type="title"/>
+          </p:nvPr>
+        </p:nvSpPr>
+        <p:spPr/>
+        <p:txBody>
+          <a:bodyPr/>
+          <a:lstStyle/>
+          <a:p>
+            <a:r>
+              <a:rPr lang="en-US" dirty="0"/>
+              <a:t>Google’s Free Analytical Services (Dashboard)</a:t>
+            </a:r>
+          </a:p>
+        </p:txBody>
+      </p:sp>
+      <p:pic>
+        <p:nvPicPr>
+          <p:cNvPr id="5" name="Picture 4">
+            <a:extLst>
+              <a:ext uri="{FF2B5EF4-FFF2-40B4-BE49-F238E27FC236}">
+                <a16:creationId xmlns:a16="http://schemas.microsoft.com/office/drawing/2014/main" id="{F50F3B0D-C937-4FDE-A12B-5DDAA3C18231}"/>
+              </a:ext>
+            </a:extLst>
+          </p:cNvPr>
+          <p:cNvPicPr>
+            <a:picLocks noChangeAspect="1"/>
+          </p:cNvPicPr>
+          <p:nvPr/>
+        </p:nvPicPr>
+        <p:blipFill>
+          <a:blip r:embed="rId2"/>
+          <a:stretch>
+            <a:fillRect/>
+          </a:stretch>
+        </p:blipFill>
+        <p:spPr>
+          <a:xfrm>
+            <a:off x="977426" y="1081090"/>
+            <a:ext cx="10307216" cy="4901678"/>
+          </a:xfrm>
+          <a:prstGeom prst="rect">
+            <a:avLst/>
+          </a:prstGeom>
+          <a:effectLst>
+            <a:glow rad="139700">
+              <a:schemeClr val="accent4">
+                <a:satMod val="175000"/>
+                <a:alpha val="40000"/>
+              </a:schemeClr>
+            </a:glow>
+          </a:effectLst>
+        </p:spPr>
+      </p:pic>
+    </p:spTree>
+    <p:extLst>
+      <p:ext uri="{BB962C8B-B14F-4D97-AF65-F5344CB8AC3E}">
+        <p14:creationId xmlns:p14="http://schemas.microsoft.com/office/powerpoint/2010/main" val="975197056"/>
+      </p:ext>
+    </p:extLst>
+  </p:cSld>
+  <p:clrMapOvr>
+    <a:masterClrMapping/>
+  </p:clrMapOvr>
+  <p:transition>
+    <p:fade/>
+  </p:transition>
+</p:sld>
+</file>
+
+<file path=ppt/slides/slide17.xml><?xml version="1.0" encoding="utf-8"?>
 <p:sld xmlns:a="http://schemas.openxmlformats.org/drawingml/2006/main" xmlns:r="http://schemas.openxmlformats.org/officeDocument/2006/relationships" xmlns:p="http://schemas.openxmlformats.org/presentationml/2006/main">
   <p:cSld>
     <p:spTree>
@@ -48293,8 +48393,8 @@
         </p:nvSpPr>
         <p:spPr>
           <a:xfrm>
-            <a:off x="941506" y="1537454"/>
-            <a:ext cx="9854012" cy="3785652"/>
+            <a:off x="701040" y="1220213"/>
+            <a:ext cx="9854012" cy="3385542"/>
           </a:xfrm>
           <a:prstGeom prst="rect">
             <a:avLst/>
@@ -48317,7 +48417,7 @@
               <a:buChar char="•"/>
             </a:pPr>
             <a:r>
-              <a:rPr lang="en-US" sz="1600" b="1" dirty="0"/>
+              <a:rPr lang="en-US" sz="1400" b="1" dirty="0"/>
               <a:t>Ease of use.</a:t>
             </a:r>
           </a:p>
@@ -48327,15 +48427,15 @@
               <a:buChar char="•"/>
             </a:pPr>
             <a:r>
-              <a:rPr lang="en-US" sz="1600" b="1" dirty="0"/>
+              <a:rPr lang="en-US" sz="1400" b="1" dirty="0"/>
               <a:t>Readily available to everyone (Google </a:t>
             </a:r>
             <a:r>
-              <a:rPr lang="en-US" sz="1600" b="1" dirty="0" err="1"/>
+              <a:rPr lang="en-US" sz="1400" b="1" dirty="0" err="1"/>
               <a:t>Playstore</a:t>
             </a:r>
             <a:r>
-              <a:rPr lang="en-US" sz="1600" b="1" dirty="0"/>
+              <a:rPr lang="en-US" sz="1400" b="1" dirty="0"/>
               <a:t>)</a:t>
             </a:r>
           </a:p>
@@ -48345,7 +48445,7 @@
               <a:buChar char="•"/>
             </a:pPr>
             <a:r>
-              <a:rPr lang="en-US" sz="1600" b="1" dirty="0"/>
+              <a:rPr lang="en-US" sz="1400" b="1" dirty="0"/>
               <a:t>Not-so-complex UI.</a:t>
             </a:r>
           </a:p>
@@ -48355,7 +48455,7 @@
               <a:buChar char="•"/>
             </a:pPr>
             <a:r>
-              <a:rPr lang="en-US" sz="1600" b="1" dirty="0"/>
+              <a:rPr lang="en-US" sz="1400" b="1" dirty="0"/>
               <a:t>Auto App update. (No need to manually update software like in CodeWarrior)</a:t>
             </a:r>
           </a:p>
@@ -48365,7 +48465,7 @@
               <a:buChar char="•"/>
             </a:pPr>
             <a:r>
-              <a:rPr lang="en-US" sz="1600" b="1" dirty="0"/>
+              <a:rPr lang="en-US" sz="1400" b="1" dirty="0"/>
               <a:t>Easy Expansion to new NPIs. (Single line code addition and Code compilation needed)</a:t>
             </a:r>
           </a:p>
@@ -48375,7 +48475,7 @@
               <a:buChar char="•"/>
             </a:pPr>
             <a:r>
-              <a:rPr lang="en-US" sz="1600" b="1" dirty="0"/>
+              <a:rPr lang="en-US" sz="1400" b="1" dirty="0"/>
               <a:t>App Crashes (if any) will be automatically reported to developer console. (Days of “provide me reproduction steps” are gone).</a:t>
             </a:r>
           </a:p>
@@ -48385,7 +48485,7 @@
               <a:buChar char="•"/>
             </a:pPr>
             <a:r>
-              <a:rPr lang="en-US" sz="1600" b="1" dirty="0"/>
+              <a:rPr lang="en-US" sz="1400" b="1" dirty="0"/>
               <a:t>Automatic Detection of NPI DB to be used from XML dump file generated from CW tool.</a:t>
             </a:r>
           </a:p>
@@ -48395,7 +48495,7 @@
               <a:buChar char="•"/>
             </a:pPr>
             <a:r>
-              <a:rPr lang="en-US" sz="1600" b="1" dirty="0"/>
+              <a:rPr lang="en-US" sz="1400" b="1" dirty="0"/>
               <a:t>Plenty of “Free” Google Services that can monitor its health (Crashes/Hangs) and real time usage of the app worldwide.</a:t>
             </a:r>
           </a:p>
@@ -48405,26 +48505,25 @@
               <a:buChar char="•"/>
             </a:pPr>
             <a:r>
-              <a:rPr lang="en-US" sz="1600" b="1" dirty="0"/>
+              <a:rPr lang="en-US" sz="1400" b="1" dirty="0"/>
               <a:t>Supports two types of dump file format (&lt;</a:t>
             </a:r>
             <a:r>
-              <a:rPr lang="en-US" sz="1600" b="1" dirty="0" err="1"/>
+              <a:rPr lang="en-US" sz="1400" b="1" dirty="0" err="1"/>
               <a:t>regAddr</a:t>
             </a:r>
             <a:r>
-              <a:rPr lang="en-US" sz="1600" b="1" dirty="0"/>
+              <a:rPr lang="en-US" sz="1400" b="1" dirty="0"/>
               <a:t>, value&gt; &amp; &lt;</a:t>
             </a:r>
             <a:r>
-              <a:rPr lang="en-US" sz="1600" b="1" dirty="0" err="1"/>
+              <a:rPr lang="en-US" sz="1400" b="1" dirty="0" err="1"/>
               <a:t>regName</a:t>
             </a:r>
             <a:r>
-              <a:rPr lang="en-US" sz="1600" b="1"/>
+              <a:rPr lang="en-US" sz="1400" b="1" dirty="0"/>
               <a:t>, value&gt;)</a:t>
             </a:r>
-            <a:endParaRPr lang="en-US" sz="1600" b="1" dirty="0"/>
           </a:p>
           <a:p>
             <a:pPr marL="285750" indent="-285750">
@@ -48432,7 +48531,7 @@
               <a:buChar char="•"/>
             </a:pPr>
             <a:r>
-              <a:rPr lang="en-US" sz="1600" b="1" dirty="0">
+              <a:rPr lang="en-US" sz="1400" b="1" dirty="0">
                 <a:solidFill>
                   <a:srgbClr val="FF0000"/>
                 </a:solidFill>
@@ -48446,7 +48545,7 @@
               <a:buChar char="•"/>
             </a:pPr>
             <a:r>
-              <a:rPr lang="en-US" sz="1600" b="1" dirty="0">
+              <a:rPr lang="en-US" sz="1400" b="1" dirty="0">
                 <a:solidFill>
                   <a:srgbClr val="FF0000"/>
                 </a:solidFill>
@@ -48477,8 +48576,8 @@
         </p:nvSpPr>
         <p:spPr>
           <a:xfrm>
-            <a:off x="941506" y="5027725"/>
-            <a:ext cx="5833648" cy="830997"/>
+            <a:off x="701040" y="4959810"/>
+            <a:ext cx="8486106" cy="769441"/>
           </a:xfrm>
           <a:prstGeom prst="rect">
             <a:avLst/>
@@ -48501,7 +48600,7 @@
               <a:buChar char="•"/>
             </a:pPr>
             <a:r>
-              <a:rPr lang="en-US" sz="1600" b="1" dirty="0"/>
+              <a:rPr lang="en-US" sz="1400" b="1" dirty="0"/>
               <a:t>Available only for Android devices as of now.</a:t>
             </a:r>
           </a:p>
@@ -48511,8 +48610,16 @@
               <a:buChar char="•"/>
             </a:pPr>
             <a:r>
-              <a:rPr lang="en-US" sz="1600" b="1" dirty="0"/>
-              <a:t>Human nature not accustomed to working on Phone ;-)</a:t>
+              <a:rPr lang="en-US" sz="1400" b="1" dirty="0"/>
+              <a:t>People don’t accept changes easily. </a:t>
+            </a:r>
+            <a:r>
+              <a:rPr lang="en-US" sz="1400" b="1" dirty="0" err="1"/>
+              <a:t>Ie</a:t>
+            </a:r>
+            <a:r>
+              <a:rPr lang="en-US" sz="1400" b="1" dirty="0"/>
+              <a:t>. Human nature not accustomed to working on Phone ;-)</a:t>
             </a:r>
           </a:p>
         </p:txBody>
@@ -51956,53 +52063,138 @@
 </file>
 
 <file path=customXml/item1.xml><?xml version="1.0" encoding="utf-8"?>
-<?mso-contentType ?>
-<spe:Receivers xmlns:spe="http://schemas.microsoft.com/sharepoint/events">
-  <Receiver>
-    <Name>Document ID Generator</Name>
-    <Synchronization>Synchronous</Synchronization>
-    <Type>10001</Type>
-    <SequenceNumber>1000</SequenceNumber>
-    <Url/>
-    <Assembly>Microsoft.Office.DocumentManagement, Version=16.0.0.0, Culture=neutral, PublicKeyToken=71e9bce111e9429c</Assembly>
-    <Class>Microsoft.Office.DocumentManagement.Internal.DocIdHandler</Class>
-    <Data/>
-    <Filter/>
-  </Receiver>
-  <Receiver>
-    <Name>Document ID Generator</Name>
-    <Synchronization>Synchronous</Synchronization>
-    <Type>10002</Type>
-    <SequenceNumber>1001</SequenceNumber>
-    <Url/>
-    <Assembly>Microsoft.Office.DocumentManagement, Version=16.0.0.0, Culture=neutral, PublicKeyToken=71e9bce111e9429c</Assembly>
-    <Class>Microsoft.Office.DocumentManagement.Internal.DocIdHandler</Class>
-    <Data/>
-    <Filter/>
-  </Receiver>
-  <Receiver>
-    <Name>Document ID Generator</Name>
-    <Synchronization>Synchronous</Synchronization>
-    <Type>10004</Type>
-    <SequenceNumber>1002</SequenceNumber>
-    <Url/>
-    <Assembly>Microsoft.Office.DocumentManagement, Version=16.0.0.0, Culture=neutral, PublicKeyToken=71e9bce111e9429c</Assembly>
-    <Class>Microsoft.Office.DocumentManagement.Internal.DocIdHandler</Class>
-    <Data/>
-    <Filter/>
-  </Receiver>
-  <Receiver>
-    <Name>Document ID Generator</Name>
-    <Synchronization>Synchronous</Synchronization>
-    <Type>10006</Type>
-    <SequenceNumber>1003</SequenceNumber>
-    <Url/>
-    <Assembly>Microsoft.Office.DocumentManagement, Version=16.0.0.0, Culture=neutral, PublicKeyToken=71e9bce111e9429c</Assembly>
-    <Class>Microsoft.Office.DocumentManagement.Internal.DocIdHandler</Class>
-    <Data/>
-    <Filter/>
-  </Receiver>
-</spe:Receivers>
+<p:properties xmlns:p="http://schemas.microsoft.com/office/2006/metadata/properties" xmlns:xsi="http://www.w3.org/2001/XMLSchema-instance" xmlns:pc="http://schemas.microsoft.com/office/infopath/2007/PartnerControls">
+  <documentManagement>
+    <_dlc_DocId xmlns="e5a3a747-d21f-491f-b559-719a372e993f">52MFTYTJJKHE-686160917-653</_dlc_DocId>
+    <_dlc_DocIdUrl xmlns="e5a3a747-d21f-491f-b559-719a372e993f">
+      <Url>https://nxp1.sharepoint.com/sites/dngpm/PMO/Active_NPIs/LS1012A/_layouts/15/DocIdRedir.aspx?ID=52MFTYTJJKHE-686160917-653</Url>
+      <Description>52MFTYTJJKHE-686160917-653</Description>
+    </_dlc_DocIdUrl>
+    <SharedWithUsers xmlns="e5a3a747-d21f-491f-b559-719a372e993f">
+      <UserInfo>
+        <DisplayName>Cynthia Fu</DisplayName>
+        <AccountId>184</AccountId>
+        <AccountType/>
+      </UserInfo>
+      <UserInfo>
+        <DisplayName>Mircea Ionita</DisplayName>
+        <AccountId>248</AccountId>
+        <AccountType/>
+      </UserInfo>
+      <UserInfo>
+        <DisplayName>Bogdan Vlad</DisplayName>
+        <AccountId>196</AccountId>
+        <AccountType/>
+      </UserInfo>
+      <UserInfo>
+        <DisplayName>George Stefan</DisplayName>
+        <AccountId>157</AccountId>
+        <AccountType/>
+      </UserInfo>
+      <UserInfo>
+        <DisplayName>Sebastian Grigore</DisplayName>
+        <AccountId>186</AccountId>
+        <AccountType/>
+      </UserInfo>
+      <UserInfo>
+        <DisplayName>Ravi Kanth Reddy P</DisplayName>
+        <AccountId>85</AccountId>
+        <AccountType/>
+      </UserInfo>
+      <UserInfo>
+        <DisplayName>Sarat Vetcha</DisplayName>
+        <AccountId>86</AccountId>
+        <AccountType/>
+      </UserInfo>
+      <UserInfo>
+        <DisplayName>Mircea Pop</DisplayName>
+        <AccountId>94</AccountId>
+        <AccountType/>
+      </UserInfo>
+      <UserInfo>
+        <DisplayName>Adrienne Suner</DisplayName>
+        <AccountId>1368</AccountId>
+        <AccountType/>
+      </UserInfo>
+      <UserInfo>
+        <DisplayName>Rajan Gupta</DisplayName>
+        <AccountId>21</AccountId>
+        <AccountType/>
+      </UserInfo>
+      <UserInfo>
+        <DisplayName>Ruchika Gupta</DisplayName>
+        <AccountId>148</AccountId>
+        <AccountType/>
+      </UserInfo>
+      <UserInfo>
+        <DisplayName>Jaiprakash Singh</DisplayName>
+        <AccountId>225</AccountId>
+        <AccountType/>
+      </UserInfo>
+      <UserInfo>
+        <DisplayName>Jaswinder Singh</DisplayName>
+        <AccountId>245</AccountId>
+        <AccountType/>
+      </UserInfo>
+      <UserInfo>
+        <DisplayName>Varun Sethi</DisplayName>
+        <AccountId>192</AccountId>
+        <AccountType/>
+      </UserInfo>
+      <UserInfo>
+        <DisplayName>SunilKumar Gupta</DisplayName>
+        <AccountId>198</AccountId>
+        <AccountType/>
+      </UserInfo>
+      <UserInfo>
+        <DisplayName>Iuliana Bratu</DisplayName>
+        <AccountId>256</AccountId>
+        <AccountType/>
+      </UserInfo>
+      <UserInfo>
+        <DisplayName>Bogdan Costinescu</DisplayName>
+        <AccountId>51</AccountId>
+        <AccountType/>
+      </UserInfo>
+      <UserInfo>
+        <DisplayName>Rajan Srivastava</DisplayName>
+        <AccountId>254</AccountId>
+        <AccountType/>
+      </UserInfo>
+      <UserInfo>
+        <DisplayName>Priyanka Jain</DisplayName>
+        <AccountId>595</AccountId>
+        <AccountType/>
+      </UserInfo>
+      <UserInfo>
+        <DisplayName>Harninder Rai</DisplayName>
+        <AccountId>199</AccountId>
+        <AccountType/>
+      </UserInfo>
+      <UserInfo>
+        <DisplayName>Bhaskar U</DisplayName>
+        <AccountId>1347</AccountId>
+        <AccountType/>
+      </UserInfo>
+      <UserInfo>
+        <DisplayName>Prabhakar Kushwaha</DisplayName>
+        <AccountId>601</AccountId>
+        <AccountType/>
+      </UserInfo>
+      <UserInfo>
+        <DisplayName>Ashish Kumar</DisplayName>
+        <AccountId>328</AccountId>
+        <AccountType/>
+      </UserInfo>
+      <UserInfo>
+        <DisplayName>Rajesh Bhagat</DisplayName>
+        <AccountId>600</AccountId>
+        <AccountType/>
+      </UserInfo>
+    </SharedWithUsers>
+    <Meeting_x0020_Date xmlns="a2f770b2-dfa2-4887-b142-27fb0960f078">2017-05-08T13:03:54+00:00</Meeting_x0020_Date>
+  </documentManagement>
+</p:properties>
 </file>
 
 <file path=customXml/item2.xml><?xml version="1.0" encoding="utf-8"?>
@@ -52204,138 +52396,53 @@
 </file>
 
 <file path=customXml/item3.xml><?xml version="1.0" encoding="utf-8"?>
-<p:properties xmlns:p="http://schemas.microsoft.com/office/2006/metadata/properties" xmlns:xsi="http://www.w3.org/2001/XMLSchema-instance" xmlns:pc="http://schemas.microsoft.com/office/infopath/2007/PartnerControls">
-  <documentManagement>
-    <_dlc_DocId xmlns="e5a3a747-d21f-491f-b559-719a372e993f">52MFTYTJJKHE-686160917-653</_dlc_DocId>
-    <_dlc_DocIdUrl xmlns="e5a3a747-d21f-491f-b559-719a372e993f">
-      <Url>https://nxp1.sharepoint.com/sites/dngpm/PMO/Active_NPIs/LS1012A/_layouts/15/DocIdRedir.aspx?ID=52MFTYTJJKHE-686160917-653</Url>
-      <Description>52MFTYTJJKHE-686160917-653</Description>
-    </_dlc_DocIdUrl>
-    <SharedWithUsers xmlns="e5a3a747-d21f-491f-b559-719a372e993f">
-      <UserInfo>
-        <DisplayName>Cynthia Fu</DisplayName>
-        <AccountId>184</AccountId>
-        <AccountType/>
-      </UserInfo>
-      <UserInfo>
-        <DisplayName>Mircea Ionita</DisplayName>
-        <AccountId>248</AccountId>
-        <AccountType/>
-      </UserInfo>
-      <UserInfo>
-        <DisplayName>Bogdan Vlad</DisplayName>
-        <AccountId>196</AccountId>
-        <AccountType/>
-      </UserInfo>
-      <UserInfo>
-        <DisplayName>George Stefan</DisplayName>
-        <AccountId>157</AccountId>
-        <AccountType/>
-      </UserInfo>
-      <UserInfo>
-        <DisplayName>Sebastian Grigore</DisplayName>
-        <AccountId>186</AccountId>
-        <AccountType/>
-      </UserInfo>
-      <UserInfo>
-        <DisplayName>Ravi Kanth Reddy P</DisplayName>
-        <AccountId>85</AccountId>
-        <AccountType/>
-      </UserInfo>
-      <UserInfo>
-        <DisplayName>Sarat Vetcha</DisplayName>
-        <AccountId>86</AccountId>
-        <AccountType/>
-      </UserInfo>
-      <UserInfo>
-        <DisplayName>Mircea Pop</DisplayName>
-        <AccountId>94</AccountId>
-        <AccountType/>
-      </UserInfo>
-      <UserInfo>
-        <DisplayName>Adrienne Suner</DisplayName>
-        <AccountId>1368</AccountId>
-        <AccountType/>
-      </UserInfo>
-      <UserInfo>
-        <DisplayName>Rajan Gupta</DisplayName>
-        <AccountId>21</AccountId>
-        <AccountType/>
-      </UserInfo>
-      <UserInfo>
-        <DisplayName>Ruchika Gupta</DisplayName>
-        <AccountId>148</AccountId>
-        <AccountType/>
-      </UserInfo>
-      <UserInfo>
-        <DisplayName>Jaiprakash Singh</DisplayName>
-        <AccountId>225</AccountId>
-        <AccountType/>
-      </UserInfo>
-      <UserInfo>
-        <DisplayName>Jaswinder Singh</DisplayName>
-        <AccountId>245</AccountId>
-        <AccountType/>
-      </UserInfo>
-      <UserInfo>
-        <DisplayName>Varun Sethi</DisplayName>
-        <AccountId>192</AccountId>
-        <AccountType/>
-      </UserInfo>
-      <UserInfo>
-        <DisplayName>SunilKumar Gupta</DisplayName>
-        <AccountId>198</AccountId>
-        <AccountType/>
-      </UserInfo>
-      <UserInfo>
-        <DisplayName>Iuliana Bratu</DisplayName>
-        <AccountId>256</AccountId>
-        <AccountType/>
-      </UserInfo>
-      <UserInfo>
-        <DisplayName>Bogdan Costinescu</DisplayName>
-        <AccountId>51</AccountId>
-        <AccountType/>
-      </UserInfo>
-      <UserInfo>
-        <DisplayName>Rajan Srivastava</DisplayName>
-        <AccountId>254</AccountId>
-        <AccountType/>
-      </UserInfo>
-      <UserInfo>
-        <DisplayName>Priyanka Jain</DisplayName>
-        <AccountId>595</AccountId>
-        <AccountType/>
-      </UserInfo>
-      <UserInfo>
-        <DisplayName>Harninder Rai</DisplayName>
-        <AccountId>199</AccountId>
-        <AccountType/>
-      </UserInfo>
-      <UserInfo>
-        <DisplayName>Bhaskar U</DisplayName>
-        <AccountId>1347</AccountId>
-        <AccountType/>
-      </UserInfo>
-      <UserInfo>
-        <DisplayName>Prabhakar Kushwaha</DisplayName>
-        <AccountId>601</AccountId>
-        <AccountType/>
-      </UserInfo>
-      <UserInfo>
-        <DisplayName>Ashish Kumar</DisplayName>
-        <AccountId>328</AccountId>
-        <AccountType/>
-      </UserInfo>
-      <UserInfo>
-        <DisplayName>Rajesh Bhagat</DisplayName>
-        <AccountId>600</AccountId>
-        <AccountType/>
-      </UserInfo>
-    </SharedWithUsers>
-    <Meeting_x0020_Date xmlns="a2f770b2-dfa2-4887-b142-27fb0960f078">2017-05-08T13:03:54+00:00</Meeting_x0020_Date>
-  </documentManagement>
-</p:properties>
+<?mso-contentType ?>
+<spe:Receivers xmlns:spe="http://schemas.microsoft.com/sharepoint/events">
+  <Receiver>
+    <Name>Document ID Generator</Name>
+    <Synchronization>Synchronous</Synchronization>
+    <Type>10001</Type>
+    <SequenceNumber>1000</SequenceNumber>
+    <Url/>
+    <Assembly>Microsoft.Office.DocumentManagement, Version=16.0.0.0, Culture=neutral, PublicKeyToken=71e9bce111e9429c</Assembly>
+    <Class>Microsoft.Office.DocumentManagement.Internal.DocIdHandler</Class>
+    <Data/>
+    <Filter/>
+  </Receiver>
+  <Receiver>
+    <Name>Document ID Generator</Name>
+    <Synchronization>Synchronous</Synchronization>
+    <Type>10002</Type>
+    <SequenceNumber>1001</SequenceNumber>
+    <Url/>
+    <Assembly>Microsoft.Office.DocumentManagement, Version=16.0.0.0, Culture=neutral, PublicKeyToken=71e9bce111e9429c</Assembly>
+    <Class>Microsoft.Office.DocumentManagement.Internal.DocIdHandler</Class>
+    <Data/>
+    <Filter/>
+  </Receiver>
+  <Receiver>
+    <Name>Document ID Generator</Name>
+    <Synchronization>Synchronous</Synchronization>
+    <Type>10004</Type>
+    <SequenceNumber>1002</SequenceNumber>
+    <Url/>
+    <Assembly>Microsoft.Office.DocumentManagement, Version=16.0.0.0, Culture=neutral, PublicKeyToken=71e9bce111e9429c</Assembly>
+    <Class>Microsoft.Office.DocumentManagement.Internal.DocIdHandler</Class>
+    <Data/>
+    <Filter/>
+  </Receiver>
+  <Receiver>
+    <Name>Document ID Generator</Name>
+    <Synchronization>Synchronous</Synchronization>
+    <Type>10006</Type>
+    <SequenceNumber>1003</SequenceNumber>
+    <Url/>
+    <Assembly>Microsoft.Office.DocumentManagement, Version=16.0.0.0, Culture=neutral, PublicKeyToken=71e9bce111e9429c</Assembly>
+    <Class>Microsoft.Office.DocumentManagement.Internal.DocIdHandler</Class>
+    <Data/>
+    <Filter/>
+  </Receiver>
+</spe:Receivers>
 </file>
 
 <file path=customXml/item4.xml><?xml version="1.0" encoding="utf-8"?>
@@ -52348,9 +52455,18 @@
 </file>
 
 <file path=customXml/itemProps1.xml><?xml version="1.0" encoding="utf-8"?>
-<ds:datastoreItem xmlns:ds="http://schemas.openxmlformats.org/officeDocument/2006/customXml" ds:itemID="{69A0E0BA-4C2A-440E-B218-2F3845E4EC86}">
+<ds:datastoreItem xmlns:ds="http://schemas.openxmlformats.org/officeDocument/2006/customXml" ds:itemID="{21D23866-845B-4BD2-A441-572A2E164D66}">
   <ds:schemaRefs>
-    <ds:schemaRef ds:uri="http://schemas.microsoft.com/sharepoint/events"/>
+    <ds:schemaRef ds:uri="http://purl.org/dc/terms/"/>
+    <ds:schemaRef ds:uri="http://schemas.microsoft.com/office/2006/metadata/properties"/>
+    <ds:schemaRef ds:uri="http://schemas.microsoft.com/office/2006/documentManagement/types"/>
+    <ds:schemaRef ds:uri="a2f770b2-dfa2-4887-b142-27fb0960f078"/>
+    <ds:schemaRef ds:uri="http://schemas.microsoft.com/office/infopath/2007/PartnerControls"/>
+    <ds:schemaRef ds:uri="http://purl.org/dc/elements/1.1/"/>
+    <ds:schemaRef ds:uri="http://schemas.openxmlformats.org/package/2006/metadata/core-properties"/>
+    <ds:schemaRef ds:uri="e5a3a747-d21f-491f-b559-719a372e993f"/>
+    <ds:schemaRef ds:uri="http://www.w3.org/XML/1998/namespace"/>
+    <ds:schemaRef ds:uri="http://purl.org/dc/dcmitype/"/>
   </ds:schemaRefs>
 </ds:datastoreItem>
 </file>
@@ -52375,18 +52491,9 @@
 </file>
 
 <file path=customXml/itemProps3.xml><?xml version="1.0" encoding="utf-8"?>
-<ds:datastoreItem xmlns:ds="http://schemas.openxmlformats.org/officeDocument/2006/customXml" ds:itemID="{21D23866-845B-4BD2-A441-572A2E164D66}">
+<ds:datastoreItem xmlns:ds="http://schemas.openxmlformats.org/officeDocument/2006/customXml" ds:itemID="{69A0E0BA-4C2A-440E-B218-2F3845E4EC86}">
   <ds:schemaRefs>
-    <ds:schemaRef ds:uri="http://purl.org/dc/terms/"/>
-    <ds:schemaRef ds:uri="http://schemas.microsoft.com/office/2006/metadata/properties"/>
-    <ds:schemaRef ds:uri="http://schemas.microsoft.com/office/2006/documentManagement/types"/>
-    <ds:schemaRef ds:uri="a2f770b2-dfa2-4887-b142-27fb0960f078"/>
-    <ds:schemaRef ds:uri="http://schemas.microsoft.com/office/infopath/2007/PartnerControls"/>
-    <ds:schemaRef ds:uri="http://purl.org/dc/elements/1.1/"/>
-    <ds:schemaRef ds:uri="http://schemas.openxmlformats.org/package/2006/metadata/core-properties"/>
-    <ds:schemaRef ds:uri="e5a3a747-d21f-491f-b559-719a372e993f"/>
-    <ds:schemaRef ds:uri="http://www.w3.org/XML/1998/namespace"/>
-    <ds:schemaRef ds:uri="http://purl.org/dc/dcmitype/"/>
+    <ds:schemaRef ds:uri="http://schemas.microsoft.com/sharepoint/events"/>
   </ds:schemaRefs>
 </ds:datastoreItem>
 </file>

</xml_diff>

<commit_message>
Release for v1.6 done.
</commit_message>
<xml_diff>
--- a/demo_artifacts/DOG-DebugOnGo.pptx
+++ b/demo_artifacts/DOG-DebugOnGo.pptx
@@ -6,10 +6,10 @@
     <p:sldMasterId id="2147483657" r:id="rId6"/>
   </p:sldMasterIdLst>
   <p:notesMasterIdLst>
-    <p:notesMasterId r:id="rId24"/>
+    <p:notesMasterId r:id="rId29"/>
   </p:notesMasterIdLst>
   <p:handoutMasterIdLst>
-    <p:handoutMasterId r:id="rId25"/>
+    <p:handoutMasterId r:id="rId30"/>
   </p:handoutMasterIdLst>
   <p:sldIdLst>
     <p:sldId id="430" r:id="rId7"/>
@@ -21,19 +21,24 @@
     <p:sldId id="442" r:id="rId13"/>
     <p:sldId id="446" r:id="rId14"/>
     <p:sldId id="447" r:id="rId15"/>
-    <p:sldId id="448" r:id="rId16"/>
-    <p:sldId id="452" r:id="rId17"/>
-    <p:sldId id="451" r:id="rId18"/>
-    <p:sldId id="449" r:id="rId19"/>
-    <p:sldId id="453" r:id="rId20"/>
-    <p:sldId id="445" r:id="rId21"/>
-    <p:sldId id="454" r:id="rId22"/>
-    <p:sldId id="450" r:id="rId23"/>
+    <p:sldId id="455" r:id="rId16"/>
+    <p:sldId id="456" r:id="rId17"/>
+    <p:sldId id="457" r:id="rId18"/>
+    <p:sldId id="458" r:id="rId19"/>
+    <p:sldId id="459" r:id="rId20"/>
+    <p:sldId id="460" r:id="rId21"/>
+    <p:sldId id="448" r:id="rId22"/>
+    <p:sldId id="452" r:id="rId23"/>
+    <p:sldId id="451" r:id="rId24"/>
+    <p:sldId id="453" r:id="rId25"/>
+    <p:sldId id="445" r:id="rId26"/>
+    <p:sldId id="454" r:id="rId27"/>
+    <p:sldId id="450" r:id="rId28"/>
   </p:sldIdLst>
   <p:sldSz cx="12192000" cy="6858000"/>
   <p:notesSz cx="7315200" cy="9601200"/>
   <p:custDataLst>
-    <p:tags r:id="rId26"/>
+    <p:tags r:id="rId31"/>
   </p:custDataLst>
   <p:defaultTextStyle>
     <a:defPPr>
@@ -278,7 +283,7 @@
                 </a:solidFill>
               </a:rPr>
               <a:pPr algn="l"/>
-              <a:t>5/31/2018 9:05:37 AM</a:t>
+              <a:t>6/1/2018 9:16:12 AM</a:t>
             </a:fld>
             <a:endParaRPr lang="en-US" sz="900">
               <a:solidFill>
@@ -1539,7 +1544,7 @@
                 </a:solidFill>
               </a:rPr>
               <a:pPr algn="l"/>
-              <a:t>5/31/2018 9:05:18 AM</a:t>
+              <a:t>6/1/2018 9:15:10 AM</a:t>
             </a:fld>
             <a:endParaRPr lang="en-US" sz="900">
               <a:solidFill>
@@ -30418,7 +30423,7 @@
             <a:fld id="{3BDFDD5F-E85B-4DA3-A4F9-9CF3C7409943}" type="datetime4">
               <a:rPr lang="en-US" smtClean="0"/>
               <a:pPr/>
-              <a:t>May 31, 2018</a:t>
+              <a:t>June 1, 2018</a:t>
             </a:fld>
             <a:endParaRPr lang="en-US"/>
           </a:p>
@@ -42471,8 +42476,8 @@
         </p:nvSpPr>
         <p:spPr>
           <a:xfrm>
-            <a:off x="431371" y="1052032"/>
-            <a:ext cx="7294376" cy="1716568"/>
+            <a:off x="431370" y="323162"/>
+            <a:ext cx="11336559" cy="1716568"/>
           </a:xfrm>
         </p:spPr>
         <p:txBody>
@@ -42480,6 +42485,19 @@
           <a:lstStyle/>
           <a:p>
             <a:pPr algn="r"/>
+            <a:br>
+              <a:rPr lang="en-US" dirty="0"/>
+            </a:br>
+            <a:r>
+              <a:rPr lang="en-US" dirty="0"/>
+              <a:t>Nomination for Game Of Threads</a:t>
+            </a:r>
+            <a:br>
+              <a:rPr lang="en-US" dirty="0"/>
+            </a:br>
+            <a:br>
+              <a:rPr lang="en-US" dirty="0"/>
+            </a:br>
             <a:r>
               <a:rPr lang="en-US" dirty="0"/>
               <a:t>D.O.G.</a:t>
@@ -42511,6 +42529,1172 @@
 </file>
 
 <file path=ppt/slides/slide10.xml><?xml version="1.0" encoding="utf-8"?>
+<p:sld xmlns:a="http://schemas.openxmlformats.org/drawingml/2006/main" xmlns:r="http://schemas.openxmlformats.org/officeDocument/2006/relationships" xmlns:p="http://schemas.openxmlformats.org/presentationml/2006/main">
+  <p:cSld>
+    <p:spTree>
+      <p:nvGrpSpPr>
+        <p:cNvPr id="1" name=""/>
+        <p:cNvGrpSpPr/>
+        <p:nvPr/>
+      </p:nvGrpSpPr>
+      <p:grpSpPr>
+        <a:xfrm>
+          <a:off x="0" y="0"/>
+          <a:ext cx="0" cy="0"/>
+          <a:chOff x="0" y="0"/>
+          <a:chExt cx="0" cy="0"/>
+        </a:xfrm>
+      </p:grpSpPr>
+      <p:sp>
+        <p:nvSpPr>
+          <p:cNvPr id="2" name="Title 1">
+            <a:extLst>
+              <a:ext uri="{FF2B5EF4-FFF2-40B4-BE49-F238E27FC236}">
+                <a16:creationId xmlns:a16="http://schemas.microsoft.com/office/drawing/2014/main" id="{C8E1A8E1-16CE-4C74-B723-69BE101856D0}"/>
+              </a:ext>
+            </a:extLst>
+          </p:cNvPr>
+          <p:cNvSpPr>
+            <a:spLocks noGrp="1"/>
+          </p:cNvSpPr>
+          <p:nvPr>
+            <p:ph type="title"/>
+          </p:nvPr>
+        </p:nvSpPr>
+        <p:spPr/>
+        <p:txBody>
+          <a:bodyPr/>
+          <a:lstStyle/>
+          <a:p>
+            <a:r>
+              <a:rPr lang="en-US" dirty="0"/>
+              <a:t>D.O.G. Peek Sneak</a:t>
+            </a:r>
+          </a:p>
+        </p:txBody>
+      </p:sp>
+      <p:pic>
+        <p:nvPicPr>
+          <p:cNvPr id="6" name="Picture 5">
+            <a:extLst>
+              <a:ext uri="{FF2B5EF4-FFF2-40B4-BE49-F238E27FC236}">
+                <a16:creationId xmlns:a16="http://schemas.microsoft.com/office/drawing/2014/main" id="{E76292AB-CADD-4CF9-A313-9EE6A04A8091}"/>
+              </a:ext>
+            </a:extLst>
+          </p:cNvPr>
+          <p:cNvPicPr>
+            <a:picLocks noChangeAspect="1"/>
+          </p:cNvPicPr>
+          <p:nvPr/>
+        </p:nvPicPr>
+        <p:blipFill>
+          <a:blip r:embed="rId2" cstate="print">
+            <a:extLst>
+              <a:ext uri="{28A0092B-C50C-407E-A947-70E740481C1C}">
+                <a14:useLocalDpi xmlns:a14="http://schemas.microsoft.com/office/drawing/2010/main" val="0"/>
+              </a:ext>
+            </a:extLst>
+          </a:blip>
+          <a:stretch>
+            <a:fillRect/>
+          </a:stretch>
+        </p:blipFill>
+        <p:spPr>
+          <a:xfrm>
+            <a:off x="299524" y="802431"/>
+            <a:ext cx="2811775" cy="5935971"/>
+          </a:xfrm>
+          <a:prstGeom prst="rect">
+            <a:avLst/>
+          </a:prstGeom>
+          <a:effectLst>
+            <a:glow rad="139700">
+              <a:schemeClr val="accent4">
+                <a:satMod val="175000"/>
+                <a:alpha val="40000"/>
+              </a:schemeClr>
+            </a:glow>
+          </a:effectLst>
+        </p:spPr>
+      </p:pic>
+      <p:pic>
+        <p:nvPicPr>
+          <p:cNvPr id="8" name="Picture 7">
+            <a:extLst>
+              <a:ext uri="{FF2B5EF4-FFF2-40B4-BE49-F238E27FC236}">
+                <a16:creationId xmlns:a16="http://schemas.microsoft.com/office/drawing/2014/main" id="{461254F2-E73F-4C3F-84BA-AC944A9A5B9E}"/>
+              </a:ext>
+            </a:extLst>
+          </p:cNvPr>
+          <p:cNvPicPr>
+            <a:picLocks noChangeAspect="1"/>
+          </p:cNvPicPr>
+          <p:nvPr/>
+        </p:nvPicPr>
+        <p:blipFill>
+          <a:blip r:embed="rId3" cstate="print">
+            <a:extLst>
+              <a:ext uri="{28A0092B-C50C-407E-A947-70E740481C1C}">
+                <a14:useLocalDpi xmlns:a14="http://schemas.microsoft.com/office/drawing/2010/main" val="0"/>
+              </a:ext>
+            </a:extLst>
+          </a:blip>
+          <a:stretch>
+            <a:fillRect/>
+          </a:stretch>
+        </p:blipFill>
+        <p:spPr>
+          <a:xfrm>
+            <a:off x="4527180" y="802429"/>
+            <a:ext cx="2811775" cy="5935971"/>
+          </a:xfrm>
+          <a:prstGeom prst="rect">
+            <a:avLst/>
+          </a:prstGeom>
+          <a:effectLst>
+            <a:glow rad="139700">
+              <a:schemeClr val="accent4">
+                <a:satMod val="175000"/>
+                <a:alpha val="40000"/>
+              </a:schemeClr>
+            </a:glow>
+          </a:effectLst>
+        </p:spPr>
+      </p:pic>
+      <p:pic>
+        <p:nvPicPr>
+          <p:cNvPr id="10" name="Picture 9">
+            <a:extLst>
+              <a:ext uri="{FF2B5EF4-FFF2-40B4-BE49-F238E27FC236}">
+                <a16:creationId xmlns:a16="http://schemas.microsoft.com/office/drawing/2014/main" id="{7FDD4B3E-F18C-4407-A59C-BFF932DDC979}"/>
+              </a:ext>
+            </a:extLst>
+          </p:cNvPr>
+          <p:cNvPicPr>
+            <a:picLocks noChangeAspect="1"/>
+          </p:cNvPicPr>
+          <p:nvPr/>
+        </p:nvPicPr>
+        <p:blipFill>
+          <a:blip r:embed="rId4" cstate="print">
+            <a:extLst>
+              <a:ext uri="{28A0092B-C50C-407E-A947-70E740481C1C}">
+                <a14:useLocalDpi xmlns:a14="http://schemas.microsoft.com/office/drawing/2010/main" val="0"/>
+              </a:ext>
+            </a:extLst>
+          </a:blip>
+          <a:stretch>
+            <a:fillRect/>
+          </a:stretch>
+        </p:blipFill>
+        <p:spPr>
+          <a:xfrm>
+            <a:off x="9150770" y="802430"/>
+            <a:ext cx="2811775" cy="5935971"/>
+          </a:xfrm>
+          <a:prstGeom prst="rect">
+            <a:avLst/>
+          </a:prstGeom>
+          <a:effectLst>
+            <a:glow rad="139700">
+              <a:schemeClr val="accent4">
+                <a:satMod val="175000"/>
+                <a:alpha val="40000"/>
+              </a:schemeClr>
+            </a:glow>
+          </a:effectLst>
+        </p:spPr>
+      </p:pic>
+      <p:sp>
+        <p:nvSpPr>
+          <p:cNvPr id="11" name="Rectangle 10">
+            <a:extLst>
+              <a:ext uri="{FF2B5EF4-FFF2-40B4-BE49-F238E27FC236}">
+                <a16:creationId xmlns:a16="http://schemas.microsoft.com/office/drawing/2014/main" id="{D459319B-4C7D-42C3-8815-11C3FCA2E3E0}"/>
+              </a:ext>
+            </a:extLst>
+          </p:cNvPr>
+          <p:cNvSpPr/>
+          <p:nvPr/>
+        </p:nvSpPr>
+        <p:spPr>
+          <a:xfrm>
+            <a:off x="0" y="1524000"/>
+            <a:ext cx="3405809" cy="848139"/>
+          </a:xfrm>
+          <a:prstGeom prst="rect">
+            <a:avLst/>
+          </a:prstGeom>
+          <a:noFill/>
+          <a:ln w="53975">
+            <a:solidFill>
+              <a:srgbClr val="FF0000"/>
+            </a:solidFill>
+          </a:ln>
+        </p:spPr>
+        <p:style>
+          <a:lnRef idx="2">
+            <a:schemeClr val="accent1">
+              <a:shade val="50000"/>
+            </a:schemeClr>
+          </a:lnRef>
+          <a:fillRef idx="1">
+            <a:schemeClr val="accent1"/>
+          </a:fillRef>
+          <a:effectRef idx="0">
+            <a:schemeClr val="accent1"/>
+          </a:effectRef>
+          <a:fontRef idx="minor">
+            <a:schemeClr val="lt1"/>
+          </a:fontRef>
+        </p:style>
+        <p:txBody>
+          <a:bodyPr rtlCol="0" anchor="ctr"/>
+          <a:lstStyle/>
+          <a:p>
+            <a:pPr algn="ctr"/>
+            <a:endParaRPr lang="en-US" dirty="0"/>
+          </a:p>
+        </p:txBody>
+      </p:sp>
+    </p:spTree>
+    <p:extLst>
+      <p:ext uri="{BB962C8B-B14F-4D97-AF65-F5344CB8AC3E}">
+        <p14:creationId xmlns:p14="http://schemas.microsoft.com/office/powerpoint/2010/main" val="150154613"/>
+      </p:ext>
+    </p:extLst>
+  </p:cSld>
+  <p:clrMapOvr>
+    <a:masterClrMapping/>
+  </p:clrMapOvr>
+  <p:transition>
+    <p:fade/>
+  </p:transition>
+</p:sld>
+</file>
+
+<file path=ppt/slides/slide11.xml><?xml version="1.0" encoding="utf-8"?>
+<p:sld xmlns:a="http://schemas.openxmlformats.org/drawingml/2006/main" xmlns:r="http://schemas.openxmlformats.org/officeDocument/2006/relationships" xmlns:p="http://schemas.openxmlformats.org/presentationml/2006/main">
+  <p:cSld>
+    <p:spTree>
+      <p:nvGrpSpPr>
+        <p:cNvPr id="1" name=""/>
+        <p:cNvGrpSpPr/>
+        <p:nvPr/>
+      </p:nvGrpSpPr>
+      <p:grpSpPr>
+        <a:xfrm>
+          <a:off x="0" y="0"/>
+          <a:ext cx="0" cy="0"/>
+          <a:chOff x="0" y="0"/>
+          <a:chExt cx="0" cy="0"/>
+        </a:xfrm>
+      </p:grpSpPr>
+      <p:sp>
+        <p:nvSpPr>
+          <p:cNvPr id="2" name="Title 1">
+            <a:extLst>
+              <a:ext uri="{FF2B5EF4-FFF2-40B4-BE49-F238E27FC236}">
+                <a16:creationId xmlns:a16="http://schemas.microsoft.com/office/drawing/2014/main" id="{C8E1A8E1-16CE-4C74-B723-69BE101856D0}"/>
+              </a:ext>
+            </a:extLst>
+          </p:cNvPr>
+          <p:cNvSpPr>
+            <a:spLocks noGrp="1"/>
+          </p:cNvSpPr>
+          <p:nvPr>
+            <p:ph type="title"/>
+          </p:nvPr>
+        </p:nvSpPr>
+        <p:spPr/>
+        <p:txBody>
+          <a:bodyPr/>
+          <a:lstStyle/>
+          <a:p>
+            <a:r>
+              <a:rPr lang="en-US" dirty="0"/>
+              <a:t>D.O.G. Peek Sneak</a:t>
+            </a:r>
+          </a:p>
+        </p:txBody>
+      </p:sp>
+      <p:pic>
+        <p:nvPicPr>
+          <p:cNvPr id="4" name="Picture 3">
+            <a:extLst>
+              <a:ext uri="{FF2B5EF4-FFF2-40B4-BE49-F238E27FC236}">
+                <a16:creationId xmlns:a16="http://schemas.microsoft.com/office/drawing/2014/main" id="{6001FB43-610A-4A55-8DC8-53C72B09F017}"/>
+              </a:ext>
+            </a:extLst>
+          </p:cNvPr>
+          <p:cNvPicPr>
+            <a:picLocks noChangeAspect="1"/>
+          </p:cNvPicPr>
+          <p:nvPr/>
+        </p:nvPicPr>
+        <p:blipFill>
+          <a:blip r:embed="rId2" cstate="print">
+            <a:extLst>
+              <a:ext uri="{28A0092B-C50C-407E-A947-70E740481C1C}">
+                <a14:useLocalDpi xmlns:a14="http://schemas.microsoft.com/office/drawing/2010/main" val="0"/>
+              </a:ext>
+            </a:extLst>
+          </a:blip>
+          <a:stretch>
+            <a:fillRect/>
+          </a:stretch>
+        </p:blipFill>
+        <p:spPr>
+          <a:xfrm>
+            <a:off x="856115" y="802428"/>
+            <a:ext cx="2811775" cy="5935971"/>
+          </a:xfrm>
+          <a:prstGeom prst="rect">
+            <a:avLst/>
+          </a:prstGeom>
+          <a:effectLst>
+            <a:glow rad="139700">
+              <a:schemeClr val="accent4">
+                <a:satMod val="175000"/>
+                <a:alpha val="40000"/>
+              </a:schemeClr>
+            </a:glow>
+          </a:effectLst>
+        </p:spPr>
+      </p:pic>
+      <p:pic>
+        <p:nvPicPr>
+          <p:cNvPr id="7" name="Picture 6">
+            <a:extLst>
+              <a:ext uri="{FF2B5EF4-FFF2-40B4-BE49-F238E27FC236}">
+                <a16:creationId xmlns:a16="http://schemas.microsoft.com/office/drawing/2014/main" id="{C4E7210F-5E81-491A-B4D2-7FFD1B55C957}"/>
+              </a:ext>
+            </a:extLst>
+          </p:cNvPr>
+          <p:cNvPicPr>
+            <a:picLocks noChangeAspect="1"/>
+          </p:cNvPicPr>
+          <p:nvPr/>
+        </p:nvPicPr>
+        <p:blipFill>
+          <a:blip r:embed="rId3" cstate="print">
+            <a:extLst>
+              <a:ext uri="{28A0092B-C50C-407E-A947-70E740481C1C}">
+                <a14:useLocalDpi xmlns:a14="http://schemas.microsoft.com/office/drawing/2010/main" val="0"/>
+              </a:ext>
+            </a:extLst>
+          </a:blip>
+          <a:stretch>
+            <a:fillRect/>
+          </a:stretch>
+        </p:blipFill>
+        <p:spPr>
+          <a:xfrm>
+            <a:off x="4869302" y="802429"/>
+            <a:ext cx="2811776" cy="5935971"/>
+          </a:xfrm>
+          <a:prstGeom prst="rect">
+            <a:avLst/>
+          </a:prstGeom>
+          <a:effectLst>
+            <a:glow rad="139700">
+              <a:schemeClr val="accent4">
+                <a:satMod val="175000"/>
+                <a:alpha val="40000"/>
+              </a:schemeClr>
+            </a:glow>
+          </a:effectLst>
+        </p:spPr>
+      </p:pic>
+      <p:pic>
+        <p:nvPicPr>
+          <p:cNvPr id="11" name="Picture 10">
+            <a:extLst>
+              <a:ext uri="{FF2B5EF4-FFF2-40B4-BE49-F238E27FC236}">
+                <a16:creationId xmlns:a16="http://schemas.microsoft.com/office/drawing/2014/main" id="{19D38228-7554-4D03-96CA-FCFB4B003F79}"/>
+              </a:ext>
+            </a:extLst>
+          </p:cNvPr>
+          <p:cNvPicPr>
+            <a:picLocks noChangeAspect="1"/>
+          </p:cNvPicPr>
+          <p:nvPr/>
+        </p:nvPicPr>
+        <p:blipFill>
+          <a:blip r:embed="rId4" cstate="print">
+            <a:extLst>
+              <a:ext uri="{28A0092B-C50C-407E-A947-70E740481C1C}">
+                <a14:useLocalDpi xmlns:a14="http://schemas.microsoft.com/office/drawing/2010/main" val="0"/>
+              </a:ext>
+            </a:extLst>
+          </a:blip>
+          <a:stretch>
+            <a:fillRect/>
+          </a:stretch>
+        </p:blipFill>
+        <p:spPr>
+          <a:xfrm>
+            <a:off x="9150770" y="802430"/>
+            <a:ext cx="2811775" cy="5935970"/>
+          </a:xfrm>
+          <a:prstGeom prst="rect">
+            <a:avLst/>
+          </a:prstGeom>
+          <a:effectLst>
+            <a:glow rad="139700">
+              <a:schemeClr val="accent4">
+                <a:satMod val="175000"/>
+                <a:alpha val="40000"/>
+              </a:schemeClr>
+            </a:glow>
+          </a:effectLst>
+        </p:spPr>
+      </p:pic>
+    </p:spTree>
+    <p:extLst>
+      <p:ext uri="{BB962C8B-B14F-4D97-AF65-F5344CB8AC3E}">
+        <p14:creationId xmlns:p14="http://schemas.microsoft.com/office/powerpoint/2010/main" val="275538377"/>
+      </p:ext>
+    </p:extLst>
+  </p:cSld>
+  <p:clrMapOvr>
+    <a:masterClrMapping/>
+  </p:clrMapOvr>
+  <p:transition>
+    <p:fade/>
+  </p:transition>
+</p:sld>
+</file>
+
+<file path=ppt/slides/slide12.xml><?xml version="1.0" encoding="utf-8"?>
+<p:sld xmlns:a="http://schemas.openxmlformats.org/drawingml/2006/main" xmlns:r="http://schemas.openxmlformats.org/officeDocument/2006/relationships" xmlns:p="http://schemas.openxmlformats.org/presentationml/2006/main">
+  <p:cSld>
+    <p:spTree>
+      <p:nvGrpSpPr>
+        <p:cNvPr id="1" name=""/>
+        <p:cNvGrpSpPr/>
+        <p:nvPr/>
+      </p:nvGrpSpPr>
+      <p:grpSpPr>
+        <a:xfrm>
+          <a:off x="0" y="0"/>
+          <a:ext cx="0" cy="0"/>
+          <a:chOff x="0" y="0"/>
+          <a:chExt cx="0" cy="0"/>
+        </a:xfrm>
+      </p:grpSpPr>
+      <p:sp>
+        <p:nvSpPr>
+          <p:cNvPr id="2" name="Title 1">
+            <a:extLst>
+              <a:ext uri="{FF2B5EF4-FFF2-40B4-BE49-F238E27FC236}">
+                <a16:creationId xmlns:a16="http://schemas.microsoft.com/office/drawing/2014/main" id="{C8E1A8E1-16CE-4C74-B723-69BE101856D0}"/>
+              </a:ext>
+            </a:extLst>
+          </p:cNvPr>
+          <p:cNvSpPr>
+            <a:spLocks noGrp="1"/>
+          </p:cNvSpPr>
+          <p:nvPr>
+            <p:ph type="title"/>
+          </p:nvPr>
+        </p:nvSpPr>
+        <p:spPr/>
+        <p:txBody>
+          <a:bodyPr/>
+          <a:lstStyle/>
+          <a:p>
+            <a:r>
+              <a:rPr lang="en-US" dirty="0"/>
+              <a:t>D.O.G. Peek Sneak</a:t>
+            </a:r>
+          </a:p>
+        </p:txBody>
+      </p:sp>
+      <p:pic>
+        <p:nvPicPr>
+          <p:cNvPr id="4" name="Picture 3">
+            <a:extLst>
+              <a:ext uri="{FF2B5EF4-FFF2-40B4-BE49-F238E27FC236}">
+                <a16:creationId xmlns:a16="http://schemas.microsoft.com/office/drawing/2014/main" id="{D5FB95FB-BF55-4E2B-AE89-17901C475884}"/>
+              </a:ext>
+            </a:extLst>
+          </p:cNvPr>
+          <p:cNvPicPr>
+            <a:picLocks noChangeAspect="1"/>
+          </p:cNvPicPr>
+          <p:nvPr/>
+        </p:nvPicPr>
+        <p:blipFill>
+          <a:blip r:embed="rId2" cstate="print">
+            <a:extLst>
+              <a:ext uri="{28A0092B-C50C-407E-A947-70E740481C1C}">
+                <a14:useLocalDpi xmlns:a14="http://schemas.microsoft.com/office/drawing/2010/main" val="0"/>
+              </a:ext>
+            </a:extLst>
+          </a:blip>
+          <a:stretch>
+            <a:fillRect/>
+          </a:stretch>
+        </p:blipFill>
+        <p:spPr>
+          <a:xfrm>
+            <a:off x="906902" y="934763"/>
+            <a:ext cx="2697689" cy="5695122"/>
+          </a:xfrm>
+          <a:prstGeom prst="rect">
+            <a:avLst/>
+          </a:prstGeom>
+          <a:effectLst>
+            <a:glow rad="139700">
+              <a:schemeClr val="accent4">
+                <a:satMod val="175000"/>
+                <a:alpha val="40000"/>
+              </a:schemeClr>
+            </a:glow>
+          </a:effectLst>
+        </p:spPr>
+      </p:pic>
+      <p:pic>
+        <p:nvPicPr>
+          <p:cNvPr id="7" name="Picture 6">
+            <a:extLst>
+              <a:ext uri="{FF2B5EF4-FFF2-40B4-BE49-F238E27FC236}">
+                <a16:creationId xmlns:a16="http://schemas.microsoft.com/office/drawing/2014/main" id="{B816A4B8-1A07-4387-907E-69620839FDE5}"/>
+              </a:ext>
+            </a:extLst>
+          </p:cNvPr>
+          <p:cNvPicPr>
+            <a:picLocks noChangeAspect="1"/>
+          </p:cNvPicPr>
+          <p:nvPr/>
+        </p:nvPicPr>
+        <p:blipFill>
+          <a:blip r:embed="rId3" cstate="print">
+            <a:extLst>
+              <a:ext uri="{28A0092B-C50C-407E-A947-70E740481C1C}">
+                <a14:useLocalDpi xmlns:a14="http://schemas.microsoft.com/office/drawing/2010/main" val="0"/>
+              </a:ext>
+            </a:extLst>
+          </a:blip>
+          <a:stretch>
+            <a:fillRect/>
+          </a:stretch>
+        </p:blipFill>
+        <p:spPr>
+          <a:xfrm>
+            <a:off x="4962067" y="934763"/>
+            <a:ext cx="2710941" cy="5723098"/>
+          </a:xfrm>
+          <a:prstGeom prst="rect">
+            <a:avLst/>
+          </a:prstGeom>
+          <a:effectLst>
+            <a:glow rad="139700">
+              <a:schemeClr val="accent4">
+                <a:satMod val="175000"/>
+                <a:alpha val="40000"/>
+              </a:schemeClr>
+            </a:glow>
+          </a:effectLst>
+        </p:spPr>
+      </p:pic>
+      <p:pic>
+        <p:nvPicPr>
+          <p:cNvPr id="11" name="Picture 10">
+            <a:extLst>
+              <a:ext uri="{FF2B5EF4-FFF2-40B4-BE49-F238E27FC236}">
+                <a16:creationId xmlns:a16="http://schemas.microsoft.com/office/drawing/2014/main" id="{E97707D9-535F-41E3-AD75-19DDF95861EA}"/>
+              </a:ext>
+            </a:extLst>
+          </p:cNvPr>
+          <p:cNvPicPr>
+            <a:picLocks noChangeAspect="1"/>
+          </p:cNvPicPr>
+          <p:nvPr/>
+        </p:nvPicPr>
+        <p:blipFill>
+          <a:blip r:embed="rId4" cstate="print">
+            <a:extLst>
+              <a:ext uri="{28A0092B-C50C-407E-A947-70E740481C1C}">
+                <a14:useLocalDpi xmlns:a14="http://schemas.microsoft.com/office/drawing/2010/main" val="0"/>
+              </a:ext>
+            </a:extLst>
+          </a:blip>
+          <a:stretch>
+            <a:fillRect/>
+          </a:stretch>
+        </p:blipFill>
+        <p:spPr>
+          <a:xfrm>
+            <a:off x="9264856" y="934763"/>
+            <a:ext cx="2697689" cy="5695122"/>
+          </a:xfrm>
+          <a:prstGeom prst="rect">
+            <a:avLst/>
+          </a:prstGeom>
+          <a:effectLst>
+            <a:glow rad="139700">
+              <a:schemeClr val="accent4">
+                <a:satMod val="175000"/>
+                <a:alpha val="40000"/>
+              </a:schemeClr>
+            </a:glow>
+          </a:effectLst>
+        </p:spPr>
+      </p:pic>
+    </p:spTree>
+    <p:extLst>
+      <p:ext uri="{BB962C8B-B14F-4D97-AF65-F5344CB8AC3E}">
+        <p14:creationId xmlns:p14="http://schemas.microsoft.com/office/powerpoint/2010/main" val="3215898495"/>
+      </p:ext>
+    </p:extLst>
+  </p:cSld>
+  <p:clrMapOvr>
+    <a:masterClrMapping/>
+  </p:clrMapOvr>
+  <p:transition>
+    <p:fade/>
+  </p:transition>
+</p:sld>
+</file>
+
+<file path=ppt/slides/slide13.xml><?xml version="1.0" encoding="utf-8"?>
+<p:sld xmlns:a="http://schemas.openxmlformats.org/drawingml/2006/main" xmlns:r="http://schemas.openxmlformats.org/officeDocument/2006/relationships" xmlns:p="http://schemas.openxmlformats.org/presentationml/2006/main">
+  <p:cSld>
+    <p:spTree>
+      <p:nvGrpSpPr>
+        <p:cNvPr id="1" name=""/>
+        <p:cNvGrpSpPr/>
+        <p:nvPr/>
+      </p:nvGrpSpPr>
+      <p:grpSpPr>
+        <a:xfrm>
+          <a:off x="0" y="0"/>
+          <a:ext cx="0" cy="0"/>
+          <a:chOff x="0" y="0"/>
+          <a:chExt cx="0" cy="0"/>
+        </a:xfrm>
+      </p:grpSpPr>
+      <p:sp>
+        <p:nvSpPr>
+          <p:cNvPr id="2" name="Title 1">
+            <a:extLst>
+              <a:ext uri="{FF2B5EF4-FFF2-40B4-BE49-F238E27FC236}">
+                <a16:creationId xmlns:a16="http://schemas.microsoft.com/office/drawing/2014/main" id="{C8E1A8E1-16CE-4C74-B723-69BE101856D0}"/>
+              </a:ext>
+            </a:extLst>
+          </p:cNvPr>
+          <p:cNvSpPr>
+            <a:spLocks noGrp="1"/>
+          </p:cNvSpPr>
+          <p:nvPr>
+            <p:ph type="title"/>
+          </p:nvPr>
+        </p:nvSpPr>
+        <p:spPr/>
+        <p:txBody>
+          <a:bodyPr/>
+          <a:lstStyle/>
+          <a:p>
+            <a:r>
+              <a:rPr lang="en-US" dirty="0"/>
+              <a:t>D.O.G. Peek Sneak</a:t>
+            </a:r>
+          </a:p>
+        </p:txBody>
+      </p:sp>
+      <p:pic>
+        <p:nvPicPr>
+          <p:cNvPr id="5" name="Picture 4">
+            <a:extLst>
+              <a:ext uri="{FF2B5EF4-FFF2-40B4-BE49-F238E27FC236}">
+                <a16:creationId xmlns:a16="http://schemas.microsoft.com/office/drawing/2014/main" id="{D0D71769-8DD9-480F-9758-77A517A42B71}"/>
+              </a:ext>
+            </a:extLst>
+          </p:cNvPr>
+          <p:cNvPicPr>
+            <a:picLocks noChangeAspect="1"/>
+          </p:cNvPicPr>
+          <p:nvPr/>
+        </p:nvPicPr>
+        <p:blipFill>
+          <a:blip r:embed="rId2" cstate="print">
+            <a:extLst>
+              <a:ext uri="{28A0092B-C50C-407E-A947-70E740481C1C}">
+                <a14:useLocalDpi xmlns:a14="http://schemas.microsoft.com/office/drawing/2010/main" val="0"/>
+              </a:ext>
+            </a:extLst>
+          </a:blip>
+          <a:stretch>
+            <a:fillRect/>
+          </a:stretch>
+        </p:blipFill>
+        <p:spPr>
+          <a:xfrm>
+            <a:off x="477977" y="934763"/>
+            <a:ext cx="2702167" cy="5704576"/>
+          </a:xfrm>
+          <a:prstGeom prst="rect">
+            <a:avLst/>
+          </a:prstGeom>
+          <a:effectLst>
+            <a:glow rad="139700">
+              <a:schemeClr val="accent4">
+                <a:satMod val="175000"/>
+                <a:alpha val="40000"/>
+              </a:schemeClr>
+            </a:glow>
+          </a:effectLst>
+        </p:spPr>
+      </p:pic>
+      <p:pic>
+        <p:nvPicPr>
+          <p:cNvPr id="8" name="Picture 7">
+            <a:extLst>
+              <a:ext uri="{FF2B5EF4-FFF2-40B4-BE49-F238E27FC236}">
+                <a16:creationId xmlns:a16="http://schemas.microsoft.com/office/drawing/2014/main" id="{926FF013-B0DC-415E-9C2F-D467435155B3}"/>
+              </a:ext>
+            </a:extLst>
+          </p:cNvPr>
+          <p:cNvPicPr>
+            <a:picLocks noChangeAspect="1"/>
+          </p:cNvPicPr>
+          <p:nvPr/>
+        </p:nvPicPr>
+        <p:blipFill>
+          <a:blip r:embed="rId3" cstate="print">
+            <a:extLst>
+              <a:ext uri="{28A0092B-C50C-407E-A947-70E740481C1C}">
+                <a14:useLocalDpi xmlns:a14="http://schemas.microsoft.com/office/drawing/2010/main" val="0"/>
+              </a:ext>
+            </a:extLst>
+          </a:blip>
+          <a:stretch>
+            <a:fillRect/>
+          </a:stretch>
+        </p:blipFill>
+        <p:spPr>
+          <a:xfrm>
+            <a:off x="4869177" y="934763"/>
+            <a:ext cx="2702167" cy="5704576"/>
+          </a:xfrm>
+          <a:prstGeom prst="rect">
+            <a:avLst/>
+          </a:prstGeom>
+          <a:effectLst>
+            <a:glow rad="139700">
+              <a:schemeClr val="accent4">
+                <a:satMod val="175000"/>
+                <a:alpha val="40000"/>
+              </a:schemeClr>
+            </a:glow>
+          </a:effectLst>
+        </p:spPr>
+      </p:pic>
+      <p:pic>
+        <p:nvPicPr>
+          <p:cNvPr id="10" name="Picture 9">
+            <a:extLst>
+              <a:ext uri="{FF2B5EF4-FFF2-40B4-BE49-F238E27FC236}">
+                <a16:creationId xmlns:a16="http://schemas.microsoft.com/office/drawing/2014/main" id="{594082D7-9EFB-47F6-B28F-F7E1A2598FB5}"/>
+              </a:ext>
+            </a:extLst>
+          </p:cNvPr>
+          <p:cNvPicPr>
+            <a:picLocks noChangeAspect="1"/>
+          </p:cNvPicPr>
+          <p:nvPr/>
+        </p:nvPicPr>
+        <p:blipFill>
+          <a:blip r:embed="rId4" cstate="print">
+            <a:extLst>
+              <a:ext uri="{28A0092B-C50C-407E-A947-70E740481C1C}">
+                <a14:useLocalDpi xmlns:a14="http://schemas.microsoft.com/office/drawing/2010/main" val="0"/>
+              </a:ext>
+            </a:extLst>
+          </a:blip>
+          <a:stretch>
+            <a:fillRect/>
+          </a:stretch>
+        </p:blipFill>
+        <p:spPr>
+          <a:xfrm>
+            <a:off x="9260378" y="934763"/>
+            <a:ext cx="2702167" cy="5704576"/>
+          </a:xfrm>
+          <a:prstGeom prst="rect">
+            <a:avLst/>
+          </a:prstGeom>
+          <a:effectLst>
+            <a:glow rad="139700">
+              <a:schemeClr val="accent4">
+                <a:satMod val="175000"/>
+                <a:alpha val="40000"/>
+              </a:schemeClr>
+            </a:glow>
+          </a:effectLst>
+        </p:spPr>
+      </p:pic>
+    </p:spTree>
+    <p:extLst>
+      <p:ext uri="{BB962C8B-B14F-4D97-AF65-F5344CB8AC3E}">
+        <p14:creationId xmlns:p14="http://schemas.microsoft.com/office/powerpoint/2010/main" val="1345474824"/>
+      </p:ext>
+    </p:extLst>
+  </p:cSld>
+  <p:clrMapOvr>
+    <a:masterClrMapping/>
+  </p:clrMapOvr>
+  <p:transition>
+    <p:fade/>
+  </p:transition>
+</p:sld>
+</file>
+
+<file path=ppt/slides/slide14.xml><?xml version="1.0" encoding="utf-8"?>
+<p:sld xmlns:a="http://schemas.openxmlformats.org/drawingml/2006/main" xmlns:r="http://schemas.openxmlformats.org/officeDocument/2006/relationships" xmlns:p="http://schemas.openxmlformats.org/presentationml/2006/main">
+  <p:cSld>
+    <p:spTree>
+      <p:nvGrpSpPr>
+        <p:cNvPr id="1" name=""/>
+        <p:cNvGrpSpPr/>
+        <p:nvPr/>
+      </p:nvGrpSpPr>
+      <p:grpSpPr>
+        <a:xfrm>
+          <a:off x="0" y="0"/>
+          <a:ext cx="0" cy="0"/>
+          <a:chOff x="0" y="0"/>
+          <a:chExt cx="0" cy="0"/>
+        </a:xfrm>
+      </p:grpSpPr>
+      <p:sp>
+        <p:nvSpPr>
+          <p:cNvPr id="2" name="Title 1">
+            <a:extLst>
+              <a:ext uri="{FF2B5EF4-FFF2-40B4-BE49-F238E27FC236}">
+                <a16:creationId xmlns:a16="http://schemas.microsoft.com/office/drawing/2014/main" id="{C8E1A8E1-16CE-4C74-B723-69BE101856D0}"/>
+              </a:ext>
+            </a:extLst>
+          </p:cNvPr>
+          <p:cNvSpPr>
+            <a:spLocks noGrp="1"/>
+          </p:cNvSpPr>
+          <p:nvPr>
+            <p:ph type="title"/>
+          </p:nvPr>
+        </p:nvSpPr>
+        <p:spPr/>
+        <p:txBody>
+          <a:bodyPr/>
+          <a:lstStyle/>
+          <a:p>
+            <a:r>
+              <a:rPr lang="en-US" dirty="0"/>
+              <a:t>D.O.G. Peek Sneak</a:t>
+            </a:r>
+          </a:p>
+        </p:txBody>
+      </p:sp>
+      <p:pic>
+        <p:nvPicPr>
+          <p:cNvPr id="4" name="Picture 3">
+            <a:extLst>
+              <a:ext uri="{FF2B5EF4-FFF2-40B4-BE49-F238E27FC236}">
+                <a16:creationId xmlns:a16="http://schemas.microsoft.com/office/drawing/2014/main" id="{B0508108-2A29-4FF9-A393-CBE17DF7DCCA}"/>
+              </a:ext>
+            </a:extLst>
+          </p:cNvPr>
+          <p:cNvPicPr>
+            <a:picLocks noChangeAspect="1"/>
+          </p:cNvPicPr>
+          <p:nvPr/>
+        </p:nvPicPr>
+        <p:blipFill>
+          <a:blip r:embed="rId2" cstate="print">
+            <a:extLst>
+              <a:ext uri="{28A0092B-C50C-407E-A947-70E740481C1C}">
+                <a14:useLocalDpi xmlns:a14="http://schemas.microsoft.com/office/drawing/2010/main" val="0"/>
+              </a:ext>
+            </a:extLst>
+          </a:blip>
+          <a:stretch>
+            <a:fillRect/>
+          </a:stretch>
+        </p:blipFill>
+        <p:spPr>
+          <a:xfrm>
+            <a:off x="844810" y="934761"/>
+            <a:ext cx="2697689" cy="5695122"/>
+          </a:xfrm>
+          <a:prstGeom prst="rect">
+            <a:avLst/>
+          </a:prstGeom>
+          <a:effectLst>
+            <a:glow rad="139700">
+              <a:schemeClr val="accent4">
+                <a:satMod val="175000"/>
+                <a:alpha val="40000"/>
+              </a:schemeClr>
+            </a:glow>
+          </a:effectLst>
+        </p:spPr>
+      </p:pic>
+      <p:pic>
+        <p:nvPicPr>
+          <p:cNvPr id="7" name="Picture 6">
+            <a:extLst>
+              <a:ext uri="{FF2B5EF4-FFF2-40B4-BE49-F238E27FC236}">
+                <a16:creationId xmlns:a16="http://schemas.microsoft.com/office/drawing/2014/main" id="{2E5A28DE-F565-4756-A7AC-4C93FED45097}"/>
+              </a:ext>
+            </a:extLst>
+          </p:cNvPr>
+          <p:cNvPicPr>
+            <a:picLocks noChangeAspect="1"/>
+          </p:cNvPicPr>
+          <p:nvPr/>
+        </p:nvPicPr>
+        <p:blipFill>
+          <a:blip r:embed="rId3" cstate="print">
+            <a:extLst>
+              <a:ext uri="{28A0092B-C50C-407E-A947-70E740481C1C}">
+                <a14:useLocalDpi xmlns:a14="http://schemas.microsoft.com/office/drawing/2010/main" val="0"/>
+              </a:ext>
+            </a:extLst>
+          </a:blip>
+          <a:stretch>
+            <a:fillRect/>
+          </a:stretch>
+        </p:blipFill>
+        <p:spPr>
+          <a:xfrm>
+            <a:off x="5054834" y="934763"/>
+            <a:ext cx="2697688" cy="5695120"/>
+          </a:xfrm>
+          <a:prstGeom prst="rect">
+            <a:avLst/>
+          </a:prstGeom>
+          <a:effectLst>
+            <a:glow rad="139700">
+              <a:schemeClr val="accent4">
+                <a:satMod val="175000"/>
+                <a:alpha val="40000"/>
+              </a:schemeClr>
+            </a:glow>
+          </a:effectLst>
+        </p:spPr>
+      </p:pic>
+      <p:pic>
+        <p:nvPicPr>
+          <p:cNvPr id="11" name="Picture 10">
+            <a:extLst>
+              <a:ext uri="{FF2B5EF4-FFF2-40B4-BE49-F238E27FC236}">
+                <a16:creationId xmlns:a16="http://schemas.microsoft.com/office/drawing/2014/main" id="{8671BC84-A725-4BBC-8450-092DDB10F044}"/>
+              </a:ext>
+            </a:extLst>
+          </p:cNvPr>
+          <p:cNvPicPr>
+            <a:picLocks noChangeAspect="1"/>
+          </p:cNvPicPr>
+          <p:nvPr/>
+        </p:nvPicPr>
+        <p:blipFill>
+          <a:blip r:embed="rId4" cstate="print">
+            <a:extLst>
+              <a:ext uri="{28A0092B-C50C-407E-A947-70E740481C1C}">
+                <a14:useLocalDpi xmlns:a14="http://schemas.microsoft.com/office/drawing/2010/main" val="0"/>
+              </a:ext>
+            </a:extLst>
+          </a:blip>
+          <a:stretch>
+            <a:fillRect/>
+          </a:stretch>
+        </p:blipFill>
+        <p:spPr>
+          <a:xfrm>
+            <a:off x="9264857" y="934763"/>
+            <a:ext cx="2697688" cy="5695120"/>
+          </a:xfrm>
+          <a:prstGeom prst="rect">
+            <a:avLst/>
+          </a:prstGeom>
+          <a:effectLst>
+            <a:glow rad="139700">
+              <a:schemeClr val="accent4">
+                <a:satMod val="175000"/>
+                <a:alpha val="40000"/>
+              </a:schemeClr>
+            </a:glow>
+          </a:effectLst>
+        </p:spPr>
+      </p:pic>
+    </p:spTree>
+    <p:extLst>
+      <p:ext uri="{BB962C8B-B14F-4D97-AF65-F5344CB8AC3E}">
+        <p14:creationId xmlns:p14="http://schemas.microsoft.com/office/powerpoint/2010/main" val="3332427730"/>
+      </p:ext>
+    </p:extLst>
+  </p:cSld>
+  <p:clrMapOvr>
+    <a:masterClrMapping/>
+  </p:clrMapOvr>
+  <p:transition>
+    <p:fade/>
+  </p:transition>
+</p:sld>
+</file>
+
+<file path=ppt/slides/slide15.xml><?xml version="1.0" encoding="utf-8"?>
+<p:sld xmlns:a="http://schemas.openxmlformats.org/drawingml/2006/main" xmlns:r="http://schemas.openxmlformats.org/officeDocument/2006/relationships" xmlns:p="http://schemas.openxmlformats.org/presentationml/2006/main">
+  <p:cSld>
+    <p:spTree>
+      <p:nvGrpSpPr>
+        <p:cNvPr id="1" name=""/>
+        <p:cNvGrpSpPr/>
+        <p:nvPr/>
+      </p:nvGrpSpPr>
+      <p:grpSpPr>
+        <a:xfrm>
+          <a:off x="0" y="0"/>
+          <a:ext cx="0" cy="0"/>
+          <a:chOff x="0" y="0"/>
+          <a:chExt cx="0" cy="0"/>
+        </a:xfrm>
+      </p:grpSpPr>
+      <p:sp>
+        <p:nvSpPr>
+          <p:cNvPr id="2" name="Title 1">
+            <a:extLst>
+              <a:ext uri="{FF2B5EF4-FFF2-40B4-BE49-F238E27FC236}">
+                <a16:creationId xmlns:a16="http://schemas.microsoft.com/office/drawing/2014/main" id="{C8E1A8E1-16CE-4C74-B723-69BE101856D0}"/>
+              </a:ext>
+            </a:extLst>
+          </p:cNvPr>
+          <p:cNvSpPr>
+            <a:spLocks noGrp="1"/>
+          </p:cNvSpPr>
+          <p:nvPr>
+            <p:ph type="title"/>
+          </p:nvPr>
+        </p:nvSpPr>
+        <p:spPr/>
+        <p:txBody>
+          <a:bodyPr/>
+          <a:lstStyle/>
+          <a:p>
+            <a:r>
+              <a:rPr lang="en-US" dirty="0"/>
+              <a:t>D.O.G. Peek Sneak</a:t>
+            </a:r>
+          </a:p>
+        </p:txBody>
+      </p:sp>
+      <p:pic>
+        <p:nvPicPr>
+          <p:cNvPr id="5" name="Picture 4">
+            <a:extLst>
+              <a:ext uri="{FF2B5EF4-FFF2-40B4-BE49-F238E27FC236}">
+                <a16:creationId xmlns:a16="http://schemas.microsoft.com/office/drawing/2014/main" id="{25B4A9D8-7260-43C9-86CF-523BFF99F540}"/>
+              </a:ext>
+            </a:extLst>
+          </p:cNvPr>
+          <p:cNvPicPr>
+            <a:picLocks noChangeAspect="1"/>
+          </p:cNvPicPr>
+          <p:nvPr/>
+        </p:nvPicPr>
+        <p:blipFill>
+          <a:blip r:embed="rId2" cstate="print">
+            <a:extLst>
+              <a:ext uri="{28A0092B-C50C-407E-A947-70E740481C1C}">
+                <a14:useLocalDpi xmlns:a14="http://schemas.microsoft.com/office/drawing/2010/main" val="0"/>
+              </a:ext>
+            </a:extLst>
+          </a:blip>
+          <a:stretch>
+            <a:fillRect/>
+          </a:stretch>
+        </p:blipFill>
+        <p:spPr>
+          <a:xfrm>
+            <a:off x="2107016" y="815493"/>
+            <a:ext cx="2743279" cy="5791367"/>
+          </a:xfrm>
+          <a:prstGeom prst="rect">
+            <a:avLst/>
+          </a:prstGeom>
+          <a:effectLst>
+            <a:glow rad="139700">
+              <a:schemeClr val="accent4">
+                <a:satMod val="175000"/>
+                <a:alpha val="40000"/>
+              </a:schemeClr>
+            </a:glow>
+          </a:effectLst>
+        </p:spPr>
+      </p:pic>
+      <p:pic>
+        <p:nvPicPr>
+          <p:cNvPr id="8" name="Picture 7">
+            <a:extLst>
+              <a:ext uri="{FF2B5EF4-FFF2-40B4-BE49-F238E27FC236}">
+                <a16:creationId xmlns:a16="http://schemas.microsoft.com/office/drawing/2014/main" id="{1A2D7F45-B4A3-466D-A905-5AA88A244380}"/>
+              </a:ext>
+            </a:extLst>
+          </p:cNvPr>
+          <p:cNvPicPr>
+            <a:picLocks noChangeAspect="1"/>
+          </p:cNvPicPr>
+          <p:nvPr/>
+        </p:nvPicPr>
+        <p:blipFill>
+          <a:blip r:embed="rId3" cstate="print">
+            <a:extLst>
+              <a:ext uri="{28A0092B-C50C-407E-A947-70E740481C1C}">
+                <a14:useLocalDpi xmlns:a14="http://schemas.microsoft.com/office/drawing/2010/main" val="0"/>
+              </a:ext>
+            </a:extLst>
+          </a:blip>
+          <a:stretch>
+            <a:fillRect/>
+          </a:stretch>
+        </p:blipFill>
+        <p:spPr>
+          <a:xfrm>
+            <a:off x="7081858" y="815494"/>
+            <a:ext cx="2743279" cy="5791367"/>
+          </a:xfrm>
+          <a:prstGeom prst="rect">
+            <a:avLst/>
+          </a:prstGeom>
+          <a:effectLst>
+            <a:glow rad="139700">
+              <a:schemeClr val="accent4">
+                <a:satMod val="175000"/>
+                <a:alpha val="40000"/>
+              </a:schemeClr>
+            </a:glow>
+          </a:effectLst>
+        </p:spPr>
+      </p:pic>
+    </p:spTree>
+    <p:extLst>
+      <p:ext uri="{BB962C8B-B14F-4D97-AF65-F5344CB8AC3E}">
+        <p14:creationId xmlns:p14="http://schemas.microsoft.com/office/powerpoint/2010/main" val="3180604731"/>
+      </p:ext>
+    </p:extLst>
+  </p:cSld>
+  <p:clrMapOvr>
+    <a:masterClrMapping/>
+  </p:clrMapOvr>
+  <p:transition>
+    <p:fade/>
+  </p:transition>
+</p:sld>
+</file>
+
+<file path=ppt/slides/slide16.xml><?xml version="1.0" encoding="utf-8"?>
 <p:sld xmlns:a="http://schemas.openxmlformats.org/drawingml/2006/main" xmlns:r="http://schemas.openxmlformats.org/officeDocument/2006/relationships" xmlns:p="http://schemas.openxmlformats.org/presentationml/2006/main">
   <p:cSld>
     <p:spTree>
@@ -43016,7 +44200,7 @@
 </p:sld>
 </file>
 
-<file path=ppt/slides/slide11.xml><?xml version="1.0" encoding="utf-8"?>
+<file path=ppt/slides/slide17.xml><?xml version="1.0" encoding="utf-8"?>
 <p:sld xmlns:a="http://schemas.openxmlformats.org/drawingml/2006/main" xmlns:r="http://schemas.openxmlformats.org/officeDocument/2006/relationships" xmlns:p="http://schemas.openxmlformats.org/presentationml/2006/main">
   <p:cSld>
     <p:spTree>
@@ -43458,7 +44642,7 @@
 </p:sld>
 </file>
 
-<file path=ppt/slides/slide12.xml><?xml version="1.0" encoding="utf-8"?>
+<file path=ppt/slides/slide18.xml><?xml version="1.0" encoding="utf-8"?>
 <p:sld xmlns:a="http://schemas.openxmlformats.org/drawingml/2006/main" xmlns:r="http://schemas.openxmlformats.org/officeDocument/2006/relationships" xmlns:p="http://schemas.openxmlformats.org/presentationml/2006/main">
   <p:cSld>
     <p:spTree>
@@ -43954,475 +45138,7 @@
 </p:sld>
 </file>
 
-<file path=ppt/slides/slide13.xml><?xml version="1.0" encoding="utf-8"?>
-<p:sld xmlns:a="http://schemas.openxmlformats.org/drawingml/2006/main" xmlns:r="http://schemas.openxmlformats.org/officeDocument/2006/relationships" xmlns:p="http://schemas.openxmlformats.org/presentationml/2006/main">
-  <p:cSld>
-    <p:bg>
-      <p:bgPr>
-        <a:solidFill>
-          <a:schemeClr val="bg1"/>
-        </a:solidFill>
-        <a:effectLst/>
-      </p:bgPr>
-    </p:bg>
-    <p:spTree>
-      <p:nvGrpSpPr>
-        <p:cNvPr id="1" name=""/>
-        <p:cNvGrpSpPr/>
-        <p:nvPr/>
-      </p:nvGrpSpPr>
-      <p:grpSpPr>
-        <a:xfrm>
-          <a:off x="0" y="0"/>
-          <a:ext cx="0" cy="0"/>
-          <a:chOff x="0" y="0"/>
-          <a:chExt cx="0" cy="0"/>
-        </a:xfrm>
-      </p:grpSpPr>
-      <p:sp>
-        <p:nvSpPr>
-          <p:cNvPr id="4" name="Text Placeholder 3">
-            <a:extLst>
-              <a:ext uri="{FF2B5EF4-FFF2-40B4-BE49-F238E27FC236}">
-                <a16:creationId xmlns:a16="http://schemas.microsoft.com/office/drawing/2014/main" id="{6F256A01-4AA8-439A-837A-571E043AA08F}"/>
-              </a:ext>
-            </a:extLst>
-          </p:cNvPr>
-          <p:cNvSpPr>
-            <a:spLocks noGrp="1"/>
-          </p:cNvSpPr>
-          <p:nvPr>
-            <p:ph type="body" sz="quarter" idx="10"/>
-          </p:nvPr>
-        </p:nvSpPr>
-        <p:spPr>
-          <a:xfrm>
-            <a:off x="701040" y="532891"/>
-            <a:ext cx="9086772" cy="520310"/>
-          </a:xfrm>
-        </p:spPr>
-        <p:txBody>
-          <a:bodyPr>
-            <a:normAutofit fontScale="92500" lnSpcReduction="10000"/>
-          </a:bodyPr>
-          <a:lstStyle/>
-          <a:p>
-            <a:pPr marL="0" indent="0">
-              <a:buNone/>
-            </a:pPr>
-            <a:r>
-              <a:rPr lang="en-US" sz="3200" b="1" dirty="0"/>
-              <a:t>D.O.G  - Sneak Preview / Snapshots</a:t>
-            </a:r>
-          </a:p>
-        </p:txBody>
-      </p:sp>
-      <p:sp>
-        <p:nvSpPr>
-          <p:cNvPr id="14" name="Text Placeholder 3">
-            <a:extLst>
-              <a:ext uri="{FF2B5EF4-FFF2-40B4-BE49-F238E27FC236}">
-                <a16:creationId xmlns:a16="http://schemas.microsoft.com/office/drawing/2014/main" id="{9DA39B4E-D140-4422-9288-FA1802AAB484}"/>
-              </a:ext>
-            </a:extLst>
-          </p:cNvPr>
-          <p:cNvSpPr txBox="1">
-            <a:spLocks/>
-          </p:cNvSpPr>
-          <p:nvPr/>
-        </p:nvSpPr>
-        <p:spPr>
-          <a:xfrm>
-            <a:off x="336892" y="5344531"/>
-            <a:ext cx="10663851" cy="1650158"/>
-          </a:xfrm>
-          <a:prstGeom prst="rect">
-            <a:avLst/>
-          </a:prstGeom>
-        </p:spPr>
-        <p:txBody>
-          <a:bodyPr vert="horz" lIns="91440" tIns="45720" rIns="91440" bIns="45720" rtlCol="0">
-            <a:normAutofit/>
-          </a:bodyPr>
-          <a:lstStyle>
-            <a:lvl1pPr marL="233363" indent="-233363" algn="l" rtl="0" fontAlgn="base">
-              <a:lnSpc>
-                <a:spcPct val="100000"/>
-              </a:lnSpc>
-              <a:spcBef>
-                <a:spcPts val="575"/>
-              </a:spcBef>
-              <a:spcAft>
-                <a:spcPts val="75"/>
-              </a:spcAft>
-              <a:buClr>
-                <a:schemeClr val="tx1">
-                  <a:lumMod val="85000"/>
-                  <a:lumOff val="15000"/>
-                </a:schemeClr>
-              </a:buClr>
-              <a:buSzPct val="80000"/>
-              <a:buFont typeface="Arial" pitchFamily="34" charset="0"/>
-              <a:buChar char="•"/>
-              <a:defRPr sz="2400" b="0">
-                <a:solidFill>
-                  <a:srgbClr val="000000"/>
-                </a:solidFill>
-                <a:latin typeface="+mn-lt"/>
-                <a:ea typeface="+mn-ea"/>
-                <a:cs typeface="+mn-cs"/>
-              </a:defRPr>
-            </a:lvl1pPr>
-            <a:lvl2pPr marL="401638" indent="-168275" algn="l" rtl="0" fontAlgn="base">
-              <a:lnSpc>
-                <a:spcPct val="100000"/>
-              </a:lnSpc>
-              <a:spcBef>
-                <a:spcPts val="575"/>
-              </a:spcBef>
-              <a:spcAft>
-                <a:spcPts val="75"/>
-              </a:spcAft>
-              <a:buClr>
-                <a:schemeClr val="tx1"/>
-              </a:buClr>
-              <a:buSzPct val="80000"/>
-              <a:buFont typeface="Arial" pitchFamily="34" charset="0"/>
-              <a:buChar char="−"/>
-              <a:defRPr sz="2200">
-                <a:solidFill>
-                  <a:srgbClr val="000000"/>
-                </a:solidFill>
-                <a:latin typeface="+mn-lt"/>
-              </a:defRPr>
-            </a:lvl2pPr>
-            <a:lvl3pPr marL="569913" indent="-168275" algn="l" rtl="0" fontAlgn="base">
-              <a:lnSpc>
-                <a:spcPct val="100000"/>
-              </a:lnSpc>
-              <a:spcBef>
-                <a:spcPts val="575"/>
-              </a:spcBef>
-              <a:spcAft>
-                <a:spcPts val="75"/>
-              </a:spcAft>
-              <a:buClr>
-                <a:schemeClr val="tx1"/>
-              </a:buClr>
-              <a:buSzPct val="80000"/>
-              <a:buFont typeface="Wingdings" pitchFamily="2" charset="2"/>
-              <a:buChar char="§"/>
-              <a:defRPr sz="2000">
-                <a:solidFill>
-                  <a:srgbClr val="000000"/>
-                </a:solidFill>
-                <a:latin typeface="+mn-lt"/>
-              </a:defRPr>
-            </a:lvl3pPr>
-            <a:lvl4pPr marL="746125" indent="-176213" algn="l" rtl="0" fontAlgn="base">
-              <a:lnSpc>
-                <a:spcPct val="100000"/>
-              </a:lnSpc>
-              <a:spcBef>
-                <a:spcPts val="575"/>
-              </a:spcBef>
-              <a:spcAft>
-                <a:spcPts val="75"/>
-              </a:spcAft>
-              <a:buClr>
-                <a:schemeClr val="tx1"/>
-              </a:buClr>
-              <a:buSzPct val="80000"/>
-              <a:buFont typeface="Arial" pitchFamily="34" charset="0"/>
-              <a:buChar char="•"/>
-              <a:defRPr sz="1800">
-                <a:solidFill>
-                  <a:srgbClr val="000000"/>
-                </a:solidFill>
-                <a:latin typeface="+mn-lt"/>
-              </a:defRPr>
-            </a:lvl4pPr>
-            <a:lvl5pPr marL="969963" indent="-223838" algn="l" rtl="0" fontAlgn="base">
-              <a:lnSpc>
-                <a:spcPct val="100000"/>
-              </a:lnSpc>
-              <a:spcBef>
-                <a:spcPts val="575"/>
-              </a:spcBef>
-              <a:spcAft>
-                <a:spcPts val="75"/>
-              </a:spcAft>
-              <a:buClr>
-                <a:schemeClr val="tx1"/>
-              </a:buClr>
-              <a:buSzPct val="70000"/>
-              <a:buFont typeface="Arial" pitchFamily="34" charset="0"/>
-              <a:buChar char="−"/>
-              <a:defRPr sz="1600">
-                <a:solidFill>
-                  <a:srgbClr val="000000"/>
-                </a:solidFill>
-                <a:latin typeface="+mn-lt"/>
-              </a:defRPr>
-            </a:lvl5pPr>
-            <a:lvl6pPr marL="2230438" indent="-157163" algn="l" rtl="0" fontAlgn="base">
-              <a:spcBef>
-                <a:spcPct val="20000"/>
-              </a:spcBef>
-              <a:spcAft>
-                <a:spcPct val="3000"/>
-              </a:spcAft>
-              <a:buClr>
-                <a:schemeClr val="tx1"/>
-              </a:buClr>
-              <a:buSzPct val="70000"/>
-              <a:buFont typeface="Arial" charset="0"/>
-              <a:buChar char="►"/>
-              <a:defRPr sz="1400">
-                <a:solidFill>
-                  <a:srgbClr val="000000"/>
-                </a:solidFill>
-                <a:latin typeface="+mn-lt"/>
-              </a:defRPr>
-            </a:lvl6pPr>
-            <a:lvl7pPr marL="2687638" indent="-157163" algn="l" rtl="0" fontAlgn="base">
-              <a:spcBef>
-                <a:spcPct val="20000"/>
-              </a:spcBef>
-              <a:spcAft>
-                <a:spcPct val="3000"/>
-              </a:spcAft>
-              <a:buClr>
-                <a:schemeClr val="tx1"/>
-              </a:buClr>
-              <a:buSzPct val="70000"/>
-              <a:buFont typeface="Arial" charset="0"/>
-              <a:buChar char="►"/>
-              <a:defRPr sz="1400">
-                <a:solidFill>
-                  <a:srgbClr val="000000"/>
-                </a:solidFill>
-                <a:latin typeface="+mn-lt"/>
-              </a:defRPr>
-            </a:lvl7pPr>
-            <a:lvl8pPr marL="3144838" indent="-157163" algn="l" rtl="0" fontAlgn="base">
-              <a:spcBef>
-                <a:spcPct val="20000"/>
-              </a:spcBef>
-              <a:spcAft>
-                <a:spcPct val="3000"/>
-              </a:spcAft>
-              <a:buClr>
-                <a:schemeClr val="tx1"/>
-              </a:buClr>
-              <a:buSzPct val="70000"/>
-              <a:buFont typeface="Arial" charset="0"/>
-              <a:buChar char="►"/>
-              <a:defRPr sz="1400">
-                <a:solidFill>
-                  <a:srgbClr val="000000"/>
-                </a:solidFill>
-                <a:latin typeface="+mn-lt"/>
-              </a:defRPr>
-            </a:lvl8pPr>
-            <a:lvl9pPr marL="3602038" indent="-157163" algn="l" rtl="0" fontAlgn="base">
-              <a:spcBef>
-                <a:spcPct val="20000"/>
-              </a:spcBef>
-              <a:spcAft>
-                <a:spcPct val="3000"/>
-              </a:spcAft>
-              <a:buClr>
-                <a:schemeClr val="tx1"/>
-              </a:buClr>
-              <a:buSzPct val="70000"/>
-              <a:buFont typeface="Arial" charset="0"/>
-              <a:buChar char="►"/>
-              <a:defRPr sz="1400">
-                <a:solidFill>
-                  <a:srgbClr val="000000"/>
-                </a:solidFill>
-                <a:latin typeface="+mn-lt"/>
-              </a:defRPr>
-            </a:lvl9pPr>
-          </a:lstStyle>
-          <a:p>
-            <a:pPr marL="0" indent="0">
-              <a:buNone/>
-            </a:pPr>
-            <a:endParaRPr lang="en-US" sz="1600" kern="0" dirty="0"/>
-          </a:p>
-        </p:txBody>
-      </p:sp>
-      <p:pic>
-        <p:nvPicPr>
-          <p:cNvPr id="2" name="Picture 1">
-            <a:extLst>
-              <a:ext uri="{FF2B5EF4-FFF2-40B4-BE49-F238E27FC236}">
-                <a16:creationId xmlns:a16="http://schemas.microsoft.com/office/drawing/2014/main" id="{48472E5E-6525-45AF-9E67-922DA45F4A6C}"/>
-              </a:ext>
-            </a:extLst>
-          </p:cNvPr>
-          <p:cNvPicPr>
-            <a:picLocks noChangeAspect="1"/>
-          </p:cNvPicPr>
-          <p:nvPr/>
-        </p:nvPicPr>
-        <p:blipFill>
-          <a:blip r:embed="rId3"/>
-          <a:stretch>
-            <a:fillRect/>
-          </a:stretch>
-        </p:blipFill>
-        <p:spPr>
-          <a:xfrm>
-            <a:off x="264160" y="1053201"/>
-            <a:ext cx="3043785" cy="4064000"/>
-          </a:xfrm>
-          <a:prstGeom prst="rect">
-            <a:avLst/>
-          </a:prstGeom>
-          <a:effectLst>
-            <a:glow rad="139700">
-              <a:schemeClr val="accent4">
-                <a:satMod val="175000"/>
-                <a:alpha val="40000"/>
-              </a:schemeClr>
-            </a:glow>
-          </a:effectLst>
-        </p:spPr>
-      </p:pic>
-      <p:pic>
-        <p:nvPicPr>
-          <p:cNvPr id="3" name="Picture 2">
-            <a:extLst>
-              <a:ext uri="{FF2B5EF4-FFF2-40B4-BE49-F238E27FC236}">
-                <a16:creationId xmlns:a16="http://schemas.microsoft.com/office/drawing/2014/main" id="{413C091B-3CDE-4634-8C0F-6A4B2938B4F5}"/>
-              </a:ext>
-            </a:extLst>
-          </p:cNvPr>
-          <p:cNvPicPr>
-            <a:picLocks noChangeAspect="1"/>
-          </p:cNvPicPr>
-          <p:nvPr/>
-        </p:nvPicPr>
-        <p:blipFill>
-          <a:blip r:embed="rId4"/>
-          <a:stretch>
-            <a:fillRect/>
-          </a:stretch>
-        </p:blipFill>
-        <p:spPr>
-          <a:xfrm>
-            <a:off x="2360649" y="2418080"/>
-            <a:ext cx="3374866" cy="4064000"/>
-          </a:xfrm>
-          <a:prstGeom prst="rect">
-            <a:avLst/>
-          </a:prstGeom>
-          <a:effectLst>
-            <a:glow rad="139700">
-              <a:schemeClr val="accent4">
-                <a:satMod val="175000"/>
-                <a:alpha val="40000"/>
-              </a:schemeClr>
-            </a:glow>
-          </a:effectLst>
-        </p:spPr>
-      </p:pic>
-      <p:pic>
-        <p:nvPicPr>
-          <p:cNvPr id="5" name="Picture 4">
-            <a:extLst>
-              <a:ext uri="{FF2B5EF4-FFF2-40B4-BE49-F238E27FC236}">
-                <a16:creationId xmlns:a16="http://schemas.microsoft.com/office/drawing/2014/main" id="{702BFDD4-4801-4536-AF97-7D3DED9D6585}"/>
-              </a:ext>
-            </a:extLst>
-          </p:cNvPr>
-          <p:cNvPicPr>
-            <a:picLocks noChangeAspect="1"/>
-          </p:cNvPicPr>
-          <p:nvPr/>
-        </p:nvPicPr>
-        <p:blipFill>
-          <a:blip r:embed="rId5"/>
-          <a:stretch>
-            <a:fillRect/>
-          </a:stretch>
-        </p:blipFill>
-        <p:spPr>
-          <a:xfrm>
-            <a:off x="6540398" y="1040187"/>
-            <a:ext cx="3054704" cy="3592773"/>
-          </a:xfrm>
-          <a:prstGeom prst="rect">
-            <a:avLst/>
-          </a:prstGeom>
-          <a:effectLst>
-            <a:glow rad="139700">
-              <a:schemeClr val="accent4">
-                <a:satMod val="175000"/>
-                <a:alpha val="40000"/>
-              </a:schemeClr>
-            </a:glow>
-          </a:effectLst>
-        </p:spPr>
-      </p:pic>
-      <p:pic>
-        <p:nvPicPr>
-          <p:cNvPr id="6" name="Picture 5">
-            <a:extLst>
-              <a:ext uri="{FF2B5EF4-FFF2-40B4-BE49-F238E27FC236}">
-                <a16:creationId xmlns:a16="http://schemas.microsoft.com/office/drawing/2014/main" id="{0953D182-5650-42FB-8537-A2CFE87CECD6}"/>
-              </a:ext>
-            </a:extLst>
-          </p:cNvPr>
-          <p:cNvPicPr>
-            <a:picLocks noChangeAspect="1"/>
-          </p:cNvPicPr>
-          <p:nvPr/>
-        </p:nvPicPr>
-        <p:blipFill>
-          <a:blip r:embed="rId6"/>
-          <a:stretch>
-            <a:fillRect/>
-          </a:stretch>
-        </p:blipFill>
-        <p:spPr>
-          <a:xfrm>
-            <a:off x="8673142" y="2646095"/>
-            <a:ext cx="3306810" cy="3973730"/>
-          </a:xfrm>
-          <a:prstGeom prst="rect">
-            <a:avLst/>
-          </a:prstGeom>
-          <a:effectLst>
-            <a:glow rad="139700">
-              <a:schemeClr val="accent4">
-                <a:satMod val="175000"/>
-                <a:alpha val="40000"/>
-              </a:schemeClr>
-            </a:glow>
-          </a:effectLst>
-        </p:spPr>
-      </p:pic>
-    </p:spTree>
-    <p:extLst>
-      <p:ext uri="{BB962C8B-B14F-4D97-AF65-F5344CB8AC3E}">
-        <p14:creationId xmlns:p14="http://schemas.microsoft.com/office/powerpoint/2010/main" val="666092373"/>
-      </p:ext>
-    </p:extLst>
-  </p:cSld>
-  <p:clrMapOvr>
-    <a:overrideClrMapping bg1="lt1" tx1="dk1" bg2="lt2" tx2="dk2" accent1="accent1" accent2="accent2" accent3="accent3" accent4="accent4" accent5="accent5" accent6="accent6" hlink="hlink" folHlink="folHlink"/>
-  </p:clrMapOvr>
-  <p:transition>
-    <p:fade/>
-  </p:transition>
-</p:sld>
-</file>
-
-<file path=ppt/slides/slide14.xml><?xml version="1.0" encoding="utf-8"?>
+<file path=ppt/slides/slide19.xml><?xml version="1.0" encoding="utf-8"?>
 <p:sld xmlns:a="http://schemas.openxmlformats.org/drawingml/2006/main" xmlns:r="http://schemas.openxmlformats.org/officeDocument/2006/relationships" xmlns:p="http://schemas.openxmlformats.org/presentationml/2006/main">
   <p:cSld>
     <p:spTree>
@@ -44558,977 +45274,6 @@
     <p:extLst>
       <p:ext uri="{BB962C8B-B14F-4D97-AF65-F5344CB8AC3E}">
         <p14:creationId xmlns:p14="http://schemas.microsoft.com/office/powerpoint/2010/main" val="428277801"/>
-      </p:ext>
-    </p:extLst>
-  </p:cSld>
-  <p:clrMapOvr>
-    <a:masterClrMapping/>
-  </p:clrMapOvr>
-  <p:transition>
-    <p:fade/>
-  </p:transition>
-</p:sld>
-</file>
-
-<file path=ppt/slides/slide15.xml><?xml version="1.0" encoding="utf-8"?>
-<p:sld xmlns:a="http://schemas.openxmlformats.org/drawingml/2006/main" xmlns:r="http://schemas.openxmlformats.org/officeDocument/2006/relationships" xmlns:p="http://schemas.openxmlformats.org/presentationml/2006/main">
-  <p:cSld>
-    <p:spTree>
-      <p:nvGrpSpPr>
-        <p:cNvPr id="1" name=""/>
-        <p:cNvGrpSpPr/>
-        <p:nvPr/>
-      </p:nvGrpSpPr>
-      <p:grpSpPr>
-        <a:xfrm>
-          <a:off x="0" y="0"/>
-          <a:ext cx="0" cy="0"/>
-          <a:chOff x="0" y="0"/>
-          <a:chExt cx="0" cy="0"/>
-        </a:xfrm>
-      </p:grpSpPr>
-      <p:pic>
-        <p:nvPicPr>
-          <p:cNvPr id="9220" name="Picture 4" descr="Image result for oh yes its free">
-            <a:extLst>
-              <a:ext uri="{FF2B5EF4-FFF2-40B4-BE49-F238E27FC236}">
-                <a16:creationId xmlns:a16="http://schemas.microsoft.com/office/drawing/2014/main" id="{AAED8AF4-381E-4EE9-AC7B-C514BCDC2725}"/>
-              </a:ext>
-            </a:extLst>
-          </p:cNvPr>
-          <p:cNvPicPr>
-            <a:picLocks noChangeAspect="1" noChangeArrowheads="1"/>
-          </p:cNvPicPr>
-          <p:nvPr/>
-        </p:nvPicPr>
-        <p:blipFill>
-          <a:blip r:embed="rId2">
-            <a:extLst>
-              <a:ext uri="{28A0092B-C50C-407E-A947-70E740481C1C}">
-                <a14:useLocalDpi xmlns:a14="http://schemas.microsoft.com/office/drawing/2010/main" val="0"/>
-              </a:ext>
-            </a:extLst>
-          </a:blip>
-          <a:srcRect/>
-          <a:stretch>
-            <a:fillRect/>
-          </a:stretch>
-        </p:blipFill>
-        <p:spPr bwMode="auto">
-          <a:xfrm>
-            <a:off x="6386830" y="85671"/>
-            <a:ext cx="5676900" cy="4257675"/>
-          </a:xfrm>
-          <a:prstGeom prst="rect">
-            <a:avLst/>
-          </a:prstGeom>
-          <a:noFill/>
-          <a:extLst>
-            <a:ext uri="{909E8E84-426E-40DD-AFC4-6F175D3DCCD1}">
-              <a14:hiddenFill xmlns:a14="http://schemas.microsoft.com/office/drawing/2010/main">
-                <a:solidFill>
-                  <a:srgbClr val="FFFFFF"/>
-                </a:solidFill>
-              </a14:hiddenFill>
-            </a:ext>
-          </a:extLst>
-        </p:spPr>
-      </p:pic>
-      <p:sp>
-        <p:nvSpPr>
-          <p:cNvPr id="4" name="Text Placeholder 3">
-            <a:extLst>
-              <a:ext uri="{FF2B5EF4-FFF2-40B4-BE49-F238E27FC236}">
-                <a16:creationId xmlns:a16="http://schemas.microsoft.com/office/drawing/2014/main" id="{6F256A01-4AA8-439A-837A-571E043AA08F}"/>
-              </a:ext>
-            </a:extLst>
-          </p:cNvPr>
-          <p:cNvSpPr>
-            <a:spLocks noGrp="1"/>
-          </p:cNvSpPr>
-          <p:nvPr>
-            <p:ph type="body" sz="quarter" idx="10"/>
-          </p:nvPr>
-        </p:nvSpPr>
-        <p:spPr>
-          <a:xfrm>
-            <a:off x="701040" y="532891"/>
-            <a:ext cx="9086772" cy="520310"/>
-          </a:xfrm>
-        </p:spPr>
-        <p:txBody>
-          <a:bodyPr>
-            <a:normAutofit fontScale="92500" lnSpcReduction="10000"/>
-          </a:bodyPr>
-          <a:lstStyle/>
-          <a:p>
-            <a:pPr marL="0" indent="0">
-              <a:buNone/>
-            </a:pPr>
-            <a:r>
-              <a:rPr lang="en-US" sz="3200" b="1" dirty="0"/>
-              <a:t>D.O.G Presence</a:t>
-            </a:r>
-            <a:endParaRPr lang="en-US" sz="3200" dirty="0"/>
-          </a:p>
-        </p:txBody>
-      </p:sp>
-      <p:sp>
-        <p:nvSpPr>
-          <p:cNvPr id="14" name="Text Placeholder 3">
-            <a:extLst>
-              <a:ext uri="{FF2B5EF4-FFF2-40B4-BE49-F238E27FC236}">
-                <a16:creationId xmlns:a16="http://schemas.microsoft.com/office/drawing/2014/main" id="{9DA39B4E-D140-4422-9288-FA1802AAB484}"/>
-              </a:ext>
-            </a:extLst>
-          </p:cNvPr>
-          <p:cNvSpPr txBox="1">
-            <a:spLocks/>
-          </p:cNvSpPr>
-          <p:nvPr/>
-        </p:nvSpPr>
-        <p:spPr>
-          <a:xfrm>
-            <a:off x="336892" y="5344531"/>
-            <a:ext cx="10663851" cy="1650158"/>
-          </a:xfrm>
-          <a:prstGeom prst="rect">
-            <a:avLst/>
-          </a:prstGeom>
-        </p:spPr>
-        <p:txBody>
-          <a:bodyPr vert="horz" lIns="91440" tIns="45720" rIns="91440" bIns="45720" rtlCol="0">
-            <a:normAutofit/>
-          </a:bodyPr>
-          <a:lstStyle>
-            <a:lvl1pPr marL="233363" indent="-233363" algn="l" rtl="0" fontAlgn="base">
-              <a:lnSpc>
-                <a:spcPct val="100000"/>
-              </a:lnSpc>
-              <a:spcBef>
-                <a:spcPts val="575"/>
-              </a:spcBef>
-              <a:spcAft>
-                <a:spcPts val="75"/>
-              </a:spcAft>
-              <a:buClr>
-                <a:schemeClr val="tx1">
-                  <a:lumMod val="85000"/>
-                  <a:lumOff val="15000"/>
-                </a:schemeClr>
-              </a:buClr>
-              <a:buSzPct val="80000"/>
-              <a:buFont typeface="Arial" pitchFamily="34" charset="0"/>
-              <a:buChar char="•"/>
-              <a:defRPr sz="2400" b="0">
-                <a:solidFill>
-                  <a:srgbClr val="000000"/>
-                </a:solidFill>
-                <a:latin typeface="+mn-lt"/>
-                <a:ea typeface="+mn-ea"/>
-                <a:cs typeface="+mn-cs"/>
-              </a:defRPr>
-            </a:lvl1pPr>
-            <a:lvl2pPr marL="401638" indent="-168275" algn="l" rtl="0" fontAlgn="base">
-              <a:lnSpc>
-                <a:spcPct val="100000"/>
-              </a:lnSpc>
-              <a:spcBef>
-                <a:spcPts val="575"/>
-              </a:spcBef>
-              <a:spcAft>
-                <a:spcPts val="75"/>
-              </a:spcAft>
-              <a:buClr>
-                <a:schemeClr val="tx1"/>
-              </a:buClr>
-              <a:buSzPct val="80000"/>
-              <a:buFont typeface="Arial" pitchFamily="34" charset="0"/>
-              <a:buChar char="−"/>
-              <a:defRPr sz="2200">
-                <a:solidFill>
-                  <a:srgbClr val="000000"/>
-                </a:solidFill>
-                <a:latin typeface="+mn-lt"/>
-              </a:defRPr>
-            </a:lvl2pPr>
-            <a:lvl3pPr marL="569913" indent="-168275" algn="l" rtl="0" fontAlgn="base">
-              <a:lnSpc>
-                <a:spcPct val="100000"/>
-              </a:lnSpc>
-              <a:spcBef>
-                <a:spcPts val="575"/>
-              </a:spcBef>
-              <a:spcAft>
-                <a:spcPts val="75"/>
-              </a:spcAft>
-              <a:buClr>
-                <a:schemeClr val="tx1"/>
-              </a:buClr>
-              <a:buSzPct val="80000"/>
-              <a:buFont typeface="Wingdings" pitchFamily="2" charset="2"/>
-              <a:buChar char="§"/>
-              <a:defRPr sz="2000">
-                <a:solidFill>
-                  <a:srgbClr val="000000"/>
-                </a:solidFill>
-                <a:latin typeface="+mn-lt"/>
-              </a:defRPr>
-            </a:lvl3pPr>
-            <a:lvl4pPr marL="746125" indent="-176213" algn="l" rtl="0" fontAlgn="base">
-              <a:lnSpc>
-                <a:spcPct val="100000"/>
-              </a:lnSpc>
-              <a:spcBef>
-                <a:spcPts val="575"/>
-              </a:spcBef>
-              <a:spcAft>
-                <a:spcPts val="75"/>
-              </a:spcAft>
-              <a:buClr>
-                <a:schemeClr val="tx1"/>
-              </a:buClr>
-              <a:buSzPct val="80000"/>
-              <a:buFont typeface="Arial" pitchFamily="34" charset="0"/>
-              <a:buChar char="•"/>
-              <a:defRPr sz="1800">
-                <a:solidFill>
-                  <a:srgbClr val="000000"/>
-                </a:solidFill>
-                <a:latin typeface="+mn-lt"/>
-              </a:defRPr>
-            </a:lvl4pPr>
-            <a:lvl5pPr marL="969963" indent="-223838" algn="l" rtl="0" fontAlgn="base">
-              <a:lnSpc>
-                <a:spcPct val="100000"/>
-              </a:lnSpc>
-              <a:spcBef>
-                <a:spcPts val="575"/>
-              </a:spcBef>
-              <a:spcAft>
-                <a:spcPts val="75"/>
-              </a:spcAft>
-              <a:buClr>
-                <a:schemeClr val="tx1"/>
-              </a:buClr>
-              <a:buSzPct val="70000"/>
-              <a:buFont typeface="Arial" pitchFamily="34" charset="0"/>
-              <a:buChar char="−"/>
-              <a:defRPr sz="1600">
-                <a:solidFill>
-                  <a:srgbClr val="000000"/>
-                </a:solidFill>
-                <a:latin typeface="+mn-lt"/>
-              </a:defRPr>
-            </a:lvl5pPr>
-            <a:lvl6pPr marL="2230438" indent="-157163" algn="l" rtl="0" fontAlgn="base">
-              <a:spcBef>
-                <a:spcPct val="20000"/>
-              </a:spcBef>
-              <a:spcAft>
-                <a:spcPct val="3000"/>
-              </a:spcAft>
-              <a:buClr>
-                <a:schemeClr val="tx1"/>
-              </a:buClr>
-              <a:buSzPct val="70000"/>
-              <a:buFont typeface="Arial" charset="0"/>
-              <a:buChar char="►"/>
-              <a:defRPr sz="1400">
-                <a:solidFill>
-                  <a:srgbClr val="000000"/>
-                </a:solidFill>
-                <a:latin typeface="+mn-lt"/>
-              </a:defRPr>
-            </a:lvl6pPr>
-            <a:lvl7pPr marL="2687638" indent="-157163" algn="l" rtl="0" fontAlgn="base">
-              <a:spcBef>
-                <a:spcPct val="20000"/>
-              </a:spcBef>
-              <a:spcAft>
-                <a:spcPct val="3000"/>
-              </a:spcAft>
-              <a:buClr>
-                <a:schemeClr val="tx1"/>
-              </a:buClr>
-              <a:buSzPct val="70000"/>
-              <a:buFont typeface="Arial" charset="0"/>
-              <a:buChar char="►"/>
-              <a:defRPr sz="1400">
-                <a:solidFill>
-                  <a:srgbClr val="000000"/>
-                </a:solidFill>
-                <a:latin typeface="+mn-lt"/>
-              </a:defRPr>
-            </a:lvl7pPr>
-            <a:lvl8pPr marL="3144838" indent="-157163" algn="l" rtl="0" fontAlgn="base">
-              <a:spcBef>
-                <a:spcPct val="20000"/>
-              </a:spcBef>
-              <a:spcAft>
-                <a:spcPct val="3000"/>
-              </a:spcAft>
-              <a:buClr>
-                <a:schemeClr val="tx1"/>
-              </a:buClr>
-              <a:buSzPct val="70000"/>
-              <a:buFont typeface="Arial" charset="0"/>
-              <a:buChar char="►"/>
-              <a:defRPr sz="1400">
-                <a:solidFill>
-                  <a:srgbClr val="000000"/>
-                </a:solidFill>
-                <a:latin typeface="+mn-lt"/>
-              </a:defRPr>
-            </a:lvl8pPr>
-            <a:lvl9pPr marL="3602038" indent="-157163" algn="l" rtl="0" fontAlgn="base">
-              <a:spcBef>
-                <a:spcPct val="20000"/>
-              </a:spcBef>
-              <a:spcAft>
-                <a:spcPct val="3000"/>
-              </a:spcAft>
-              <a:buClr>
-                <a:schemeClr val="tx1"/>
-              </a:buClr>
-              <a:buSzPct val="70000"/>
-              <a:buFont typeface="Arial" charset="0"/>
-              <a:buChar char="►"/>
-              <a:defRPr sz="1400">
-                <a:solidFill>
-                  <a:srgbClr val="000000"/>
-                </a:solidFill>
-                <a:latin typeface="+mn-lt"/>
-              </a:defRPr>
-            </a:lvl9pPr>
-          </a:lstStyle>
-          <a:p>
-            <a:pPr marL="0" indent="0">
-              <a:buNone/>
-            </a:pPr>
-            <a:endParaRPr lang="en-US" sz="1600" kern="0" dirty="0"/>
-          </a:p>
-        </p:txBody>
-      </p:sp>
-      <p:pic>
-        <p:nvPicPr>
-          <p:cNvPr id="9218" name="Picture 2" descr="Image result for google play store">
-            <a:extLst>
-              <a:ext uri="{FF2B5EF4-FFF2-40B4-BE49-F238E27FC236}">
-                <a16:creationId xmlns:a16="http://schemas.microsoft.com/office/drawing/2014/main" id="{C601B087-EA6A-4BD1-9DA1-1F45430F6A46}"/>
-              </a:ext>
-            </a:extLst>
-          </p:cNvPr>
-          <p:cNvPicPr>
-            <a:picLocks noChangeAspect="1" noChangeArrowheads="1"/>
-          </p:cNvPicPr>
-          <p:nvPr/>
-        </p:nvPicPr>
-        <p:blipFill>
-          <a:blip r:embed="rId3">
-            <a:extLst>
-              <a:ext uri="{28A0092B-C50C-407E-A947-70E740481C1C}">
-                <a14:useLocalDpi xmlns:a14="http://schemas.microsoft.com/office/drawing/2010/main" val="0"/>
-              </a:ext>
-            </a:extLst>
-          </a:blip>
-          <a:srcRect/>
-          <a:stretch>
-            <a:fillRect/>
-          </a:stretch>
-        </p:blipFill>
-        <p:spPr bwMode="auto">
-          <a:xfrm>
-            <a:off x="1129372" y="3432480"/>
-            <a:ext cx="6879297" cy="2037687"/>
-          </a:xfrm>
-          <a:prstGeom prst="rect">
-            <a:avLst/>
-          </a:prstGeom>
-          <a:noFill/>
-          <a:extLst>
-            <a:ext uri="{909E8E84-426E-40DD-AFC4-6F175D3DCCD1}">
-              <a14:hiddenFill xmlns:a14="http://schemas.microsoft.com/office/drawing/2010/main">
-                <a:solidFill>
-                  <a:srgbClr val="FFFFFF"/>
-                </a:solidFill>
-              </a14:hiddenFill>
-            </a:ext>
-          </a:extLst>
-        </p:spPr>
-      </p:pic>
-      <p:pic>
-        <p:nvPicPr>
-          <p:cNvPr id="3" name="Picture 2">
-            <a:hlinkClick r:id="rId4"/>
-            <a:extLst>
-              <a:ext uri="{FF2B5EF4-FFF2-40B4-BE49-F238E27FC236}">
-                <a16:creationId xmlns:a16="http://schemas.microsoft.com/office/drawing/2014/main" id="{0077D639-4F38-4B30-BBD8-E48001AF0112}"/>
-              </a:ext>
-            </a:extLst>
-          </p:cNvPr>
-          <p:cNvPicPr>
-            <a:picLocks noChangeAspect="1"/>
-          </p:cNvPicPr>
-          <p:nvPr/>
-        </p:nvPicPr>
-        <p:blipFill>
-          <a:blip r:embed="rId5">
-            <a:extLst>
-              <a:ext uri="{28A0092B-C50C-407E-A947-70E740481C1C}">
-                <a14:useLocalDpi xmlns:a14="http://schemas.microsoft.com/office/drawing/2010/main" val="0"/>
-              </a:ext>
-            </a:extLst>
-          </a:blip>
-          <a:stretch>
-            <a:fillRect/>
-          </a:stretch>
-        </p:blipFill>
-        <p:spPr>
-          <a:xfrm>
-            <a:off x="890908" y="1157665"/>
-            <a:ext cx="2322244" cy="2322244"/>
-          </a:xfrm>
-          <a:prstGeom prst="rect">
-            <a:avLst/>
-          </a:prstGeom>
-        </p:spPr>
-      </p:pic>
-      <p:sp>
-        <p:nvSpPr>
-          <p:cNvPr id="5" name="Rectangle 4">
-            <a:extLst>
-              <a:ext uri="{FF2B5EF4-FFF2-40B4-BE49-F238E27FC236}">
-                <a16:creationId xmlns:a16="http://schemas.microsoft.com/office/drawing/2014/main" id="{F5DE0737-1550-4305-8C89-25B831975559}"/>
-              </a:ext>
-            </a:extLst>
-          </p:cNvPr>
-          <p:cNvSpPr/>
-          <p:nvPr/>
-        </p:nvSpPr>
-        <p:spPr>
-          <a:xfrm>
-            <a:off x="2723710" y="5750347"/>
-            <a:ext cx="9340020" cy="738664"/>
-          </a:xfrm>
-          <a:prstGeom prst="rect">
-            <a:avLst/>
-          </a:prstGeom>
-        </p:spPr>
-        <p:txBody>
-          <a:bodyPr wrap="square">
-            <a:spAutoFit/>
-          </a:bodyPr>
-          <a:lstStyle/>
-          <a:p>
-            <a:r>
-              <a:rPr lang="en-US" sz="1400" dirty="0">
-                <a:hlinkClick r:id="rId4"/>
-              </a:rPr>
-              <a:t>https://play.google.com/store/apps/details?id=com.softwaresunleashed.dog</a:t>
-            </a:r>
-            <a:endParaRPr lang="en-US" sz="1400" dirty="0"/>
-          </a:p>
-          <a:p>
-            <a:endParaRPr lang="en-US" sz="1400" dirty="0"/>
-          </a:p>
-          <a:p>
-            <a:endParaRPr lang="en-US" sz="1400" dirty="0"/>
-          </a:p>
-        </p:txBody>
-      </p:sp>
-    </p:spTree>
-    <p:extLst>
-      <p:ext uri="{BB962C8B-B14F-4D97-AF65-F5344CB8AC3E}">
-        <p14:creationId xmlns:p14="http://schemas.microsoft.com/office/powerpoint/2010/main" val="3635919822"/>
-      </p:ext>
-    </p:extLst>
-  </p:cSld>
-  <p:clrMapOvr>
-    <a:masterClrMapping/>
-  </p:clrMapOvr>
-  <p:transition>
-    <p:fade/>
-  </p:transition>
-</p:sld>
-</file>
-
-<file path=ppt/slides/slide16.xml><?xml version="1.0" encoding="utf-8"?>
-<p:sld xmlns:a="http://schemas.openxmlformats.org/drawingml/2006/main" xmlns:r="http://schemas.openxmlformats.org/officeDocument/2006/relationships" xmlns:p="http://schemas.openxmlformats.org/presentationml/2006/main">
-  <p:cSld>
-    <p:spTree>
-      <p:nvGrpSpPr>
-        <p:cNvPr id="1" name=""/>
-        <p:cNvGrpSpPr/>
-        <p:nvPr/>
-      </p:nvGrpSpPr>
-      <p:grpSpPr>
-        <a:xfrm>
-          <a:off x="0" y="0"/>
-          <a:ext cx="0" cy="0"/>
-          <a:chOff x="0" y="0"/>
-          <a:chExt cx="0" cy="0"/>
-        </a:xfrm>
-      </p:grpSpPr>
-      <p:sp>
-        <p:nvSpPr>
-          <p:cNvPr id="2" name="Title 1">
-            <a:extLst>
-              <a:ext uri="{FF2B5EF4-FFF2-40B4-BE49-F238E27FC236}">
-                <a16:creationId xmlns:a16="http://schemas.microsoft.com/office/drawing/2014/main" id="{2A7A8D4B-2734-45AB-A856-7A9C19AD321F}"/>
-              </a:ext>
-            </a:extLst>
-          </p:cNvPr>
-          <p:cNvSpPr>
-            <a:spLocks noGrp="1"/>
-          </p:cNvSpPr>
-          <p:nvPr>
-            <p:ph type="title"/>
-          </p:nvPr>
-        </p:nvSpPr>
-        <p:spPr/>
-        <p:txBody>
-          <a:bodyPr/>
-          <a:lstStyle/>
-          <a:p>
-            <a:r>
-              <a:rPr lang="en-US" dirty="0"/>
-              <a:t>Google’s Free Analytical Services (Dashboard)</a:t>
-            </a:r>
-          </a:p>
-        </p:txBody>
-      </p:sp>
-      <p:pic>
-        <p:nvPicPr>
-          <p:cNvPr id="5" name="Picture 4">
-            <a:extLst>
-              <a:ext uri="{FF2B5EF4-FFF2-40B4-BE49-F238E27FC236}">
-                <a16:creationId xmlns:a16="http://schemas.microsoft.com/office/drawing/2014/main" id="{F50F3B0D-C937-4FDE-A12B-5DDAA3C18231}"/>
-              </a:ext>
-            </a:extLst>
-          </p:cNvPr>
-          <p:cNvPicPr>
-            <a:picLocks noChangeAspect="1"/>
-          </p:cNvPicPr>
-          <p:nvPr/>
-        </p:nvPicPr>
-        <p:blipFill>
-          <a:blip r:embed="rId2"/>
-          <a:stretch>
-            <a:fillRect/>
-          </a:stretch>
-        </p:blipFill>
-        <p:spPr>
-          <a:xfrm>
-            <a:off x="977426" y="1081090"/>
-            <a:ext cx="10307216" cy="4901678"/>
-          </a:xfrm>
-          <a:prstGeom prst="rect">
-            <a:avLst/>
-          </a:prstGeom>
-          <a:effectLst>
-            <a:glow rad="139700">
-              <a:schemeClr val="accent4">
-                <a:satMod val="175000"/>
-                <a:alpha val="40000"/>
-              </a:schemeClr>
-            </a:glow>
-          </a:effectLst>
-        </p:spPr>
-      </p:pic>
-    </p:spTree>
-    <p:extLst>
-      <p:ext uri="{BB962C8B-B14F-4D97-AF65-F5344CB8AC3E}">
-        <p14:creationId xmlns:p14="http://schemas.microsoft.com/office/powerpoint/2010/main" val="975197056"/>
-      </p:ext>
-    </p:extLst>
-  </p:cSld>
-  <p:clrMapOvr>
-    <a:masterClrMapping/>
-  </p:clrMapOvr>
-  <p:transition>
-    <p:fade/>
-  </p:transition>
-</p:sld>
-</file>
-
-<file path=ppt/slides/slide17.xml><?xml version="1.0" encoding="utf-8"?>
-<p:sld xmlns:a="http://schemas.openxmlformats.org/drawingml/2006/main" xmlns:r="http://schemas.openxmlformats.org/officeDocument/2006/relationships" xmlns:p="http://schemas.openxmlformats.org/presentationml/2006/main">
-  <p:cSld>
-    <p:spTree>
-      <p:nvGrpSpPr>
-        <p:cNvPr id="1" name=""/>
-        <p:cNvGrpSpPr/>
-        <p:nvPr/>
-      </p:nvGrpSpPr>
-      <p:grpSpPr>
-        <a:xfrm>
-          <a:off x="0" y="0"/>
-          <a:ext cx="0" cy="0"/>
-          <a:chOff x="0" y="0"/>
-          <a:chExt cx="0" cy="0"/>
-        </a:xfrm>
-      </p:grpSpPr>
-      <p:pic>
-        <p:nvPicPr>
-          <p:cNvPr id="13314" name="Picture 2" descr="Image result for question and answer images">
-            <a:extLst>
-              <a:ext uri="{FF2B5EF4-FFF2-40B4-BE49-F238E27FC236}">
-                <a16:creationId xmlns:a16="http://schemas.microsoft.com/office/drawing/2014/main" id="{479746B2-73C8-4E00-A47D-9DA0C83F2EC2}"/>
-              </a:ext>
-            </a:extLst>
-          </p:cNvPr>
-          <p:cNvPicPr>
-            <a:picLocks noChangeAspect="1" noChangeArrowheads="1"/>
-          </p:cNvPicPr>
-          <p:nvPr/>
-        </p:nvPicPr>
-        <p:blipFill>
-          <a:blip r:embed="rId2">
-            <a:extLst>
-              <a:ext uri="{28A0092B-C50C-407E-A947-70E740481C1C}">
-                <a14:useLocalDpi xmlns:a14="http://schemas.microsoft.com/office/drawing/2010/main" val="0"/>
-              </a:ext>
-            </a:extLst>
-          </a:blip>
-          <a:srcRect/>
-          <a:stretch>
-            <a:fillRect/>
-          </a:stretch>
-        </p:blipFill>
-        <p:spPr bwMode="auto">
-          <a:xfrm>
-            <a:off x="5974080" y="2802890"/>
-            <a:ext cx="3810000" cy="2857500"/>
-          </a:xfrm>
-          <a:prstGeom prst="rect">
-            <a:avLst/>
-          </a:prstGeom>
-          <a:noFill/>
-          <a:extLst>
-            <a:ext uri="{909E8E84-426E-40DD-AFC4-6F175D3DCCD1}">
-              <a14:hiddenFill xmlns:a14="http://schemas.microsoft.com/office/drawing/2010/main">
-                <a:solidFill>
-                  <a:srgbClr val="FFFFFF"/>
-                </a:solidFill>
-              </a14:hiddenFill>
-            </a:ext>
-          </a:extLst>
-        </p:spPr>
-      </p:pic>
-      <p:sp>
-        <p:nvSpPr>
-          <p:cNvPr id="4" name="Text Placeholder 3">
-            <a:extLst>
-              <a:ext uri="{FF2B5EF4-FFF2-40B4-BE49-F238E27FC236}">
-                <a16:creationId xmlns:a16="http://schemas.microsoft.com/office/drawing/2014/main" id="{6F256A01-4AA8-439A-837A-571E043AA08F}"/>
-              </a:ext>
-            </a:extLst>
-          </p:cNvPr>
-          <p:cNvSpPr>
-            <a:spLocks noGrp="1"/>
-          </p:cNvSpPr>
-          <p:nvPr>
-            <p:ph type="body" sz="quarter" idx="10"/>
-          </p:nvPr>
-        </p:nvSpPr>
-        <p:spPr>
-          <a:xfrm>
-            <a:off x="4023360" y="1183501"/>
-            <a:ext cx="3901440" cy="4161030"/>
-          </a:xfrm>
-        </p:spPr>
-        <p:txBody>
-          <a:bodyPr>
-            <a:normAutofit/>
-          </a:bodyPr>
-          <a:lstStyle/>
-          <a:p>
-            <a:pPr marL="0" indent="0" algn="ctr">
-              <a:buNone/>
-            </a:pPr>
-            <a:r>
-              <a:rPr lang="en-US" sz="4800" b="1" dirty="0"/>
-              <a:t>Demo</a:t>
-            </a:r>
-          </a:p>
-          <a:p>
-            <a:pPr marL="0" indent="0" algn="ctr">
-              <a:buNone/>
-            </a:pPr>
-            <a:r>
-              <a:rPr lang="en-US" sz="4800" b="1" dirty="0"/>
-              <a:t> </a:t>
-            </a:r>
-          </a:p>
-          <a:p>
-            <a:pPr marL="0" indent="0" algn="ctr">
-              <a:buNone/>
-            </a:pPr>
-            <a:r>
-              <a:rPr lang="en-US" sz="4800" b="1" dirty="0"/>
-              <a:t>&amp; </a:t>
-            </a:r>
-          </a:p>
-          <a:p>
-            <a:pPr marL="0" indent="0" algn="ctr">
-              <a:buNone/>
-            </a:pPr>
-            <a:endParaRPr lang="en-US" sz="4800" b="1" dirty="0"/>
-          </a:p>
-          <a:p>
-            <a:pPr marL="0" indent="0" algn="ctr">
-              <a:buNone/>
-            </a:pPr>
-            <a:r>
-              <a:rPr lang="en-US" sz="4800" b="1" dirty="0" err="1"/>
-              <a:t>QnA</a:t>
-            </a:r>
-            <a:endParaRPr lang="en-US" sz="4800" dirty="0"/>
-          </a:p>
-        </p:txBody>
-      </p:sp>
-      <p:sp>
-        <p:nvSpPr>
-          <p:cNvPr id="14" name="Text Placeholder 3">
-            <a:extLst>
-              <a:ext uri="{FF2B5EF4-FFF2-40B4-BE49-F238E27FC236}">
-                <a16:creationId xmlns:a16="http://schemas.microsoft.com/office/drawing/2014/main" id="{9DA39B4E-D140-4422-9288-FA1802AAB484}"/>
-              </a:ext>
-            </a:extLst>
-          </p:cNvPr>
-          <p:cNvSpPr txBox="1">
-            <a:spLocks/>
-          </p:cNvSpPr>
-          <p:nvPr/>
-        </p:nvSpPr>
-        <p:spPr>
-          <a:xfrm>
-            <a:off x="336892" y="5344531"/>
-            <a:ext cx="10663851" cy="1650158"/>
-          </a:xfrm>
-          <a:prstGeom prst="rect">
-            <a:avLst/>
-          </a:prstGeom>
-        </p:spPr>
-        <p:txBody>
-          <a:bodyPr vert="horz" lIns="91440" tIns="45720" rIns="91440" bIns="45720" rtlCol="0">
-            <a:normAutofit/>
-          </a:bodyPr>
-          <a:lstStyle>
-            <a:lvl1pPr marL="233363" indent="-233363" algn="l" rtl="0" fontAlgn="base">
-              <a:lnSpc>
-                <a:spcPct val="100000"/>
-              </a:lnSpc>
-              <a:spcBef>
-                <a:spcPts val="575"/>
-              </a:spcBef>
-              <a:spcAft>
-                <a:spcPts val="75"/>
-              </a:spcAft>
-              <a:buClr>
-                <a:schemeClr val="tx1">
-                  <a:lumMod val="85000"/>
-                  <a:lumOff val="15000"/>
-                </a:schemeClr>
-              </a:buClr>
-              <a:buSzPct val="80000"/>
-              <a:buFont typeface="Arial" pitchFamily="34" charset="0"/>
-              <a:buChar char="•"/>
-              <a:defRPr sz="2400" b="0">
-                <a:solidFill>
-                  <a:srgbClr val="000000"/>
-                </a:solidFill>
-                <a:latin typeface="+mn-lt"/>
-                <a:ea typeface="+mn-ea"/>
-                <a:cs typeface="+mn-cs"/>
-              </a:defRPr>
-            </a:lvl1pPr>
-            <a:lvl2pPr marL="401638" indent="-168275" algn="l" rtl="0" fontAlgn="base">
-              <a:lnSpc>
-                <a:spcPct val="100000"/>
-              </a:lnSpc>
-              <a:spcBef>
-                <a:spcPts val="575"/>
-              </a:spcBef>
-              <a:spcAft>
-                <a:spcPts val="75"/>
-              </a:spcAft>
-              <a:buClr>
-                <a:schemeClr val="tx1"/>
-              </a:buClr>
-              <a:buSzPct val="80000"/>
-              <a:buFont typeface="Arial" pitchFamily="34" charset="0"/>
-              <a:buChar char="−"/>
-              <a:defRPr sz="2200">
-                <a:solidFill>
-                  <a:srgbClr val="000000"/>
-                </a:solidFill>
-                <a:latin typeface="+mn-lt"/>
-              </a:defRPr>
-            </a:lvl2pPr>
-            <a:lvl3pPr marL="569913" indent="-168275" algn="l" rtl="0" fontAlgn="base">
-              <a:lnSpc>
-                <a:spcPct val="100000"/>
-              </a:lnSpc>
-              <a:spcBef>
-                <a:spcPts val="575"/>
-              </a:spcBef>
-              <a:spcAft>
-                <a:spcPts val="75"/>
-              </a:spcAft>
-              <a:buClr>
-                <a:schemeClr val="tx1"/>
-              </a:buClr>
-              <a:buSzPct val="80000"/>
-              <a:buFont typeface="Wingdings" pitchFamily="2" charset="2"/>
-              <a:buChar char="§"/>
-              <a:defRPr sz="2000">
-                <a:solidFill>
-                  <a:srgbClr val="000000"/>
-                </a:solidFill>
-                <a:latin typeface="+mn-lt"/>
-              </a:defRPr>
-            </a:lvl3pPr>
-            <a:lvl4pPr marL="746125" indent="-176213" algn="l" rtl="0" fontAlgn="base">
-              <a:lnSpc>
-                <a:spcPct val="100000"/>
-              </a:lnSpc>
-              <a:spcBef>
-                <a:spcPts val="575"/>
-              </a:spcBef>
-              <a:spcAft>
-                <a:spcPts val="75"/>
-              </a:spcAft>
-              <a:buClr>
-                <a:schemeClr val="tx1"/>
-              </a:buClr>
-              <a:buSzPct val="80000"/>
-              <a:buFont typeface="Arial" pitchFamily="34" charset="0"/>
-              <a:buChar char="•"/>
-              <a:defRPr sz="1800">
-                <a:solidFill>
-                  <a:srgbClr val="000000"/>
-                </a:solidFill>
-                <a:latin typeface="+mn-lt"/>
-              </a:defRPr>
-            </a:lvl4pPr>
-            <a:lvl5pPr marL="969963" indent="-223838" algn="l" rtl="0" fontAlgn="base">
-              <a:lnSpc>
-                <a:spcPct val="100000"/>
-              </a:lnSpc>
-              <a:spcBef>
-                <a:spcPts val="575"/>
-              </a:spcBef>
-              <a:spcAft>
-                <a:spcPts val="75"/>
-              </a:spcAft>
-              <a:buClr>
-                <a:schemeClr val="tx1"/>
-              </a:buClr>
-              <a:buSzPct val="70000"/>
-              <a:buFont typeface="Arial" pitchFamily="34" charset="0"/>
-              <a:buChar char="−"/>
-              <a:defRPr sz="1600">
-                <a:solidFill>
-                  <a:srgbClr val="000000"/>
-                </a:solidFill>
-                <a:latin typeface="+mn-lt"/>
-              </a:defRPr>
-            </a:lvl5pPr>
-            <a:lvl6pPr marL="2230438" indent="-157163" algn="l" rtl="0" fontAlgn="base">
-              <a:spcBef>
-                <a:spcPct val="20000"/>
-              </a:spcBef>
-              <a:spcAft>
-                <a:spcPct val="3000"/>
-              </a:spcAft>
-              <a:buClr>
-                <a:schemeClr val="tx1"/>
-              </a:buClr>
-              <a:buSzPct val="70000"/>
-              <a:buFont typeface="Arial" charset="0"/>
-              <a:buChar char="►"/>
-              <a:defRPr sz="1400">
-                <a:solidFill>
-                  <a:srgbClr val="000000"/>
-                </a:solidFill>
-                <a:latin typeface="+mn-lt"/>
-              </a:defRPr>
-            </a:lvl6pPr>
-            <a:lvl7pPr marL="2687638" indent="-157163" algn="l" rtl="0" fontAlgn="base">
-              <a:spcBef>
-                <a:spcPct val="20000"/>
-              </a:spcBef>
-              <a:spcAft>
-                <a:spcPct val="3000"/>
-              </a:spcAft>
-              <a:buClr>
-                <a:schemeClr val="tx1"/>
-              </a:buClr>
-              <a:buSzPct val="70000"/>
-              <a:buFont typeface="Arial" charset="0"/>
-              <a:buChar char="►"/>
-              <a:defRPr sz="1400">
-                <a:solidFill>
-                  <a:srgbClr val="000000"/>
-                </a:solidFill>
-                <a:latin typeface="+mn-lt"/>
-              </a:defRPr>
-            </a:lvl7pPr>
-            <a:lvl8pPr marL="3144838" indent="-157163" algn="l" rtl="0" fontAlgn="base">
-              <a:spcBef>
-                <a:spcPct val="20000"/>
-              </a:spcBef>
-              <a:spcAft>
-                <a:spcPct val="3000"/>
-              </a:spcAft>
-              <a:buClr>
-                <a:schemeClr val="tx1"/>
-              </a:buClr>
-              <a:buSzPct val="70000"/>
-              <a:buFont typeface="Arial" charset="0"/>
-              <a:buChar char="►"/>
-              <a:defRPr sz="1400">
-                <a:solidFill>
-                  <a:srgbClr val="000000"/>
-                </a:solidFill>
-                <a:latin typeface="+mn-lt"/>
-              </a:defRPr>
-            </a:lvl8pPr>
-            <a:lvl9pPr marL="3602038" indent="-157163" algn="l" rtl="0" fontAlgn="base">
-              <a:spcBef>
-                <a:spcPct val="20000"/>
-              </a:spcBef>
-              <a:spcAft>
-                <a:spcPct val="3000"/>
-              </a:spcAft>
-              <a:buClr>
-                <a:schemeClr val="tx1"/>
-              </a:buClr>
-              <a:buSzPct val="70000"/>
-              <a:buFont typeface="Arial" charset="0"/>
-              <a:buChar char="►"/>
-              <a:defRPr sz="1400">
-                <a:solidFill>
-                  <a:srgbClr val="000000"/>
-                </a:solidFill>
-                <a:latin typeface="+mn-lt"/>
-              </a:defRPr>
-            </a:lvl9pPr>
-          </a:lstStyle>
-          <a:p>
-            <a:pPr marL="0" indent="0">
-              <a:buNone/>
-            </a:pPr>
-            <a:endParaRPr lang="en-US" sz="1600" kern="0" dirty="0"/>
-          </a:p>
-        </p:txBody>
-      </p:sp>
-    </p:spTree>
-    <p:extLst>
-      <p:ext uri="{BB962C8B-B14F-4D97-AF65-F5344CB8AC3E}">
-        <p14:creationId xmlns:p14="http://schemas.microsoft.com/office/powerpoint/2010/main" val="1312795536"/>
       </p:ext>
     </p:extLst>
   </p:cSld>
@@ -46249,6 +45994,977 @@
     <p:extLst>
       <p:ext uri="{BB962C8B-B14F-4D97-AF65-F5344CB8AC3E}">
         <p14:creationId xmlns:p14="http://schemas.microsoft.com/office/powerpoint/2010/main" val="1581603860"/>
+      </p:ext>
+    </p:extLst>
+  </p:cSld>
+  <p:clrMapOvr>
+    <a:masterClrMapping/>
+  </p:clrMapOvr>
+  <p:transition>
+    <p:fade/>
+  </p:transition>
+</p:sld>
+</file>
+
+<file path=ppt/slides/slide20.xml><?xml version="1.0" encoding="utf-8"?>
+<p:sld xmlns:a="http://schemas.openxmlformats.org/drawingml/2006/main" xmlns:r="http://schemas.openxmlformats.org/officeDocument/2006/relationships" xmlns:p="http://schemas.openxmlformats.org/presentationml/2006/main">
+  <p:cSld>
+    <p:spTree>
+      <p:nvGrpSpPr>
+        <p:cNvPr id="1" name=""/>
+        <p:cNvGrpSpPr/>
+        <p:nvPr/>
+      </p:nvGrpSpPr>
+      <p:grpSpPr>
+        <a:xfrm>
+          <a:off x="0" y="0"/>
+          <a:ext cx="0" cy="0"/>
+          <a:chOff x="0" y="0"/>
+          <a:chExt cx="0" cy="0"/>
+        </a:xfrm>
+      </p:grpSpPr>
+      <p:pic>
+        <p:nvPicPr>
+          <p:cNvPr id="9220" name="Picture 4" descr="Image result for oh yes its free">
+            <a:extLst>
+              <a:ext uri="{FF2B5EF4-FFF2-40B4-BE49-F238E27FC236}">
+                <a16:creationId xmlns:a16="http://schemas.microsoft.com/office/drawing/2014/main" id="{AAED8AF4-381E-4EE9-AC7B-C514BCDC2725}"/>
+              </a:ext>
+            </a:extLst>
+          </p:cNvPr>
+          <p:cNvPicPr>
+            <a:picLocks noChangeAspect="1" noChangeArrowheads="1"/>
+          </p:cNvPicPr>
+          <p:nvPr/>
+        </p:nvPicPr>
+        <p:blipFill>
+          <a:blip r:embed="rId2">
+            <a:extLst>
+              <a:ext uri="{28A0092B-C50C-407E-A947-70E740481C1C}">
+                <a14:useLocalDpi xmlns:a14="http://schemas.microsoft.com/office/drawing/2010/main" val="0"/>
+              </a:ext>
+            </a:extLst>
+          </a:blip>
+          <a:srcRect/>
+          <a:stretch>
+            <a:fillRect/>
+          </a:stretch>
+        </p:blipFill>
+        <p:spPr bwMode="auto">
+          <a:xfrm>
+            <a:off x="6386830" y="85671"/>
+            <a:ext cx="5676900" cy="4257675"/>
+          </a:xfrm>
+          <a:prstGeom prst="rect">
+            <a:avLst/>
+          </a:prstGeom>
+          <a:noFill/>
+          <a:extLst>
+            <a:ext uri="{909E8E84-426E-40DD-AFC4-6F175D3DCCD1}">
+              <a14:hiddenFill xmlns:a14="http://schemas.microsoft.com/office/drawing/2010/main">
+                <a:solidFill>
+                  <a:srgbClr val="FFFFFF"/>
+                </a:solidFill>
+              </a14:hiddenFill>
+            </a:ext>
+          </a:extLst>
+        </p:spPr>
+      </p:pic>
+      <p:sp>
+        <p:nvSpPr>
+          <p:cNvPr id="4" name="Text Placeholder 3">
+            <a:extLst>
+              <a:ext uri="{FF2B5EF4-FFF2-40B4-BE49-F238E27FC236}">
+                <a16:creationId xmlns:a16="http://schemas.microsoft.com/office/drawing/2014/main" id="{6F256A01-4AA8-439A-837A-571E043AA08F}"/>
+              </a:ext>
+            </a:extLst>
+          </p:cNvPr>
+          <p:cNvSpPr>
+            <a:spLocks noGrp="1"/>
+          </p:cNvSpPr>
+          <p:nvPr>
+            <p:ph type="body" sz="quarter" idx="10"/>
+          </p:nvPr>
+        </p:nvSpPr>
+        <p:spPr>
+          <a:xfrm>
+            <a:off x="701040" y="532891"/>
+            <a:ext cx="9086772" cy="520310"/>
+          </a:xfrm>
+        </p:spPr>
+        <p:txBody>
+          <a:bodyPr>
+            <a:normAutofit fontScale="92500" lnSpcReduction="10000"/>
+          </a:bodyPr>
+          <a:lstStyle/>
+          <a:p>
+            <a:pPr marL="0" indent="0">
+              <a:buNone/>
+            </a:pPr>
+            <a:r>
+              <a:rPr lang="en-US" sz="3200" b="1" dirty="0"/>
+              <a:t>D.O.G Presence</a:t>
+            </a:r>
+            <a:endParaRPr lang="en-US" sz="3200" dirty="0"/>
+          </a:p>
+        </p:txBody>
+      </p:sp>
+      <p:sp>
+        <p:nvSpPr>
+          <p:cNvPr id="14" name="Text Placeholder 3">
+            <a:extLst>
+              <a:ext uri="{FF2B5EF4-FFF2-40B4-BE49-F238E27FC236}">
+                <a16:creationId xmlns:a16="http://schemas.microsoft.com/office/drawing/2014/main" id="{9DA39B4E-D140-4422-9288-FA1802AAB484}"/>
+              </a:ext>
+            </a:extLst>
+          </p:cNvPr>
+          <p:cNvSpPr txBox="1">
+            <a:spLocks/>
+          </p:cNvSpPr>
+          <p:nvPr/>
+        </p:nvSpPr>
+        <p:spPr>
+          <a:xfrm>
+            <a:off x="336892" y="5344531"/>
+            <a:ext cx="10663851" cy="1650158"/>
+          </a:xfrm>
+          <a:prstGeom prst="rect">
+            <a:avLst/>
+          </a:prstGeom>
+        </p:spPr>
+        <p:txBody>
+          <a:bodyPr vert="horz" lIns="91440" tIns="45720" rIns="91440" bIns="45720" rtlCol="0">
+            <a:normAutofit/>
+          </a:bodyPr>
+          <a:lstStyle>
+            <a:lvl1pPr marL="233363" indent="-233363" algn="l" rtl="0" fontAlgn="base">
+              <a:lnSpc>
+                <a:spcPct val="100000"/>
+              </a:lnSpc>
+              <a:spcBef>
+                <a:spcPts val="575"/>
+              </a:spcBef>
+              <a:spcAft>
+                <a:spcPts val="75"/>
+              </a:spcAft>
+              <a:buClr>
+                <a:schemeClr val="tx1">
+                  <a:lumMod val="85000"/>
+                  <a:lumOff val="15000"/>
+                </a:schemeClr>
+              </a:buClr>
+              <a:buSzPct val="80000"/>
+              <a:buFont typeface="Arial" pitchFamily="34" charset="0"/>
+              <a:buChar char="•"/>
+              <a:defRPr sz="2400" b="0">
+                <a:solidFill>
+                  <a:srgbClr val="000000"/>
+                </a:solidFill>
+                <a:latin typeface="+mn-lt"/>
+                <a:ea typeface="+mn-ea"/>
+                <a:cs typeface="+mn-cs"/>
+              </a:defRPr>
+            </a:lvl1pPr>
+            <a:lvl2pPr marL="401638" indent="-168275" algn="l" rtl="0" fontAlgn="base">
+              <a:lnSpc>
+                <a:spcPct val="100000"/>
+              </a:lnSpc>
+              <a:spcBef>
+                <a:spcPts val="575"/>
+              </a:spcBef>
+              <a:spcAft>
+                <a:spcPts val="75"/>
+              </a:spcAft>
+              <a:buClr>
+                <a:schemeClr val="tx1"/>
+              </a:buClr>
+              <a:buSzPct val="80000"/>
+              <a:buFont typeface="Arial" pitchFamily="34" charset="0"/>
+              <a:buChar char="−"/>
+              <a:defRPr sz="2200">
+                <a:solidFill>
+                  <a:srgbClr val="000000"/>
+                </a:solidFill>
+                <a:latin typeface="+mn-lt"/>
+              </a:defRPr>
+            </a:lvl2pPr>
+            <a:lvl3pPr marL="569913" indent="-168275" algn="l" rtl="0" fontAlgn="base">
+              <a:lnSpc>
+                <a:spcPct val="100000"/>
+              </a:lnSpc>
+              <a:spcBef>
+                <a:spcPts val="575"/>
+              </a:spcBef>
+              <a:spcAft>
+                <a:spcPts val="75"/>
+              </a:spcAft>
+              <a:buClr>
+                <a:schemeClr val="tx1"/>
+              </a:buClr>
+              <a:buSzPct val="80000"/>
+              <a:buFont typeface="Wingdings" pitchFamily="2" charset="2"/>
+              <a:buChar char="§"/>
+              <a:defRPr sz="2000">
+                <a:solidFill>
+                  <a:srgbClr val="000000"/>
+                </a:solidFill>
+                <a:latin typeface="+mn-lt"/>
+              </a:defRPr>
+            </a:lvl3pPr>
+            <a:lvl4pPr marL="746125" indent="-176213" algn="l" rtl="0" fontAlgn="base">
+              <a:lnSpc>
+                <a:spcPct val="100000"/>
+              </a:lnSpc>
+              <a:spcBef>
+                <a:spcPts val="575"/>
+              </a:spcBef>
+              <a:spcAft>
+                <a:spcPts val="75"/>
+              </a:spcAft>
+              <a:buClr>
+                <a:schemeClr val="tx1"/>
+              </a:buClr>
+              <a:buSzPct val="80000"/>
+              <a:buFont typeface="Arial" pitchFamily="34" charset="0"/>
+              <a:buChar char="•"/>
+              <a:defRPr sz="1800">
+                <a:solidFill>
+                  <a:srgbClr val="000000"/>
+                </a:solidFill>
+                <a:latin typeface="+mn-lt"/>
+              </a:defRPr>
+            </a:lvl4pPr>
+            <a:lvl5pPr marL="969963" indent="-223838" algn="l" rtl="0" fontAlgn="base">
+              <a:lnSpc>
+                <a:spcPct val="100000"/>
+              </a:lnSpc>
+              <a:spcBef>
+                <a:spcPts val="575"/>
+              </a:spcBef>
+              <a:spcAft>
+                <a:spcPts val="75"/>
+              </a:spcAft>
+              <a:buClr>
+                <a:schemeClr val="tx1"/>
+              </a:buClr>
+              <a:buSzPct val="70000"/>
+              <a:buFont typeface="Arial" pitchFamily="34" charset="0"/>
+              <a:buChar char="−"/>
+              <a:defRPr sz="1600">
+                <a:solidFill>
+                  <a:srgbClr val="000000"/>
+                </a:solidFill>
+                <a:latin typeface="+mn-lt"/>
+              </a:defRPr>
+            </a:lvl5pPr>
+            <a:lvl6pPr marL="2230438" indent="-157163" algn="l" rtl="0" fontAlgn="base">
+              <a:spcBef>
+                <a:spcPct val="20000"/>
+              </a:spcBef>
+              <a:spcAft>
+                <a:spcPct val="3000"/>
+              </a:spcAft>
+              <a:buClr>
+                <a:schemeClr val="tx1"/>
+              </a:buClr>
+              <a:buSzPct val="70000"/>
+              <a:buFont typeface="Arial" charset="0"/>
+              <a:buChar char="►"/>
+              <a:defRPr sz="1400">
+                <a:solidFill>
+                  <a:srgbClr val="000000"/>
+                </a:solidFill>
+                <a:latin typeface="+mn-lt"/>
+              </a:defRPr>
+            </a:lvl6pPr>
+            <a:lvl7pPr marL="2687638" indent="-157163" algn="l" rtl="0" fontAlgn="base">
+              <a:spcBef>
+                <a:spcPct val="20000"/>
+              </a:spcBef>
+              <a:spcAft>
+                <a:spcPct val="3000"/>
+              </a:spcAft>
+              <a:buClr>
+                <a:schemeClr val="tx1"/>
+              </a:buClr>
+              <a:buSzPct val="70000"/>
+              <a:buFont typeface="Arial" charset="0"/>
+              <a:buChar char="►"/>
+              <a:defRPr sz="1400">
+                <a:solidFill>
+                  <a:srgbClr val="000000"/>
+                </a:solidFill>
+                <a:latin typeface="+mn-lt"/>
+              </a:defRPr>
+            </a:lvl7pPr>
+            <a:lvl8pPr marL="3144838" indent="-157163" algn="l" rtl="0" fontAlgn="base">
+              <a:spcBef>
+                <a:spcPct val="20000"/>
+              </a:spcBef>
+              <a:spcAft>
+                <a:spcPct val="3000"/>
+              </a:spcAft>
+              <a:buClr>
+                <a:schemeClr val="tx1"/>
+              </a:buClr>
+              <a:buSzPct val="70000"/>
+              <a:buFont typeface="Arial" charset="0"/>
+              <a:buChar char="►"/>
+              <a:defRPr sz="1400">
+                <a:solidFill>
+                  <a:srgbClr val="000000"/>
+                </a:solidFill>
+                <a:latin typeface="+mn-lt"/>
+              </a:defRPr>
+            </a:lvl8pPr>
+            <a:lvl9pPr marL="3602038" indent="-157163" algn="l" rtl="0" fontAlgn="base">
+              <a:spcBef>
+                <a:spcPct val="20000"/>
+              </a:spcBef>
+              <a:spcAft>
+                <a:spcPct val="3000"/>
+              </a:spcAft>
+              <a:buClr>
+                <a:schemeClr val="tx1"/>
+              </a:buClr>
+              <a:buSzPct val="70000"/>
+              <a:buFont typeface="Arial" charset="0"/>
+              <a:buChar char="►"/>
+              <a:defRPr sz="1400">
+                <a:solidFill>
+                  <a:srgbClr val="000000"/>
+                </a:solidFill>
+                <a:latin typeface="+mn-lt"/>
+              </a:defRPr>
+            </a:lvl9pPr>
+          </a:lstStyle>
+          <a:p>
+            <a:pPr marL="0" indent="0">
+              <a:buNone/>
+            </a:pPr>
+            <a:endParaRPr lang="en-US" sz="1600" kern="0" dirty="0"/>
+          </a:p>
+        </p:txBody>
+      </p:sp>
+      <p:pic>
+        <p:nvPicPr>
+          <p:cNvPr id="9218" name="Picture 2" descr="Image result for google play store">
+            <a:extLst>
+              <a:ext uri="{FF2B5EF4-FFF2-40B4-BE49-F238E27FC236}">
+                <a16:creationId xmlns:a16="http://schemas.microsoft.com/office/drawing/2014/main" id="{C601B087-EA6A-4BD1-9DA1-1F45430F6A46}"/>
+              </a:ext>
+            </a:extLst>
+          </p:cNvPr>
+          <p:cNvPicPr>
+            <a:picLocks noChangeAspect="1" noChangeArrowheads="1"/>
+          </p:cNvPicPr>
+          <p:nvPr/>
+        </p:nvPicPr>
+        <p:blipFill>
+          <a:blip r:embed="rId3">
+            <a:extLst>
+              <a:ext uri="{28A0092B-C50C-407E-A947-70E740481C1C}">
+                <a14:useLocalDpi xmlns:a14="http://schemas.microsoft.com/office/drawing/2010/main" val="0"/>
+              </a:ext>
+            </a:extLst>
+          </a:blip>
+          <a:srcRect/>
+          <a:stretch>
+            <a:fillRect/>
+          </a:stretch>
+        </p:blipFill>
+        <p:spPr bwMode="auto">
+          <a:xfrm>
+            <a:off x="1129372" y="3432480"/>
+            <a:ext cx="6879297" cy="2037687"/>
+          </a:xfrm>
+          <a:prstGeom prst="rect">
+            <a:avLst/>
+          </a:prstGeom>
+          <a:noFill/>
+          <a:extLst>
+            <a:ext uri="{909E8E84-426E-40DD-AFC4-6F175D3DCCD1}">
+              <a14:hiddenFill xmlns:a14="http://schemas.microsoft.com/office/drawing/2010/main">
+                <a:solidFill>
+                  <a:srgbClr val="FFFFFF"/>
+                </a:solidFill>
+              </a14:hiddenFill>
+            </a:ext>
+          </a:extLst>
+        </p:spPr>
+      </p:pic>
+      <p:pic>
+        <p:nvPicPr>
+          <p:cNvPr id="3" name="Picture 2">
+            <a:hlinkClick r:id="rId4"/>
+            <a:extLst>
+              <a:ext uri="{FF2B5EF4-FFF2-40B4-BE49-F238E27FC236}">
+                <a16:creationId xmlns:a16="http://schemas.microsoft.com/office/drawing/2014/main" id="{0077D639-4F38-4B30-BBD8-E48001AF0112}"/>
+              </a:ext>
+            </a:extLst>
+          </p:cNvPr>
+          <p:cNvPicPr>
+            <a:picLocks noChangeAspect="1"/>
+          </p:cNvPicPr>
+          <p:nvPr/>
+        </p:nvPicPr>
+        <p:blipFill>
+          <a:blip r:embed="rId5">
+            <a:extLst>
+              <a:ext uri="{28A0092B-C50C-407E-A947-70E740481C1C}">
+                <a14:useLocalDpi xmlns:a14="http://schemas.microsoft.com/office/drawing/2010/main" val="0"/>
+              </a:ext>
+            </a:extLst>
+          </a:blip>
+          <a:stretch>
+            <a:fillRect/>
+          </a:stretch>
+        </p:blipFill>
+        <p:spPr>
+          <a:xfrm>
+            <a:off x="890908" y="1157665"/>
+            <a:ext cx="2322244" cy="2322244"/>
+          </a:xfrm>
+          <a:prstGeom prst="rect">
+            <a:avLst/>
+          </a:prstGeom>
+        </p:spPr>
+      </p:pic>
+      <p:sp>
+        <p:nvSpPr>
+          <p:cNvPr id="5" name="Rectangle 4">
+            <a:extLst>
+              <a:ext uri="{FF2B5EF4-FFF2-40B4-BE49-F238E27FC236}">
+                <a16:creationId xmlns:a16="http://schemas.microsoft.com/office/drawing/2014/main" id="{F5DE0737-1550-4305-8C89-25B831975559}"/>
+              </a:ext>
+            </a:extLst>
+          </p:cNvPr>
+          <p:cNvSpPr/>
+          <p:nvPr/>
+        </p:nvSpPr>
+        <p:spPr>
+          <a:xfrm>
+            <a:off x="2723710" y="5750347"/>
+            <a:ext cx="9340020" cy="738664"/>
+          </a:xfrm>
+          <a:prstGeom prst="rect">
+            <a:avLst/>
+          </a:prstGeom>
+        </p:spPr>
+        <p:txBody>
+          <a:bodyPr wrap="square">
+            <a:spAutoFit/>
+          </a:bodyPr>
+          <a:lstStyle/>
+          <a:p>
+            <a:r>
+              <a:rPr lang="en-US" sz="1400" dirty="0">
+                <a:hlinkClick r:id="rId4"/>
+              </a:rPr>
+              <a:t>https://play.google.com/store/apps/details?id=com.softwaresunleashed.dog</a:t>
+            </a:r>
+            <a:endParaRPr lang="en-US" sz="1400" dirty="0"/>
+          </a:p>
+          <a:p>
+            <a:endParaRPr lang="en-US" sz="1400" dirty="0"/>
+          </a:p>
+          <a:p>
+            <a:endParaRPr lang="en-US" sz="1400" dirty="0"/>
+          </a:p>
+        </p:txBody>
+      </p:sp>
+    </p:spTree>
+    <p:extLst>
+      <p:ext uri="{BB962C8B-B14F-4D97-AF65-F5344CB8AC3E}">
+        <p14:creationId xmlns:p14="http://schemas.microsoft.com/office/powerpoint/2010/main" val="3635919822"/>
+      </p:ext>
+    </p:extLst>
+  </p:cSld>
+  <p:clrMapOvr>
+    <a:masterClrMapping/>
+  </p:clrMapOvr>
+  <p:transition>
+    <p:fade/>
+  </p:transition>
+</p:sld>
+</file>
+
+<file path=ppt/slides/slide21.xml><?xml version="1.0" encoding="utf-8"?>
+<p:sld xmlns:a="http://schemas.openxmlformats.org/drawingml/2006/main" xmlns:r="http://schemas.openxmlformats.org/officeDocument/2006/relationships" xmlns:p="http://schemas.openxmlformats.org/presentationml/2006/main">
+  <p:cSld>
+    <p:spTree>
+      <p:nvGrpSpPr>
+        <p:cNvPr id="1" name=""/>
+        <p:cNvGrpSpPr/>
+        <p:nvPr/>
+      </p:nvGrpSpPr>
+      <p:grpSpPr>
+        <a:xfrm>
+          <a:off x="0" y="0"/>
+          <a:ext cx="0" cy="0"/>
+          <a:chOff x="0" y="0"/>
+          <a:chExt cx="0" cy="0"/>
+        </a:xfrm>
+      </p:grpSpPr>
+      <p:sp>
+        <p:nvSpPr>
+          <p:cNvPr id="2" name="Title 1">
+            <a:extLst>
+              <a:ext uri="{FF2B5EF4-FFF2-40B4-BE49-F238E27FC236}">
+                <a16:creationId xmlns:a16="http://schemas.microsoft.com/office/drawing/2014/main" id="{2A7A8D4B-2734-45AB-A856-7A9C19AD321F}"/>
+              </a:ext>
+            </a:extLst>
+          </p:cNvPr>
+          <p:cNvSpPr>
+            <a:spLocks noGrp="1"/>
+          </p:cNvSpPr>
+          <p:nvPr>
+            <p:ph type="title"/>
+          </p:nvPr>
+        </p:nvSpPr>
+        <p:spPr/>
+        <p:txBody>
+          <a:bodyPr/>
+          <a:lstStyle/>
+          <a:p>
+            <a:r>
+              <a:rPr lang="en-US" dirty="0"/>
+              <a:t>Google’s Free Analytical Services (Dashboard)</a:t>
+            </a:r>
+          </a:p>
+        </p:txBody>
+      </p:sp>
+      <p:pic>
+        <p:nvPicPr>
+          <p:cNvPr id="5" name="Picture 4">
+            <a:extLst>
+              <a:ext uri="{FF2B5EF4-FFF2-40B4-BE49-F238E27FC236}">
+                <a16:creationId xmlns:a16="http://schemas.microsoft.com/office/drawing/2014/main" id="{F50F3B0D-C937-4FDE-A12B-5DDAA3C18231}"/>
+              </a:ext>
+            </a:extLst>
+          </p:cNvPr>
+          <p:cNvPicPr>
+            <a:picLocks noChangeAspect="1"/>
+          </p:cNvPicPr>
+          <p:nvPr/>
+        </p:nvPicPr>
+        <p:blipFill>
+          <a:blip r:embed="rId2"/>
+          <a:stretch>
+            <a:fillRect/>
+          </a:stretch>
+        </p:blipFill>
+        <p:spPr>
+          <a:xfrm>
+            <a:off x="977426" y="1081090"/>
+            <a:ext cx="10307216" cy="4901678"/>
+          </a:xfrm>
+          <a:prstGeom prst="rect">
+            <a:avLst/>
+          </a:prstGeom>
+          <a:effectLst>
+            <a:glow rad="139700">
+              <a:schemeClr val="accent4">
+                <a:satMod val="175000"/>
+                <a:alpha val="40000"/>
+              </a:schemeClr>
+            </a:glow>
+          </a:effectLst>
+        </p:spPr>
+      </p:pic>
+    </p:spTree>
+    <p:extLst>
+      <p:ext uri="{BB962C8B-B14F-4D97-AF65-F5344CB8AC3E}">
+        <p14:creationId xmlns:p14="http://schemas.microsoft.com/office/powerpoint/2010/main" val="975197056"/>
+      </p:ext>
+    </p:extLst>
+  </p:cSld>
+  <p:clrMapOvr>
+    <a:masterClrMapping/>
+  </p:clrMapOvr>
+  <p:transition>
+    <p:fade/>
+  </p:transition>
+</p:sld>
+</file>
+
+<file path=ppt/slides/slide22.xml><?xml version="1.0" encoding="utf-8"?>
+<p:sld xmlns:a="http://schemas.openxmlformats.org/drawingml/2006/main" xmlns:r="http://schemas.openxmlformats.org/officeDocument/2006/relationships" xmlns:p="http://schemas.openxmlformats.org/presentationml/2006/main">
+  <p:cSld>
+    <p:spTree>
+      <p:nvGrpSpPr>
+        <p:cNvPr id="1" name=""/>
+        <p:cNvGrpSpPr/>
+        <p:nvPr/>
+      </p:nvGrpSpPr>
+      <p:grpSpPr>
+        <a:xfrm>
+          <a:off x="0" y="0"/>
+          <a:ext cx="0" cy="0"/>
+          <a:chOff x="0" y="0"/>
+          <a:chExt cx="0" cy="0"/>
+        </a:xfrm>
+      </p:grpSpPr>
+      <p:pic>
+        <p:nvPicPr>
+          <p:cNvPr id="13314" name="Picture 2" descr="Image result for question and answer images">
+            <a:extLst>
+              <a:ext uri="{FF2B5EF4-FFF2-40B4-BE49-F238E27FC236}">
+                <a16:creationId xmlns:a16="http://schemas.microsoft.com/office/drawing/2014/main" id="{479746B2-73C8-4E00-A47D-9DA0C83F2EC2}"/>
+              </a:ext>
+            </a:extLst>
+          </p:cNvPr>
+          <p:cNvPicPr>
+            <a:picLocks noChangeAspect="1" noChangeArrowheads="1"/>
+          </p:cNvPicPr>
+          <p:nvPr/>
+        </p:nvPicPr>
+        <p:blipFill>
+          <a:blip r:embed="rId2">
+            <a:extLst>
+              <a:ext uri="{28A0092B-C50C-407E-A947-70E740481C1C}">
+                <a14:useLocalDpi xmlns:a14="http://schemas.microsoft.com/office/drawing/2010/main" val="0"/>
+              </a:ext>
+            </a:extLst>
+          </a:blip>
+          <a:srcRect/>
+          <a:stretch>
+            <a:fillRect/>
+          </a:stretch>
+        </p:blipFill>
+        <p:spPr bwMode="auto">
+          <a:xfrm>
+            <a:off x="5974080" y="2802890"/>
+            <a:ext cx="3810000" cy="2857500"/>
+          </a:xfrm>
+          <a:prstGeom prst="rect">
+            <a:avLst/>
+          </a:prstGeom>
+          <a:noFill/>
+          <a:extLst>
+            <a:ext uri="{909E8E84-426E-40DD-AFC4-6F175D3DCCD1}">
+              <a14:hiddenFill xmlns:a14="http://schemas.microsoft.com/office/drawing/2010/main">
+                <a:solidFill>
+                  <a:srgbClr val="FFFFFF"/>
+                </a:solidFill>
+              </a14:hiddenFill>
+            </a:ext>
+          </a:extLst>
+        </p:spPr>
+      </p:pic>
+      <p:sp>
+        <p:nvSpPr>
+          <p:cNvPr id="4" name="Text Placeholder 3">
+            <a:extLst>
+              <a:ext uri="{FF2B5EF4-FFF2-40B4-BE49-F238E27FC236}">
+                <a16:creationId xmlns:a16="http://schemas.microsoft.com/office/drawing/2014/main" id="{6F256A01-4AA8-439A-837A-571E043AA08F}"/>
+              </a:ext>
+            </a:extLst>
+          </p:cNvPr>
+          <p:cNvSpPr>
+            <a:spLocks noGrp="1"/>
+          </p:cNvSpPr>
+          <p:nvPr>
+            <p:ph type="body" sz="quarter" idx="10"/>
+          </p:nvPr>
+        </p:nvSpPr>
+        <p:spPr>
+          <a:xfrm>
+            <a:off x="4023360" y="1183501"/>
+            <a:ext cx="3901440" cy="4161030"/>
+          </a:xfrm>
+        </p:spPr>
+        <p:txBody>
+          <a:bodyPr>
+            <a:normAutofit/>
+          </a:bodyPr>
+          <a:lstStyle/>
+          <a:p>
+            <a:pPr marL="0" indent="0" algn="ctr">
+              <a:buNone/>
+            </a:pPr>
+            <a:r>
+              <a:rPr lang="en-US" sz="4800" b="1" dirty="0"/>
+              <a:t>Demo</a:t>
+            </a:r>
+          </a:p>
+          <a:p>
+            <a:pPr marL="0" indent="0" algn="ctr">
+              <a:buNone/>
+            </a:pPr>
+            <a:r>
+              <a:rPr lang="en-US" sz="4800" b="1" dirty="0"/>
+              <a:t> </a:t>
+            </a:r>
+          </a:p>
+          <a:p>
+            <a:pPr marL="0" indent="0" algn="ctr">
+              <a:buNone/>
+            </a:pPr>
+            <a:r>
+              <a:rPr lang="en-US" sz="4800" b="1" dirty="0"/>
+              <a:t>&amp; </a:t>
+            </a:r>
+          </a:p>
+          <a:p>
+            <a:pPr marL="0" indent="0" algn="ctr">
+              <a:buNone/>
+            </a:pPr>
+            <a:endParaRPr lang="en-US" sz="4800" b="1" dirty="0"/>
+          </a:p>
+          <a:p>
+            <a:pPr marL="0" indent="0" algn="ctr">
+              <a:buNone/>
+            </a:pPr>
+            <a:r>
+              <a:rPr lang="en-US" sz="4800" b="1" dirty="0" err="1"/>
+              <a:t>QnA</a:t>
+            </a:r>
+            <a:endParaRPr lang="en-US" sz="4800" dirty="0"/>
+          </a:p>
+        </p:txBody>
+      </p:sp>
+      <p:sp>
+        <p:nvSpPr>
+          <p:cNvPr id="14" name="Text Placeholder 3">
+            <a:extLst>
+              <a:ext uri="{FF2B5EF4-FFF2-40B4-BE49-F238E27FC236}">
+                <a16:creationId xmlns:a16="http://schemas.microsoft.com/office/drawing/2014/main" id="{9DA39B4E-D140-4422-9288-FA1802AAB484}"/>
+              </a:ext>
+            </a:extLst>
+          </p:cNvPr>
+          <p:cNvSpPr txBox="1">
+            <a:spLocks/>
+          </p:cNvSpPr>
+          <p:nvPr/>
+        </p:nvSpPr>
+        <p:spPr>
+          <a:xfrm>
+            <a:off x="336892" y="5344531"/>
+            <a:ext cx="10663851" cy="1650158"/>
+          </a:xfrm>
+          <a:prstGeom prst="rect">
+            <a:avLst/>
+          </a:prstGeom>
+        </p:spPr>
+        <p:txBody>
+          <a:bodyPr vert="horz" lIns="91440" tIns="45720" rIns="91440" bIns="45720" rtlCol="0">
+            <a:normAutofit/>
+          </a:bodyPr>
+          <a:lstStyle>
+            <a:lvl1pPr marL="233363" indent="-233363" algn="l" rtl="0" fontAlgn="base">
+              <a:lnSpc>
+                <a:spcPct val="100000"/>
+              </a:lnSpc>
+              <a:spcBef>
+                <a:spcPts val="575"/>
+              </a:spcBef>
+              <a:spcAft>
+                <a:spcPts val="75"/>
+              </a:spcAft>
+              <a:buClr>
+                <a:schemeClr val="tx1">
+                  <a:lumMod val="85000"/>
+                  <a:lumOff val="15000"/>
+                </a:schemeClr>
+              </a:buClr>
+              <a:buSzPct val="80000"/>
+              <a:buFont typeface="Arial" pitchFamily="34" charset="0"/>
+              <a:buChar char="•"/>
+              <a:defRPr sz="2400" b="0">
+                <a:solidFill>
+                  <a:srgbClr val="000000"/>
+                </a:solidFill>
+                <a:latin typeface="+mn-lt"/>
+                <a:ea typeface="+mn-ea"/>
+                <a:cs typeface="+mn-cs"/>
+              </a:defRPr>
+            </a:lvl1pPr>
+            <a:lvl2pPr marL="401638" indent="-168275" algn="l" rtl="0" fontAlgn="base">
+              <a:lnSpc>
+                <a:spcPct val="100000"/>
+              </a:lnSpc>
+              <a:spcBef>
+                <a:spcPts val="575"/>
+              </a:spcBef>
+              <a:spcAft>
+                <a:spcPts val="75"/>
+              </a:spcAft>
+              <a:buClr>
+                <a:schemeClr val="tx1"/>
+              </a:buClr>
+              <a:buSzPct val="80000"/>
+              <a:buFont typeface="Arial" pitchFamily="34" charset="0"/>
+              <a:buChar char="−"/>
+              <a:defRPr sz="2200">
+                <a:solidFill>
+                  <a:srgbClr val="000000"/>
+                </a:solidFill>
+                <a:latin typeface="+mn-lt"/>
+              </a:defRPr>
+            </a:lvl2pPr>
+            <a:lvl3pPr marL="569913" indent="-168275" algn="l" rtl="0" fontAlgn="base">
+              <a:lnSpc>
+                <a:spcPct val="100000"/>
+              </a:lnSpc>
+              <a:spcBef>
+                <a:spcPts val="575"/>
+              </a:spcBef>
+              <a:spcAft>
+                <a:spcPts val="75"/>
+              </a:spcAft>
+              <a:buClr>
+                <a:schemeClr val="tx1"/>
+              </a:buClr>
+              <a:buSzPct val="80000"/>
+              <a:buFont typeface="Wingdings" pitchFamily="2" charset="2"/>
+              <a:buChar char="§"/>
+              <a:defRPr sz="2000">
+                <a:solidFill>
+                  <a:srgbClr val="000000"/>
+                </a:solidFill>
+                <a:latin typeface="+mn-lt"/>
+              </a:defRPr>
+            </a:lvl3pPr>
+            <a:lvl4pPr marL="746125" indent="-176213" algn="l" rtl="0" fontAlgn="base">
+              <a:lnSpc>
+                <a:spcPct val="100000"/>
+              </a:lnSpc>
+              <a:spcBef>
+                <a:spcPts val="575"/>
+              </a:spcBef>
+              <a:spcAft>
+                <a:spcPts val="75"/>
+              </a:spcAft>
+              <a:buClr>
+                <a:schemeClr val="tx1"/>
+              </a:buClr>
+              <a:buSzPct val="80000"/>
+              <a:buFont typeface="Arial" pitchFamily="34" charset="0"/>
+              <a:buChar char="•"/>
+              <a:defRPr sz="1800">
+                <a:solidFill>
+                  <a:srgbClr val="000000"/>
+                </a:solidFill>
+                <a:latin typeface="+mn-lt"/>
+              </a:defRPr>
+            </a:lvl4pPr>
+            <a:lvl5pPr marL="969963" indent="-223838" algn="l" rtl="0" fontAlgn="base">
+              <a:lnSpc>
+                <a:spcPct val="100000"/>
+              </a:lnSpc>
+              <a:spcBef>
+                <a:spcPts val="575"/>
+              </a:spcBef>
+              <a:spcAft>
+                <a:spcPts val="75"/>
+              </a:spcAft>
+              <a:buClr>
+                <a:schemeClr val="tx1"/>
+              </a:buClr>
+              <a:buSzPct val="70000"/>
+              <a:buFont typeface="Arial" pitchFamily="34" charset="0"/>
+              <a:buChar char="−"/>
+              <a:defRPr sz="1600">
+                <a:solidFill>
+                  <a:srgbClr val="000000"/>
+                </a:solidFill>
+                <a:latin typeface="+mn-lt"/>
+              </a:defRPr>
+            </a:lvl5pPr>
+            <a:lvl6pPr marL="2230438" indent="-157163" algn="l" rtl="0" fontAlgn="base">
+              <a:spcBef>
+                <a:spcPct val="20000"/>
+              </a:spcBef>
+              <a:spcAft>
+                <a:spcPct val="3000"/>
+              </a:spcAft>
+              <a:buClr>
+                <a:schemeClr val="tx1"/>
+              </a:buClr>
+              <a:buSzPct val="70000"/>
+              <a:buFont typeface="Arial" charset="0"/>
+              <a:buChar char="►"/>
+              <a:defRPr sz="1400">
+                <a:solidFill>
+                  <a:srgbClr val="000000"/>
+                </a:solidFill>
+                <a:latin typeface="+mn-lt"/>
+              </a:defRPr>
+            </a:lvl6pPr>
+            <a:lvl7pPr marL="2687638" indent="-157163" algn="l" rtl="0" fontAlgn="base">
+              <a:spcBef>
+                <a:spcPct val="20000"/>
+              </a:spcBef>
+              <a:spcAft>
+                <a:spcPct val="3000"/>
+              </a:spcAft>
+              <a:buClr>
+                <a:schemeClr val="tx1"/>
+              </a:buClr>
+              <a:buSzPct val="70000"/>
+              <a:buFont typeface="Arial" charset="0"/>
+              <a:buChar char="►"/>
+              <a:defRPr sz="1400">
+                <a:solidFill>
+                  <a:srgbClr val="000000"/>
+                </a:solidFill>
+                <a:latin typeface="+mn-lt"/>
+              </a:defRPr>
+            </a:lvl7pPr>
+            <a:lvl8pPr marL="3144838" indent="-157163" algn="l" rtl="0" fontAlgn="base">
+              <a:spcBef>
+                <a:spcPct val="20000"/>
+              </a:spcBef>
+              <a:spcAft>
+                <a:spcPct val="3000"/>
+              </a:spcAft>
+              <a:buClr>
+                <a:schemeClr val="tx1"/>
+              </a:buClr>
+              <a:buSzPct val="70000"/>
+              <a:buFont typeface="Arial" charset="0"/>
+              <a:buChar char="►"/>
+              <a:defRPr sz="1400">
+                <a:solidFill>
+                  <a:srgbClr val="000000"/>
+                </a:solidFill>
+                <a:latin typeface="+mn-lt"/>
+              </a:defRPr>
+            </a:lvl8pPr>
+            <a:lvl9pPr marL="3602038" indent="-157163" algn="l" rtl="0" fontAlgn="base">
+              <a:spcBef>
+                <a:spcPct val="20000"/>
+              </a:spcBef>
+              <a:spcAft>
+                <a:spcPct val="3000"/>
+              </a:spcAft>
+              <a:buClr>
+                <a:schemeClr val="tx1"/>
+              </a:buClr>
+              <a:buSzPct val="70000"/>
+              <a:buFont typeface="Arial" charset="0"/>
+              <a:buChar char="►"/>
+              <a:defRPr sz="1400">
+                <a:solidFill>
+                  <a:srgbClr val="000000"/>
+                </a:solidFill>
+                <a:latin typeface="+mn-lt"/>
+              </a:defRPr>
+            </a:lvl9pPr>
+          </a:lstStyle>
+          <a:p>
+            <a:pPr marL="0" indent="0">
+              <a:buNone/>
+            </a:pPr>
+            <a:endParaRPr lang="en-US" sz="1600" kern="0" dirty="0"/>
+          </a:p>
+        </p:txBody>
+      </p:sp>
+    </p:spTree>
+    <p:extLst>
+      <p:ext uri="{BB962C8B-B14F-4D97-AF65-F5344CB8AC3E}">
+        <p14:creationId xmlns:p14="http://schemas.microsoft.com/office/powerpoint/2010/main" val="1312795536"/>
       </p:ext>
     </p:extLst>
   </p:cSld>
@@ -47721,7 +48437,7 @@
             </a:pPr>
             <a:r>
               <a:rPr lang="en-US" sz="3200" b="1" dirty="0"/>
-              <a:t>D.O.G aka Debug On the Go</a:t>
+              <a:t>Behold…..D.O.G aka Debug On the Go</a:t>
             </a:r>
             <a:endParaRPr lang="en-US" sz="3200" dirty="0"/>
           </a:p>
@@ -49656,7 +50372,14 @@
           <a:prstGeom prst="rect">
             <a:avLst/>
           </a:prstGeom>
-          <a:noFill/>
+          <a:effectLst>
+            <a:glow rad="139700">
+              <a:schemeClr val="accent4">
+                <a:satMod val="175000"/>
+                <a:alpha val="40000"/>
+              </a:schemeClr>
+            </a:glow>
+          </a:effectLst>
           <a:extLst>
             <a:ext uri="{909E8E84-426E-40DD-AFC4-6F175D3DCCD1}">
               <a14:hiddenFill xmlns:a14="http://schemas.microsoft.com/office/drawing/2010/main">
@@ -52019,182 +52742,54 @@
 </a:theme>
 </file>
 
-<file path=ppt/theme/themeOverride1.xml><?xml version="1.0" encoding="utf-8"?>
-<a:themeOverride xmlns:a="http://schemas.openxmlformats.org/drawingml/2006/main">
-  <a:clrScheme name="Custom 42">
-    <a:dk1>
-      <a:srgbClr val="000000"/>
-    </a:dk1>
-    <a:lt1>
-      <a:sysClr val="window" lastClr="FFFFFF"/>
-    </a:lt1>
-    <a:dk2>
-      <a:srgbClr val="969696"/>
-    </a:dk2>
-    <a:lt2>
-      <a:srgbClr val="FFFFFF"/>
-    </a:lt2>
-    <a:accent1>
-      <a:srgbClr val="7BB1DB"/>
-    </a:accent1>
-    <a:accent2>
-      <a:srgbClr val="F9B500"/>
-    </a:accent2>
-    <a:accent3>
-      <a:srgbClr val="C9D200"/>
-    </a:accent3>
-    <a:accent4>
-      <a:srgbClr val="D54E12"/>
-    </a:accent4>
-    <a:accent5>
-      <a:srgbClr val="A40044"/>
-    </a:accent5>
-    <a:accent6>
-      <a:srgbClr val="979200"/>
-    </a:accent6>
-    <a:hlink>
-      <a:srgbClr val="3789C8"/>
-    </a:hlink>
-    <a:folHlink>
-      <a:srgbClr val="9ED3CA"/>
-    </a:folHlink>
-  </a:clrScheme>
-</a:themeOverride>
-</file>
-
 <file path=customXml/item1.xml><?xml version="1.0" encoding="utf-8"?>
-<p:properties xmlns:p="http://schemas.microsoft.com/office/2006/metadata/properties" xmlns:xsi="http://www.w3.org/2001/XMLSchema-instance" xmlns:pc="http://schemas.microsoft.com/office/infopath/2007/PartnerControls">
-  <documentManagement>
-    <_dlc_DocId xmlns="e5a3a747-d21f-491f-b559-719a372e993f">52MFTYTJJKHE-686160917-653</_dlc_DocId>
-    <_dlc_DocIdUrl xmlns="e5a3a747-d21f-491f-b559-719a372e993f">
-      <Url>https://nxp1.sharepoint.com/sites/dngpm/PMO/Active_NPIs/LS1012A/_layouts/15/DocIdRedir.aspx?ID=52MFTYTJJKHE-686160917-653</Url>
-      <Description>52MFTYTJJKHE-686160917-653</Description>
-    </_dlc_DocIdUrl>
-    <SharedWithUsers xmlns="e5a3a747-d21f-491f-b559-719a372e993f">
-      <UserInfo>
-        <DisplayName>Cynthia Fu</DisplayName>
-        <AccountId>184</AccountId>
-        <AccountType/>
-      </UserInfo>
-      <UserInfo>
-        <DisplayName>Mircea Ionita</DisplayName>
-        <AccountId>248</AccountId>
-        <AccountType/>
-      </UserInfo>
-      <UserInfo>
-        <DisplayName>Bogdan Vlad</DisplayName>
-        <AccountId>196</AccountId>
-        <AccountType/>
-      </UserInfo>
-      <UserInfo>
-        <DisplayName>George Stefan</DisplayName>
-        <AccountId>157</AccountId>
-        <AccountType/>
-      </UserInfo>
-      <UserInfo>
-        <DisplayName>Sebastian Grigore</DisplayName>
-        <AccountId>186</AccountId>
-        <AccountType/>
-      </UserInfo>
-      <UserInfo>
-        <DisplayName>Ravi Kanth Reddy P</DisplayName>
-        <AccountId>85</AccountId>
-        <AccountType/>
-      </UserInfo>
-      <UserInfo>
-        <DisplayName>Sarat Vetcha</DisplayName>
-        <AccountId>86</AccountId>
-        <AccountType/>
-      </UserInfo>
-      <UserInfo>
-        <DisplayName>Mircea Pop</DisplayName>
-        <AccountId>94</AccountId>
-        <AccountType/>
-      </UserInfo>
-      <UserInfo>
-        <DisplayName>Adrienne Suner</DisplayName>
-        <AccountId>1368</AccountId>
-        <AccountType/>
-      </UserInfo>
-      <UserInfo>
-        <DisplayName>Rajan Gupta</DisplayName>
-        <AccountId>21</AccountId>
-        <AccountType/>
-      </UserInfo>
-      <UserInfo>
-        <DisplayName>Ruchika Gupta</DisplayName>
-        <AccountId>148</AccountId>
-        <AccountType/>
-      </UserInfo>
-      <UserInfo>
-        <DisplayName>Jaiprakash Singh</DisplayName>
-        <AccountId>225</AccountId>
-        <AccountType/>
-      </UserInfo>
-      <UserInfo>
-        <DisplayName>Jaswinder Singh</DisplayName>
-        <AccountId>245</AccountId>
-        <AccountType/>
-      </UserInfo>
-      <UserInfo>
-        <DisplayName>Varun Sethi</DisplayName>
-        <AccountId>192</AccountId>
-        <AccountType/>
-      </UserInfo>
-      <UserInfo>
-        <DisplayName>SunilKumar Gupta</DisplayName>
-        <AccountId>198</AccountId>
-        <AccountType/>
-      </UserInfo>
-      <UserInfo>
-        <DisplayName>Iuliana Bratu</DisplayName>
-        <AccountId>256</AccountId>
-        <AccountType/>
-      </UserInfo>
-      <UserInfo>
-        <DisplayName>Bogdan Costinescu</DisplayName>
-        <AccountId>51</AccountId>
-        <AccountType/>
-      </UserInfo>
-      <UserInfo>
-        <DisplayName>Rajan Srivastava</DisplayName>
-        <AccountId>254</AccountId>
-        <AccountType/>
-      </UserInfo>
-      <UserInfo>
-        <DisplayName>Priyanka Jain</DisplayName>
-        <AccountId>595</AccountId>
-        <AccountType/>
-      </UserInfo>
-      <UserInfo>
-        <DisplayName>Harninder Rai</DisplayName>
-        <AccountId>199</AccountId>
-        <AccountType/>
-      </UserInfo>
-      <UserInfo>
-        <DisplayName>Bhaskar U</DisplayName>
-        <AccountId>1347</AccountId>
-        <AccountType/>
-      </UserInfo>
-      <UserInfo>
-        <DisplayName>Prabhakar Kushwaha</DisplayName>
-        <AccountId>601</AccountId>
-        <AccountType/>
-      </UserInfo>
-      <UserInfo>
-        <DisplayName>Ashish Kumar</DisplayName>
-        <AccountId>328</AccountId>
-        <AccountType/>
-      </UserInfo>
-      <UserInfo>
-        <DisplayName>Rajesh Bhagat</DisplayName>
-        <AccountId>600</AccountId>
-        <AccountType/>
-      </UserInfo>
-    </SharedWithUsers>
-    <Meeting_x0020_Date xmlns="a2f770b2-dfa2-4887-b142-27fb0960f078">2017-05-08T13:03:54+00:00</Meeting_x0020_Date>
-  </documentManagement>
-</p:properties>
+<?mso-contentType ?>
+<spe:Receivers xmlns:spe="http://schemas.microsoft.com/sharepoint/events">
+  <Receiver>
+    <Name>Document ID Generator</Name>
+    <Synchronization>Synchronous</Synchronization>
+    <Type>10001</Type>
+    <SequenceNumber>1000</SequenceNumber>
+    <Url/>
+    <Assembly>Microsoft.Office.DocumentManagement, Version=16.0.0.0, Culture=neutral, PublicKeyToken=71e9bce111e9429c</Assembly>
+    <Class>Microsoft.Office.DocumentManagement.Internal.DocIdHandler</Class>
+    <Data/>
+    <Filter/>
+  </Receiver>
+  <Receiver>
+    <Name>Document ID Generator</Name>
+    <Synchronization>Synchronous</Synchronization>
+    <Type>10002</Type>
+    <SequenceNumber>1001</SequenceNumber>
+    <Url/>
+    <Assembly>Microsoft.Office.DocumentManagement, Version=16.0.0.0, Culture=neutral, PublicKeyToken=71e9bce111e9429c</Assembly>
+    <Class>Microsoft.Office.DocumentManagement.Internal.DocIdHandler</Class>
+    <Data/>
+    <Filter/>
+  </Receiver>
+  <Receiver>
+    <Name>Document ID Generator</Name>
+    <Synchronization>Synchronous</Synchronization>
+    <Type>10004</Type>
+    <SequenceNumber>1002</SequenceNumber>
+    <Url/>
+    <Assembly>Microsoft.Office.DocumentManagement, Version=16.0.0.0, Culture=neutral, PublicKeyToken=71e9bce111e9429c</Assembly>
+    <Class>Microsoft.Office.DocumentManagement.Internal.DocIdHandler</Class>
+    <Data/>
+    <Filter/>
+  </Receiver>
+  <Receiver>
+    <Name>Document ID Generator</Name>
+    <Synchronization>Synchronous</Synchronization>
+    <Type>10006</Type>
+    <SequenceNumber>1003</SequenceNumber>
+    <Url/>
+    <Assembly>Microsoft.Office.DocumentManagement, Version=16.0.0.0, Culture=neutral, PublicKeyToken=71e9bce111e9429c</Assembly>
+    <Class>Microsoft.Office.DocumentManagement.Internal.DocIdHandler</Class>
+    <Data/>
+    <Filter/>
+  </Receiver>
+</spe:Receivers>
 </file>
 
 <file path=customXml/item2.xml><?xml version="1.0" encoding="utf-8"?>
@@ -52396,53 +52991,138 @@
 </file>
 
 <file path=customXml/item3.xml><?xml version="1.0" encoding="utf-8"?>
-<?mso-contentType ?>
-<spe:Receivers xmlns:spe="http://schemas.microsoft.com/sharepoint/events">
-  <Receiver>
-    <Name>Document ID Generator</Name>
-    <Synchronization>Synchronous</Synchronization>
-    <Type>10001</Type>
-    <SequenceNumber>1000</SequenceNumber>
-    <Url/>
-    <Assembly>Microsoft.Office.DocumentManagement, Version=16.0.0.0, Culture=neutral, PublicKeyToken=71e9bce111e9429c</Assembly>
-    <Class>Microsoft.Office.DocumentManagement.Internal.DocIdHandler</Class>
-    <Data/>
-    <Filter/>
-  </Receiver>
-  <Receiver>
-    <Name>Document ID Generator</Name>
-    <Synchronization>Synchronous</Synchronization>
-    <Type>10002</Type>
-    <SequenceNumber>1001</SequenceNumber>
-    <Url/>
-    <Assembly>Microsoft.Office.DocumentManagement, Version=16.0.0.0, Culture=neutral, PublicKeyToken=71e9bce111e9429c</Assembly>
-    <Class>Microsoft.Office.DocumentManagement.Internal.DocIdHandler</Class>
-    <Data/>
-    <Filter/>
-  </Receiver>
-  <Receiver>
-    <Name>Document ID Generator</Name>
-    <Synchronization>Synchronous</Synchronization>
-    <Type>10004</Type>
-    <SequenceNumber>1002</SequenceNumber>
-    <Url/>
-    <Assembly>Microsoft.Office.DocumentManagement, Version=16.0.0.0, Culture=neutral, PublicKeyToken=71e9bce111e9429c</Assembly>
-    <Class>Microsoft.Office.DocumentManagement.Internal.DocIdHandler</Class>
-    <Data/>
-    <Filter/>
-  </Receiver>
-  <Receiver>
-    <Name>Document ID Generator</Name>
-    <Synchronization>Synchronous</Synchronization>
-    <Type>10006</Type>
-    <SequenceNumber>1003</SequenceNumber>
-    <Url/>
-    <Assembly>Microsoft.Office.DocumentManagement, Version=16.0.0.0, Culture=neutral, PublicKeyToken=71e9bce111e9429c</Assembly>
-    <Class>Microsoft.Office.DocumentManagement.Internal.DocIdHandler</Class>
-    <Data/>
-    <Filter/>
-  </Receiver>
-</spe:Receivers>
+<p:properties xmlns:p="http://schemas.microsoft.com/office/2006/metadata/properties" xmlns:xsi="http://www.w3.org/2001/XMLSchema-instance" xmlns:pc="http://schemas.microsoft.com/office/infopath/2007/PartnerControls">
+  <documentManagement>
+    <_dlc_DocId xmlns="e5a3a747-d21f-491f-b559-719a372e993f">52MFTYTJJKHE-686160917-653</_dlc_DocId>
+    <_dlc_DocIdUrl xmlns="e5a3a747-d21f-491f-b559-719a372e993f">
+      <Url>https://nxp1.sharepoint.com/sites/dngpm/PMO/Active_NPIs/LS1012A/_layouts/15/DocIdRedir.aspx?ID=52MFTYTJJKHE-686160917-653</Url>
+      <Description>52MFTYTJJKHE-686160917-653</Description>
+    </_dlc_DocIdUrl>
+    <SharedWithUsers xmlns="e5a3a747-d21f-491f-b559-719a372e993f">
+      <UserInfo>
+        <DisplayName>Cynthia Fu</DisplayName>
+        <AccountId>184</AccountId>
+        <AccountType/>
+      </UserInfo>
+      <UserInfo>
+        <DisplayName>Mircea Ionita</DisplayName>
+        <AccountId>248</AccountId>
+        <AccountType/>
+      </UserInfo>
+      <UserInfo>
+        <DisplayName>Bogdan Vlad</DisplayName>
+        <AccountId>196</AccountId>
+        <AccountType/>
+      </UserInfo>
+      <UserInfo>
+        <DisplayName>George Stefan</DisplayName>
+        <AccountId>157</AccountId>
+        <AccountType/>
+      </UserInfo>
+      <UserInfo>
+        <DisplayName>Sebastian Grigore</DisplayName>
+        <AccountId>186</AccountId>
+        <AccountType/>
+      </UserInfo>
+      <UserInfo>
+        <DisplayName>Ravi Kanth Reddy P</DisplayName>
+        <AccountId>85</AccountId>
+        <AccountType/>
+      </UserInfo>
+      <UserInfo>
+        <DisplayName>Sarat Vetcha</DisplayName>
+        <AccountId>86</AccountId>
+        <AccountType/>
+      </UserInfo>
+      <UserInfo>
+        <DisplayName>Mircea Pop</DisplayName>
+        <AccountId>94</AccountId>
+        <AccountType/>
+      </UserInfo>
+      <UserInfo>
+        <DisplayName>Adrienne Suner</DisplayName>
+        <AccountId>1368</AccountId>
+        <AccountType/>
+      </UserInfo>
+      <UserInfo>
+        <DisplayName>Rajan Gupta</DisplayName>
+        <AccountId>21</AccountId>
+        <AccountType/>
+      </UserInfo>
+      <UserInfo>
+        <DisplayName>Ruchika Gupta</DisplayName>
+        <AccountId>148</AccountId>
+        <AccountType/>
+      </UserInfo>
+      <UserInfo>
+        <DisplayName>Jaiprakash Singh</DisplayName>
+        <AccountId>225</AccountId>
+        <AccountType/>
+      </UserInfo>
+      <UserInfo>
+        <DisplayName>Jaswinder Singh</DisplayName>
+        <AccountId>245</AccountId>
+        <AccountType/>
+      </UserInfo>
+      <UserInfo>
+        <DisplayName>Varun Sethi</DisplayName>
+        <AccountId>192</AccountId>
+        <AccountType/>
+      </UserInfo>
+      <UserInfo>
+        <DisplayName>SunilKumar Gupta</DisplayName>
+        <AccountId>198</AccountId>
+        <AccountType/>
+      </UserInfo>
+      <UserInfo>
+        <DisplayName>Iuliana Bratu</DisplayName>
+        <AccountId>256</AccountId>
+        <AccountType/>
+      </UserInfo>
+      <UserInfo>
+        <DisplayName>Bogdan Costinescu</DisplayName>
+        <AccountId>51</AccountId>
+        <AccountType/>
+      </UserInfo>
+      <UserInfo>
+        <DisplayName>Rajan Srivastava</DisplayName>
+        <AccountId>254</AccountId>
+        <AccountType/>
+      </UserInfo>
+      <UserInfo>
+        <DisplayName>Priyanka Jain</DisplayName>
+        <AccountId>595</AccountId>
+        <AccountType/>
+      </UserInfo>
+      <UserInfo>
+        <DisplayName>Harninder Rai</DisplayName>
+        <AccountId>199</AccountId>
+        <AccountType/>
+      </UserInfo>
+      <UserInfo>
+        <DisplayName>Bhaskar U</DisplayName>
+        <AccountId>1347</AccountId>
+        <AccountType/>
+      </UserInfo>
+      <UserInfo>
+        <DisplayName>Prabhakar Kushwaha</DisplayName>
+        <AccountId>601</AccountId>
+        <AccountType/>
+      </UserInfo>
+      <UserInfo>
+        <DisplayName>Ashish Kumar</DisplayName>
+        <AccountId>328</AccountId>
+        <AccountType/>
+      </UserInfo>
+      <UserInfo>
+        <DisplayName>Rajesh Bhagat</DisplayName>
+        <AccountId>600</AccountId>
+        <AccountType/>
+      </UserInfo>
+    </SharedWithUsers>
+    <Meeting_x0020_Date xmlns="a2f770b2-dfa2-4887-b142-27fb0960f078">2017-05-08T13:03:54+00:00</Meeting_x0020_Date>
+  </documentManagement>
+</p:properties>
 </file>
 
 <file path=customXml/item4.xml><?xml version="1.0" encoding="utf-8"?>
@@ -52455,18 +53135,9 @@
 </file>
 
 <file path=customXml/itemProps1.xml><?xml version="1.0" encoding="utf-8"?>
-<ds:datastoreItem xmlns:ds="http://schemas.openxmlformats.org/officeDocument/2006/customXml" ds:itemID="{21D23866-845B-4BD2-A441-572A2E164D66}">
+<ds:datastoreItem xmlns:ds="http://schemas.openxmlformats.org/officeDocument/2006/customXml" ds:itemID="{69A0E0BA-4C2A-440E-B218-2F3845E4EC86}">
   <ds:schemaRefs>
-    <ds:schemaRef ds:uri="http://purl.org/dc/terms/"/>
-    <ds:schemaRef ds:uri="http://schemas.microsoft.com/office/2006/metadata/properties"/>
-    <ds:schemaRef ds:uri="http://schemas.microsoft.com/office/2006/documentManagement/types"/>
-    <ds:schemaRef ds:uri="a2f770b2-dfa2-4887-b142-27fb0960f078"/>
-    <ds:schemaRef ds:uri="http://schemas.microsoft.com/office/infopath/2007/PartnerControls"/>
-    <ds:schemaRef ds:uri="http://purl.org/dc/elements/1.1/"/>
-    <ds:schemaRef ds:uri="http://schemas.openxmlformats.org/package/2006/metadata/core-properties"/>
-    <ds:schemaRef ds:uri="e5a3a747-d21f-491f-b559-719a372e993f"/>
-    <ds:schemaRef ds:uri="http://www.w3.org/XML/1998/namespace"/>
-    <ds:schemaRef ds:uri="http://purl.org/dc/dcmitype/"/>
+    <ds:schemaRef ds:uri="http://schemas.microsoft.com/sharepoint/events"/>
   </ds:schemaRefs>
 </ds:datastoreItem>
 </file>
@@ -52491,9 +53162,18 @@
 </file>
 
 <file path=customXml/itemProps3.xml><?xml version="1.0" encoding="utf-8"?>
-<ds:datastoreItem xmlns:ds="http://schemas.openxmlformats.org/officeDocument/2006/customXml" ds:itemID="{69A0E0BA-4C2A-440E-B218-2F3845E4EC86}">
+<ds:datastoreItem xmlns:ds="http://schemas.openxmlformats.org/officeDocument/2006/customXml" ds:itemID="{21D23866-845B-4BD2-A441-572A2E164D66}">
   <ds:schemaRefs>
-    <ds:schemaRef ds:uri="http://schemas.microsoft.com/sharepoint/events"/>
+    <ds:schemaRef ds:uri="http://purl.org/dc/terms/"/>
+    <ds:schemaRef ds:uri="http://schemas.microsoft.com/office/2006/metadata/properties"/>
+    <ds:schemaRef ds:uri="http://schemas.microsoft.com/office/2006/documentManagement/types"/>
+    <ds:schemaRef ds:uri="a2f770b2-dfa2-4887-b142-27fb0960f078"/>
+    <ds:schemaRef ds:uri="http://schemas.microsoft.com/office/infopath/2007/PartnerControls"/>
+    <ds:schemaRef ds:uri="http://purl.org/dc/elements/1.1/"/>
+    <ds:schemaRef ds:uri="http://schemas.openxmlformats.org/package/2006/metadata/core-properties"/>
+    <ds:schemaRef ds:uri="e5a3a747-d21f-491f-b559-719a372e993f"/>
+    <ds:schemaRef ds:uri="http://www.w3.org/XML/1998/namespace"/>
+    <ds:schemaRef ds:uri="http://purl.org/dc/dcmitype/"/>
   </ds:schemaRefs>
 </ds:datastoreItem>
 </file>

</xml_diff>

<commit_message>
DOG PPT updated with Command to generate CW based XML format dump.
</commit_message>
<xml_diff>
--- a/demo_artifacts/DOG-DebugOnGo.pptx
+++ b/demo_artifacts/DOG-DebugOnGo.pptx
@@ -283,7 +283,7 @@
                 </a:solidFill>
               </a:rPr>
               <a:pPr algn="l"/>
-              <a:t>6/1/2018 9:16:12 AM</a:t>
+              <a:t>6/1/2018 12:19:41 PM</a:t>
             </a:fld>
             <a:endParaRPr lang="en-US" sz="900">
               <a:solidFill>
@@ -1544,7 +1544,7 @@
                 </a:solidFill>
               </a:rPr>
               <a:pPr algn="l"/>
-              <a:t>6/1/2018 9:15:10 AM</a:t>
+              <a:t>6/1/2018 12:19:31 PM</a:t>
             </a:fld>
             <a:endParaRPr lang="en-US" sz="900">
               <a:solidFill>
@@ -44626,6 +44626,466 @@
           </a:effectLst>
         </p:spPr>
       </p:pic>
+      <p:graphicFrame>
+        <p:nvGraphicFramePr>
+          <p:cNvPr id="2" name="Table 1">
+            <a:extLst>
+              <a:ext uri="{FF2B5EF4-FFF2-40B4-BE49-F238E27FC236}">
+                <a16:creationId xmlns:a16="http://schemas.microsoft.com/office/drawing/2014/main" id="{5FDCE9FF-8716-4DC1-8046-A3C7F0424E1D}"/>
+              </a:ext>
+            </a:extLst>
+          </p:cNvPr>
+          <p:cNvGraphicFramePr>
+            <a:graphicFrameLocks noGrp="1"/>
+          </p:cNvGraphicFramePr>
+          <p:nvPr>
+            <p:extLst>
+              <p:ext uri="{D42A27DB-BD31-4B8C-83A1-F6EECF244321}">
+                <p14:modId xmlns:p14="http://schemas.microsoft.com/office/powerpoint/2010/main" val="686474168"/>
+              </p:ext>
+            </p:extLst>
+          </p:nvPr>
+        </p:nvGraphicFramePr>
+        <p:xfrm>
+          <a:off x="701040" y="5344531"/>
+          <a:ext cx="5768975" cy="1014623"/>
+        </p:xfrm>
+        <a:graphic>
+          <a:graphicData uri="http://schemas.openxmlformats.org/drawingml/2006/table">
+            <a:tbl>
+              <a:tblPr firstRow="1" firstCol="1" bandRow="1">
+                <a:tableStyleId>{5C22544A-7EE6-4342-B048-85BDC9FD1C3A}</a:tableStyleId>
+              </a:tblPr>
+              <a:tblGrid>
+                <a:gridCol w="5768975">
+                  <a:extLst>
+                    <a:ext uri="{9D8B030D-6E8A-4147-A177-3AD203B41FA5}">
+                      <a16:colId xmlns:a16="http://schemas.microsoft.com/office/drawing/2014/main" val="1416217490"/>
+                    </a:ext>
+                  </a:extLst>
+                </a:gridCol>
+              </a:tblGrid>
+              <a:tr h="1014623">
+                <a:tc>
+                  <a:txBody>
+                    <a:bodyPr/>
+                    <a:lstStyle/>
+                    <a:p>
+                      <a:pPr marL="0" marR="0">
+                        <a:lnSpc>
+                          <a:spcPct val="107000"/>
+                        </a:lnSpc>
+                        <a:spcBef>
+                          <a:spcPts val="0"/>
+                        </a:spcBef>
+                        <a:spcAft>
+                          <a:spcPts val="0"/>
+                        </a:spcAft>
+                      </a:pPr>
+                      <a:r>
+                        <a:rPr lang="en-US" sz="1000" dirty="0" err="1">
+                          <a:effectLst/>
+                        </a:rPr>
+                        <a:t>reg_export</a:t>
+                      </a:r>
+                      <a:r>
+                        <a:rPr lang="en-US" sz="1000" dirty="0">
+                          <a:effectLst/>
+                        </a:rPr>
+                        <a:t> </a:t>
+                      </a:r>
+                      <a:r>
+                        <a:rPr lang="en-US" sz="1000" dirty="0" err="1">
+                          <a:effectLst/>
+                        </a:rPr>
+                        <a:t>dump_all_reg</a:t>
+                      </a:r>
+                      <a:r>
+                        <a:rPr lang="en-US" sz="1000" dirty="0">
+                          <a:effectLst/>
+                        </a:rPr>
+                        <a:t> all</a:t>
+                      </a:r>
+                      <a:endParaRPr lang="en-US" sz="1400" dirty="0">
+                        <a:effectLst/>
+                      </a:endParaRPr>
+                    </a:p>
+                    <a:p>
+                      <a:pPr marL="0" marR="0">
+                        <a:lnSpc>
+                          <a:spcPct val="107000"/>
+                        </a:lnSpc>
+                        <a:spcBef>
+                          <a:spcPts val="0"/>
+                        </a:spcBef>
+                        <a:spcAft>
+                          <a:spcPts val="0"/>
+                        </a:spcAft>
+                      </a:pPr>
+                      <a:r>
+                        <a:rPr lang="en-US" sz="1000" dirty="0">
+                          <a:effectLst/>
+                        </a:rPr>
+                        <a:t>Exporting...</a:t>
+                      </a:r>
+                      <a:endParaRPr lang="en-US" sz="1400" dirty="0">
+                        <a:effectLst/>
+                      </a:endParaRPr>
+                    </a:p>
+                    <a:p>
+                      <a:pPr marL="0" marR="0">
+                        <a:lnSpc>
+                          <a:spcPct val="107000"/>
+                        </a:lnSpc>
+                        <a:spcBef>
+                          <a:spcPts val="0"/>
+                        </a:spcBef>
+                        <a:spcAft>
+                          <a:spcPts val="0"/>
+                        </a:spcAft>
+                      </a:pPr>
+                      <a:r>
+                        <a:rPr lang="en-US" sz="1000" dirty="0">
+                          <a:effectLst/>
+                        </a:rPr>
+                        <a:t> </a:t>
+                      </a:r>
+                      <a:endParaRPr lang="en-US" sz="1400" dirty="0">
+                        <a:effectLst/>
+                      </a:endParaRPr>
+                    </a:p>
+                    <a:p>
+                      <a:pPr marL="0" marR="0">
+                        <a:lnSpc>
+                          <a:spcPct val="107000"/>
+                        </a:lnSpc>
+                        <a:spcBef>
+                          <a:spcPts val="0"/>
+                        </a:spcBef>
+                        <a:spcAft>
+                          <a:spcPts val="0"/>
+                        </a:spcAft>
+                      </a:pPr>
+                      <a:r>
+                        <a:rPr lang="en-US" sz="1000" dirty="0">
+                          <a:effectLst/>
+                        </a:rPr>
+                        <a:t> </a:t>
+                      </a:r>
+                      <a:endParaRPr lang="en-US" sz="1400" dirty="0">
+                        <a:effectLst/>
+                      </a:endParaRPr>
+                    </a:p>
+                    <a:p>
+                      <a:pPr marL="0" marR="0">
+                        <a:lnSpc>
+                          <a:spcPct val="107000"/>
+                        </a:lnSpc>
+                        <a:spcBef>
+                          <a:spcPts val="0"/>
+                        </a:spcBef>
+                        <a:spcAft>
+                          <a:spcPts val="0"/>
+                        </a:spcAft>
+                      </a:pPr>
+                      <a:r>
+                        <a:rPr lang="en-US" sz="1000" dirty="0">
+                          <a:effectLst/>
+                        </a:rPr>
+                        <a:t>All the register content would be dumped into </a:t>
+                      </a:r>
+                      <a:r>
+                        <a:rPr lang="en-US" sz="1000" dirty="0" err="1">
+                          <a:effectLst/>
+                        </a:rPr>
+                        <a:t>dump_all_reg</a:t>
+                      </a:r>
+                      <a:r>
+                        <a:rPr lang="en-US" sz="1000" dirty="0">
+                          <a:effectLst/>
+                        </a:rPr>
+                        <a:t> file located at C:\Freescale\CW4NET_v2018.01\CW_ARMv8\ARMv8 directory</a:t>
+                      </a:r>
+                      <a:endParaRPr lang="en-US" sz="1400" dirty="0">
+                        <a:effectLst/>
+                        <a:latin typeface="Calibri" panose="020F0502020204030204" pitchFamily="34" charset="0"/>
+                        <a:ea typeface="Calibri" panose="020F0502020204030204" pitchFamily="34" charset="0"/>
+                        <a:cs typeface="Times New Roman" panose="02020603050405020304" pitchFamily="18" charset="0"/>
+                      </a:endParaRPr>
+                    </a:p>
+                  </a:txBody>
+                  <a:tcPr marL="68580" marR="68580" marT="0" marB="0"/>
+                </a:tc>
+                <a:extLst>
+                  <a:ext uri="{0D108BD9-81ED-4DB2-BD59-A6C34878D82A}">
+                    <a16:rowId xmlns:a16="http://schemas.microsoft.com/office/drawing/2014/main" val="3474812122"/>
+                  </a:ext>
+                </a:extLst>
+              </a:tr>
+            </a:tbl>
+          </a:graphicData>
+        </a:graphic>
+      </p:graphicFrame>
+      <p:sp>
+        <p:nvSpPr>
+          <p:cNvPr id="8" name="Rectangle 7">
+            <a:extLst>
+              <a:ext uri="{FF2B5EF4-FFF2-40B4-BE49-F238E27FC236}">
+                <a16:creationId xmlns:a16="http://schemas.microsoft.com/office/drawing/2014/main" id="{EFDF3391-2C49-4441-92EE-8DC0394B66CF}"/>
+              </a:ext>
+            </a:extLst>
+          </p:cNvPr>
+          <p:cNvSpPr/>
+          <p:nvPr/>
+        </p:nvSpPr>
+        <p:spPr>
+          <a:xfrm>
+            <a:off x="632946" y="3513398"/>
+            <a:ext cx="6096000" cy="1692771"/>
+          </a:xfrm>
+          <a:prstGeom prst="rect">
+            <a:avLst/>
+          </a:prstGeom>
+        </p:spPr>
+        <p:txBody>
+          <a:bodyPr>
+            <a:spAutoFit/>
+          </a:bodyPr>
+          <a:lstStyle/>
+          <a:p>
+            <a:pPr lvl="0" eaLnBrk="0" hangingPunct="0"/>
+            <a:r>
+              <a:rPr lang="en-US" altLang="en-US" sz="1200" b="1" dirty="0">
+                <a:solidFill>
+                  <a:srgbClr val="000000"/>
+                </a:solidFill>
+                <a:latin typeface="Times New Roman" panose="02020603050405020304" pitchFamily="18" charset="0"/>
+                <a:ea typeface="Calibri" panose="020F0502020204030204" pitchFamily="34" charset="0"/>
+                <a:cs typeface="Times New Roman" panose="02020603050405020304" pitchFamily="18" charset="0"/>
+              </a:rPr>
+              <a:t>How to generate CW based XML Dump File ::</a:t>
+            </a:r>
+          </a:p>
+          <a:p>
+            <a:pPr lvl="0" eaLnBrk="0" hangingPunct="0"/>
+            <a:endParaRPr lang="en-US" altLang="en-US" sz="1200" dirty="0">
+              <a:solidFill>
+                <a:srgbClr val="000000"/>
+              </a:solidFill>
+              <a:latin typeface="Times New Roman" panose="02020603050405020304" pitchFamily="18" charset="0"/>
+              <a:ea typeface="Calibri" panose="020F0502020204030204" pitchFamily="34" charset="0"/>
+              <a:cs typeface="Times New Roman" panose="02020603050405020304" pitchFamily="18" charset="0"/>
+            </a:endParaRPr>
+          </a:p>
+          <a:p>
+            <a:pPr lvl="0" eaLnBrk="0" hangingPunct="0"/>
+            <a:r>
+              <a:rPr lang="en-US" altLang="en-US" sz="1200" dirty="0">
+                <a:solidFill>
+                  <a:srgbClr val="000000"/>
+                </a:solidFill>
+                <a:latin typeface="Times New Roman" panose="02020603050405020304" pitchFamily="18" charset="0"/>
+                <a:ea typeface="Calibri" panose="020F0502020204030204" pitchFamily="34" charset="0"/>
+                <a:cs typeface="Times New Roman" panose="02020603050405020304" pitchFamily="18" charset="0"/>
+              </a:rPr>
+              <a:t>Execute following command in Debugger console of  CW </a:t>
+            </a:r>
+          </a:p>
+          <a:p>
+            <a:pPr lvl="0" eaLnBrk="0" hangingPunct="0"/>
+            <a:endParaRPr lang="en-US" altLang="en-US" sz="1200" dirty="0">
+              <a:solidFill>
+                <a:srgbClr val="000000"/>
+              </a:solidFill>
+              <a:latin typeface="Times New Roman" panose="02020603050405020304" pitchFamily="18" charset="0"/>
+              <a:ea typeface="Calibri" panose="020F0502020204030204" pitchFamily="34" charset="0"/>
+              <a:cs typeface="Times New Roman" panose="02020603050405020304" pitchFamily="18" charset="0"/>
+            </a:endParaRPr>
+          </a:p>
+          <a:p>
+            <a:pPr lvl="0" eaLnBrk="0" hangingPunct="0"/>
+            <a:r>
+              <a:rPr lang="en-US" altLang="en-US" sz="1200" b="1" dirty="0">
+                <a:solidFill>
+                  <a:srgbClr val="000000"/>
+                </a:solidFill>
+                <a:latin typeface="Times New Roman" panose="02020603050405020304" pitchFamily="18" charset="0"/>
+                <a:ea typeface="Calibri" panose="020F0502020204030204" pitchFamily="34" charset="0"/>
+                <a:cs typeface="Times New Roman" panose="02020603050405020304" pitchFamily="18" charset="0"/>
+              </a:rPr>
+              <a:t>Usage</a:t>
+            </a:r>
+            <a:r>
+              <a:rPr lang="en-US" altLang="en-US" sz="1200" dirty="0">
+                <a:solidFill>
+                  <a:srgbClr val="000000"/>
+                </a:solidFill>
+                <a:latin typeface="Times New Roman" panose="02020603050405020304" pitchFamily="18" charset="0"/>
+                <a:ea typeface="Calibri" panose="020F0502020204030204" pitchFamily="34" charset="0"/>
+                <a:cs typeface="Times New Roman" panose="02020603050405020304" pitchFamily="18" charset="0"/>
+              </a:rPr>
+              <a:t>: </a:t>
+            </a:r>
+          </a:p>
+          <a:p>
+            <a:pPr lvl="0" eaLnBrk="0" hangingPunct="0"/>
+            <a:r>
+              <a:rPr lang="en-US" altLang="en-US" sz="1200" dirty="0" err="1">
+                <a:solidFill>
+                  <a:srgbClr val="000000"/>
+                </a:solidFill>
+                <a:latin typeface="Times New Roman" panose="02020603050405020304" pitchFamily="18" charset="0"/>
+                <a:ea typeface="Calibri" panose="020F0502020204030204" pitchFamily="34" charset="0"/>
+                <a:cs typeface="Times New Roman" panose="02020603050405020304" pitchFamily="18" charset="0"/>
+              </a:rPr>
+              <a:t>reg_export</a:t>
+            </a:r>
+            <a:r>
+              <a:rPr lang="en-US" altLang="en-US" sz="1200" dirty="0">
+                <a:solidFill>
+                  <a:srgbClr val="000000"/>
+                </a:solidFill>
+                <a:latin typeface="Times New Roman" panose="02020603050405020304" pitchFamily="18" charset="0"/>
+                <a:ea typeface="Calibri" panose="020F0502020204030204" pitchFamily="34" charset="0"/>
+                <a:cs typeface="Times New Roman" panose="02020603050405020304" pitchFamily="18" charset="0"/>
+              </a:rPr>
+              <a:t> FILE &lt;ALL | GROUP_NAME1,GROUP_NAME2...&gt; [FORMAT=</a:t>
+            </a:r>
+            <a:r>
+              <a:rPr lang="en-US" altLang="en-US" sz="1200" dirty="0" err="1">
+                <a:solidFill>
+                  <a:srgbClr val="000000"/>
+                </a:solidFill>
+                <a:latin typeface="Times New Roman" panose="02020603050405020304" pitchFamily="18" charset="0"/>
+                <a:ea typeface="Calibri" panose="020F0502020204030204" pitchFamily="34" charset="0"/>
+                <a:cs typeface="Times New Roman" panose="02020603050405020304" pitchFamily="18" charset="0"/>
+              </a:rPr>
+              <a:t>regs</a:t>
+            </a:r>
+            <a:r>
+              <a:rPr lang="en-US" altLang="en-US" sz="1200" dirty="0">
+                <a:solidFill>
+                  <a:srgbClr val="000000"/>
+                </a:solidFill>
+                <a:latin typeface="Times New Roman" panose="02020603050405020304" pitchFamily="18" charset="0"/>
+                <a:ea typeface="Calibri" panose="020F0502020204030204" pitchFamily="34" charset="0"/>
+                <a:cs typeface="Times New Roman" panose="02020603050405020304" pitchFamily="18" charset="0"/>
+              </a:rPr>
+              <a:t>]</a:t>
+            </a:r>
+            <a:endParaRPr lang="en-US" altLang="en-US" sz="800" dirty="0"/>
+          </a:p>
+          <a:p>
+            <a:pPr lvl="0" eaLnBrk="0" hangingPunct="0"/>
+            <a:r>
+              <a:rPr lang="en-US" altLang="en-US" sz="1200" dirty="0">
+                <a:solidFill>
+                  <a:srgbClr val="000000"/>
+                </a:solidFill>
+                <a:latin typeface="Times New Roman" panose="02020603050405020304" pitchFamily="18" charset="0"/>
+                <a:ea typeface="Calibri" panose="020F0502020204030204" pitchFamily="34" charset="0"/>
+                <a:cs typeface="Times New Roman" panose="02020603050405020304" pitchFamily="18" charset="0"/>
+              </a:rPr>
+              <a:t>GROUP_NAME is the name of the register group (IP block).</a:t>
+            </a:r>
+          </a:p>
+          <a:p>
+            <a:pPr lvl="0" eaLnBrk="0" hangingPunct="0"/>
+            <a:endParaRPr lang="en-US" altLang="en-US" sz="800" dirty="0"/>
+          </a:p>
+          <a:p>
+            <a:pPr lvl="0" eaLnBrk="0" hangingPunct="0"/>
+            <a:r>
+              <a:rPr lang="en-US" altLang="en-US" sz="1200" dirty="0">
+                <a:solidFill>
+                  <a:srgbClr val="000000"/>
+                </a:solidFill>
+                <a:latin typeface="Times New Roman" panose="02020603050405020304" pitchFamily="18" charset="0"/>
+                <a:ea typeface="Calibri" panose="020F0502020204030204" pitchFamily="34" charset="0"/>
+                <a:cs typeface="Times New Roman" panose="02020603050405020304" pitchFamily="18" charset="0"/>
+              </a:rPr>
+              <a:t>To see a detailed description of each command, enter "help &lt;</a:t>
+            </a:r>
+            <a:r>
+              <a:rPr lang="en-US" altLang="en-US" sz="1200" dirty="0" err="1">
+                <a:solidFill>
+                  <a:srgbClr val="000000"/>
+                </a:solidFill>
+                <a:latin typeface="Times New Roman" panose="02020603050405020304" pitchFamily="18" charset="0"/>
+                <a:ea typeface="Calibri" panose="020F0502020204030204" pitchFamily="34" charset="0"/>
+                <a:cs typeface="Times New Roman" panose="02020603050405020304" pitchFamily="18" charset="0"/>
+              </a:rPr>
+              <a:t>cmd</a:t>
+            </a:r>
+            <a:r>
+              <a:rPr lang="en-US" altLang="en-US" sz="1200" dirty="0">
+                <a:solidFill>
+                  <a:srgbClr val="000000"/>
+                </a:solidFill>
+                <a:latin typeface="Times New Roman" panose="02020603050405020304" pitchFamily="18" charset="0"/>
+                <a:ea typeface="Calibri" panose="020F0502020204030204" pitchFamily="34" charset="0"/>
+                <a:cs typeface="Times New Roman" panose="02020603050405020304" pitchFamily="18" charset="0"/>
+              </a:rPr>
+              <a:t>&gt;" in the GDB console.</a:t>
+            </a:r>
+            <a:endParaRPr lang="en-US" altLang="en-US" dirty="0">
+              <a:latin typeface="Arial" panose="020B0604020202020204" pitchFamily="34" charset="0"/>
+            </a:endParaRPr>
+          </a:p>
+        </p:txBody>
+      </p:sp>
+      <p:sp>
+        <p:nvSpPr>
+          <p:cNvPr id="9" name="Rectangle 8">
+            <a:extLst>
+              <a:ext uri="{FF2B5EF4-FFF2-40B4-BE49-F238E27FC236}">
+                <a16:creationId xmlns:a16="http://schemas.microsoft.com/office/drawing/2014/main" id="{91A4D992-DD1A-489D-8088-AF3A63C0DC3C}"/>
+              </a:ext>
+            </a:extLst>
+          </p:cNvPr>
+          <p:cNvSpPr/>
+          <p:nvPr/>
+        </p:nvSpPr>
+        <p:spPr>
+          <a:xfrm>
+            <a:off x="525294" y="3346315"/>
+            <a:ext cx="6203652" cy="3112851"/>
+          </a:xfrm>
+          <a:prstGeom prst="rect">
+            <a:avLst/>
+          </a:prstGeom>
+          <a:noFill/>
+          <a:ln w="31750">
+            <a:solidFill>
+              <a:schemeClr val="accent1"/>
+            </a:solidFill>
+          </a:ln>
+        </p:spPr>
+        <p:style>
+          <a:lnRef idx="2">
+            <a:schemeClr val="accent1">
+              <a:shade val="50000"/>
+            </a:schemeClr>
+          </a:lnRef>
+          <a:fillRef idx="1">
+            <a:schemeClr val="accent1"/>
+          </a:fillRef>
+          <a:effectRef idx="0">
+            <a:schemeClr val="accent1"/>
+          </a:effectRef>
+          <a:fontRef idx="minor">
+            <a:schemeClr val="lt1"/>
+          </a:fontRef>
+        </p:style>
+        <p:txBody>
+          <a:bodyPr rtlCol="0" anchor="ctr"/>
+          <a:lstStyle/>
+          <a:p>
+            <a:pPr algn="ctr"/>
+            <a:endParaRPr lang="en-US" dirty="0"/>
+          </a:p>
+        </p:txBody>
+      </p:sp>
     </p:spTree>
     <p:extLst>
       <p:ext uri="{BB962C8B-B14F-4D97-AF65-F5344CB8AC3E}">
@@ -52743,56 +53203,6 @@
 </file>
 
 <file path=customXml/item1.xml><?xml version="1.0" encoding="utf-8"?>
-<?mso-contentType ?>
-<spe:Receivers xmlns:spe="http://schemas.microsoft.com/sharepoint/events">
-  <Receiver>
-    <Name>Document ID Generator</Name>
-    <Synchronization>Synchronous</Synchronization>
-    <Type>10001</Type>
-    <SequenceNumber>1000</SequenceNumber>
-    <Url/>
-    <Assembly>Microsoft.Office.DocumentManagement, Version=16.0.0.0, Culture=neutral, PublicKeyToken=71e9bce111e9429c</Assembly>
-    <Class>Microsoft.Office.DocumentManagement.Internal.DocIdHandler</Class>
-    <Data/>
-    <Filter/>
-  </Receiver>
-  <Receiver>
-    <Name>Document ID Generator</Name>
-    <Synchronization>Synchronous</Synchronization>
-    <Type>10002</Type>
-    <SequenceNumber>1001</SequenceNumber>
-    <Url/>
-    <Assembly>Microsoft.Office.DocumentManagement, Version=16.0.0.0, Culture=neutral, PublicKeyToken=71e9bce111e9429c</Assembly>
-    <Class>Microsoft.Office.DocumentManagement.Internal.DocIdHandler</Class>
-    <Data/>
-    <Filter/>
-  </Receiver>
-  <Receiver>
-    <Name>Document ID Generator</Name>
-    <Synchronization>Synchronous</Synchronization>
-    <Type>10004</Type>
-    <SequenceNumber>1002</SequenceNumber>
-    <Url/>
-    <Assembly>Microsoft.Office.DocumentManagement, Version=16.0.0.0, Culture=neutral, PublicKeyToken=71e9bce111e9429c</Assembly>
-    <Class>Microsoft.Office.DocumentManagement.Internal.DocIdHandler</Class>
-    <Data/>
-    <Filter/>
-  </Receiver>
-  <Receiver>
-    <Name>Document ID Generator</Name>
-    <Synchronization>Synchronous</Synchronization>
-    <Type>10006</Type>
-    <SequenceNumber>1003</SequenceNumber>
-    <Url/>
-    <Assembly>Microsoft.Office.DocumentManagement, Version=16.0.0.0, Culture=neutral, PublicKeyToken=71e9bce111e9429c</Assembly>
-    <Class>Microsoft.Office.DocumentManagement.Internal.DocIdHandler</Class>
-    <Data/>
-    <Filter/>
-  </Receiver>
-</spe:Receivers>
-</file>
-
-<file path=customXml/item2.xml><?xml version="1.0" encoding="utf-8"?>
 <ct:contentTypeSchema xmlns:ct="http://schemas.microsoft.com/office/2006/metadata/contentType" xmlns:ma="http://schemas.microsoft.com/office/2006/metadata/properties/metaAttributes" ct:_="" ma:_="" ma:contentTypeName="Document" ma:contentTypeID="0x0101005D830060E7A76D4BAEB9B0B5B7329A24" ma:contentTypeVersion="15" ma:contentTypeDescription="Create a new document." ma:contentTypeScope="" ma:versionID="4d8cec10b937debf156875563de8ceca">
   <xsd:schema xmlns:xsd="http://www.w3.org/2001/XMLSchema" xmlns:xs="http://www.w3.org/2001/XMLSchema" xmlns:p="http://schemas.microsoft.com/office/2006/metadata/properties" xmlns:ns2="a2f770b2-dfa2-4887-b142-27fb0960f078" xmlns:ns3="e5a3a747-d21f-491f-b559-719a372e993f" targetNamespace="http://schemas.microsoft.com/office/2006/metadata/properties" ma:root="true" ma:fieldsID="39aa9910312795ebc3cbcc6d2b474960" ns2:_="" ns3:_="">
     <xsd:import namespace="a2f770b2-dfa2-4887-b142-27fb0960f078"/>
@@ -52990,7 +53400,66 @@
 </ct:contentTypeSchema>
 </file>
 
+<file path=customXml/item2.xml><?xml version="1.0" encoding="utf-8"?>
+<?mso-contentType ?>
+<spe:Receivers xmlns:spe="http://schemas.microsoft.com/sharepoint/events">
+  <Receiver>
+    <Name>Document ID Generator</Name>
+    <Synchronization>Synchronous</Synchronization>
+    <Type>10001</Type>
+    <SequenceNumber>1000</SequenceNumber>
+    <Url/>
+    <Assembly>Microsoft.Office.DocumentManagement, Version=16.0.0.0, Culture=neutral, PublicKeyToken=71e9bce111e9429c</Assembly>
+    <Class>Microsoft.Office.DocumentManagement.Internal.DocIdHandler</Class>
+    <Data/>
+    <Filter/>
+  </Receiver>
+  <Receiver>
+    <Name>Document ID Generator</Name>
+    <Synchronization>Synchronous</Synchronization>
+    <Type>10002</Type>
+    <SequenceNumber>1001</SequenceNumber>
+    <Url/>
+    <Assembly>Microsoft.Office.DocumentManagement, Version=16.0.0.0, Culture=neutral, PublicKeyToken=71e9bce111e9429c</Assembly>
+    <Class>Microsoft.Office.DocumentManagement.Internal.DocIdHandler</Class>
+    <Data/>
+    <Filter/>
+  </Receiver>
+  <Receiver>
+    <Name>Document ID Generator</Name>
+    <Synchronization>Synchronous</Synchronization>
+    <Type>10004</Type>
+    <SequenceNumber>1002</SequenceNumber>
+    <Url/>
+    <Assembly>Microsoft.Office.DocumentManagement, Version=16.0.0.0, Culture=neutral, PublicKeyToken=71e9bce111e9429c</Assembly>
+    <Class>Microsoft.Office.DocumentManagement.Internal.DocIdHandler</Class>
+    <Data/>
+    <Filter/>
+  </Receiver>
+  <Receiver>
+    <Name>Document ID Generator</Name>
+    <Synchronization>Synchronous</Synchronization>
+    <Type>10006</Type>
+    <SequenceNumber>1003</SequenceNumber>
+    <Url/>
+    <Assembly>Microsoft.Office.DocumentManagement, Version=16.0.0.0, Culture=neutral, PublicKeyToken=71e9bce111e9429c</Assembly>
+    <Class>Microsoft.Office.DocumentManagement.Internal.DocIdHandler</Class>
+    <Data/>
+    <Filter/>
+  </Receiver>
+</spe:Receivers>
+</file>
+
 <file path=customXml/item3.xml><?xml version="1.0" encoding="utf-8"?>
+<?mso-contentType ?>
+<FormTemplates xmlns="http://schemas.microsoft.com/sharepoint/v3/contenttype/forms">
+  <Display>DocumentLibraryForm</Display>
+  <Edit>DocumentLibraryForm</Edit>
+  <New>DocumentLibraryForm</New>
+</FormTemplates>
+</file>
+
+<file path=customXml/item4.xml><?xml version="1.0" encoding="utf-8"?>
 <p:properties xmlns:p="http://schemas.microsoft.com/office/2006/metadata/properties" xmlns:xsi="http://www.w3.org/2001/XMLSchema-instance" xmlns:pc="http://schemas.microsoft.com/office/infopath/2007/PartnerControls">
   <documentManagement>
     <_dlc_DocId xmlns="e5a3a747-d21f-491f-b559-719a372e993f">52MFTYTJJKHE-686160917-653</_dlc_DocId>
@@ -53125,24 +53594,7 @@
 </p:properties>
 </file>
 
-<file path=customXml/item4.xml><?xml version="1.0" encoding="utf-8"?>
-<?mso-contentType ?>
-<FormTemplates xmlns="http://schemas.microsoft.com/sharepoint/v3/contenttype/forms">
-  <Display>DocumentLibraryForm</Display>
-  <Edit>DocumentLibraryForm</Edit>
-  <New>DocumentLibraryForm</New>
-</FormTemplates>
-</file>
-
 <file path=customXml/itemProps1.xml><?xml version="1.0" encoding="utf-8"?>
-<ds:datastoreItem xmlns:ds="http://schemas.openxmlformats.org/officeDocument/2006/customXml" ds:itemID="{69A0E0BA-4C2A-440E-B218-2F3845E4EC86}">
-  <ds:schemaRefs>
-    <ds:schemaRef ds:uri="http://schemas.microsoft.com/sharepoint/events"/>
-  </ds:schemaRefs>
-</ds:datastoreItem>
-</file>
-
-<file path=customXml/itemProps2.xml><?xml version="1.0" encoding="utf-8"?>
 <ds:datastoreItem xmlns:ds="http://schemas.openxmlformats.org/officeDocument/2006/customXml" ds:itemID="{7D975BC3-FD94-4279-BEC4-6FA33B23ABCF}">
   <ds:schemaRefs>
     <ds:schemaRef ds:uri="a2f770b2-dfa2-4887-b142-27fb0960f078"/>
@@ -53161,7 +53613,23 @@
 </ds:datastoreItem>
 </file>
 
+<file path=customXml/itemProps2.xml><?xml version="1.0" encoding="utf-8"?>
+<ds:datastoreItem xmlns:ds="http://schemas.openxmlformats.org/officeDocument/2006/customXml" ds:itemID="{69A0E0BA-4C2A-440E-B218-2F3845E4EC86}">
+  <ds:schemaRefs>
+    <ds:schemaRef ds:uri="http://schemas.microsoft.com/sharepoint/events"/>
+  </ds:schemaRefs>
+</ds:datastoreItem>
+</file>
+
 <file path=customXml/itemProps3.xml><?xml version="1.0" encoding="utf-8"?>
+<ds:datastoreItem xmlns:ds="http://schemas.openxmlformats.org/officeDocument/2006/customXml" ds:itemID="{5183EDC3-6F2E-4A31-8B5C-907F834989CA}">
+  <ds:schemaRefs>
+    <ds:schemaRef ds:uri="http://schemas.microsoft.com/sharepoint/v3/contenttype/forms"/>
+  </ds:schemaRefs>
+</ds:datastoreItem>
+</file>
+
+<file path=customXml/itemProps4.xml><?xml version="1.0" encoding="utf-8"?>
 <ds:datastoreItem xmlns:ds="http://schemas.openxmlformats.org/officeDocument/2006/customXml" ds:itemID="{21D23866-845B-4BD2-A441-572A2E164D66}">
   <ds:schemaRefs>
     <ds:schemaRef ds:uri="http://purl.org/dc/terms/"/>
@@ -53176,12 +53644,4 @@
     <ds:schemaRef ds:uri="http://purl.org/dc/dcmitype/"/>
   </ds:schemaRefs>
 </ds:datastoreItem>
-</file>
-
-<file path=customXml/itemProps4.xml><?xml version="1.0" encoding="utf-8"?>
-<ds:datastoreItem xmlns:ds="http://schemas.openxmlformats.org/officeDocument/2006/customXml" ds:itemID="{5183EDC3-6F2E-4A31-8B5C-907F834989CA}">
-  <ds:schemaRefs>
-    <ds:schemaRef ds:uri="http://schemas.microsoft.com/sharepoint/v3/contenttype/forms"/>
-  </ds:schemaRefs>
-</ds:datastoreItem>
 </file>
</xml_diff>